<commit_message>
Add some what we learned stuff to presentation
</commit_message>
<xml_diff>
--- a/TopdownGame.pptx
+++ b/TopdownGame.pptx
@@ -6620,6 +6620,57 @@
           <a:bodyPr/>
           <a:lstStyle/>
           <a:p>
+            <a:r>
+              <a:rPr lang="fi-FI" dirty="0" err="1" smtClean="0"/>
+              <a:t>Unreal</a:t>
+            </a:r>
+            <a:r>
+              <a:rPr lang="fi-FI" dirty="0" smtClean="0"/>
+              <a:t> Engine 4 </a:t>
+            </a:r>
+            <a:r>
+              <a:rPr lang="fi-FI" dirty="0" err="1" smtClean="0"/>
+              <a:t>isn’t</a:t>
+            </a:r>
+            <a:r>
+              <a:rPr lang="fi-FI" dirty="0" smtClean="0"/>
+              <a:t> </a:t>
+            </a:r>
+            <a:r>
+              <a:rPr lang="fi-FI" dirty="0" err="1" smtClean="0"/>
+              <a:t>good</a:t>
+            </a:r>
+            <a:r>
+              <a:rPr lang="fi-FI" dirty="0" smtClean="0"/>
+              <a:t> as it </a:t>
+            </a:r>
+            <a:r>
+              <a:rPr lang="fi-FI" dirty="0" err="1" smtClean="0"/>
+              <a:t>first</a:t>
+            </a:r>
+            <a:r>
+              <a:rPr lang="fi-FI" dirty="0" smtClean="0"/>
+              <a:t> </a:t>
+            </a:r>
+            <a:r>
+              <a:rPr lang="fi-FI" dirty="0" err="1" smtClean="0"/>
+              <a:t>seemed</a:t>
+            </a:r>
+            <a:endParaRPr lang="fi-FI" dirty="0" smtClean="0"/>
+          </a:p>
+          <a:p>
+            <a:r>
+              <a:rPr lang="fi-FI" dirty="0" err="1" smtClean="0"/>
+              <a:t>Modeling</a:t>
+            </a:r>
+            <a:r>
+              <a:rPr lang="fi-FI" dirty="0" smtClean="0"/>
+              <a:t> and </a:t>
+            </a:r>
+            <a:r>
+              <a:rPr lang="fi-FI" dirty="0" err="1" smtClean="0"/>
+              <a:t>animating</a:t>
+            </a:r>
             <a:endParaRPr lang="en-US" dirty="0"/>
           </a:p>
         </p:txBody>
@@ -8833,11 +8884,7 @@
             </a:r>
             <a:r>
               <a:rPr lang="fi-FI" dirty="0" smtClean="0"/>
-              <a:t> </a:t>
-            </a:r>
-            <a:r>
-              <a:rPr lang="fi-FI" dirty="0" smtClean="0"/>
-              <a:t>to </a:t>
+              <a:t> to </a:t>
             </a:r>
             <a:r>
               <a:rPr lang="fi-FI" dirty="0" err="1" smtClean="0"/>

</xml_diff>

<commit_message>
added weapon and map pictures
</commit_message>
<xml_diff>
--- a/TopdownGame.pptx
+++ b/TopdownGame.pptx
@@ -117,7 +117,7 @@
   </p:defaultTextStyle>
   <p:extLst>
     <p:ext uri="{EFAFB233-063F-42B5-8137-9DF3F51BA10A}">
-      <p15:sldGuideLst xmlns:p15="http://schemas.microsoft.com/office/powerpoint/2012/main"/>
+      <p15:sldGuideLst xmlns:p15="http://schemas.microsoft.com/office/powerpoint/2012/main" xmlns=""/>
     </p:ext>
   </p:extLst>
 </p:presentation>
@@ -847,7 +847,7 @@
           <a:p>
             <a:fld id="{78CED280-D596-4318-BD9D-334C5D42CEEE}" type="datetimeFigureOut">
               <a:rPr lang="fi-FI" smtClean="0"/>
-              <a:t>23.4.2015</a:t>
+              <a:t>25.4.2015</a:t>
             </a:fld>
             <a:endParaRPr lang="fi-FI"/>
           </a:p>
@@ -1105,7 +1105,7 @@
           <a:p>
             <a:fld id="{78CED280-D596-4318-BD9D-334C5D42CEEE}" type="datetimeFigureOut">
               <a:rPr lang="fi-FI" smtClean="0"/>
-              <a:t>23.4.2015</a:t>
+              <a:t>25.4.2015</a:t>
             </a:fld>
             <a:endParaRPr lang="fi-FI"/>
           </a:p>
@@ -1419,7 +1419,7 @@
           <a:p>
             <a:fld id="{78CED280-D596-4318-BD9D-334C5D42CEEE}" type="datetimeFigureOut">
               <a:rPr lang="fi-FI" smtClean="0"/>
-              <a:t>23.4.2015</a:t>
+              <a:t>25.4.2015</a:t>
             </a:fld>
             <a:endParaRPr lang="fi-FI"/>
           </a:p>
@@ -1746,7 +1746,7 @@
           <a:p>
             <a:fld id="{78CED280-D596-4318-BD9D-334C5D42CEEE}" type="datetimeFigureOut">
               <a:rPr lang="fi-FI" smtClean="0"/>
-              <a:t>23.4.2015</a:t>
+              <a:t>25.4.2015</a:t>
             </a:fld>
             <a:endParaRPr lang="fi-FI"/>
           </a:p>
@@ -2060,7 +2060,7 @@
           <a:p>
             <a:fld id="{78CED280-D596-4318-BD9D-334C5D42CEEE}" type="datetimeFigureOut">
               <a:rPr lang="fi-FI" smtClean="0"/>
-              <a:t>23.4.2015</a:t>
+              <a:t>25.4.2015</a:t>
             </a:fld>
             <a:endParaRPr lang="fi-FI"/>
           </a:p>
@@ -2447,7 +2447,7 @@
           <a:p>
             <a:fld id="{78CED280-D596-4318-BD9D-334C5D42CEEE}" type="datetimeFigureOut">
               <a:rPr lang="fi-FI" smtClean="0"/>
-              <a:t>23.4.2015</a:t>
+              <a:t>25.4.2015</a:t>
             </a:fld>
             <a:endParaRPr lang="fi-FI"/>
           </a:p>
@@ -2617,7 +2617,7 @@
           <a:p>
             <a:fld id="{78CED280-D596-4318-BD9D-334C5D42CEEE}" type="datetimeFigureOut">
               <a:rPr lang="fi-FI" smtClean="0"/>
-              <a:t>23.4.2015</a:t>
+              <a:t>25.4.2015</a:t>
             </a:fld>
             <a:endParaRPr lang="fi-FI"/>
           </a:p>
@@ -2797,7 +2797,7 @@
           <a:p>
             <a:fld id="{78CED280-D596-4318-BD9D-334C5D42CEEE}" type="datetimeFigureOut">
               <a:rPr lang="fi-FI" smtClean="0"/>
-              <a:t>23.4.2015</a:t>
+              <a:t>25.4.2015</a:t>
             </a:fld>
             <a:endParaRPr lang="fi-FI"/>
           </a:p>
@@ -2983,7 +2983,7 @@
           <a:p>
             <a:fld id="{78CED280-D596-4318-BD9D-334C5D42CEEE}" type="datetimeFigureOut">
               <a:rPr lang="fi-FI" smtClean="0"/>
-              <a:t>23.4.2015</a:t>
+              <a:t>25.4.2015</a:t>
             </a:fld>
             <a:endParaRPr lang="fi-FI"/>
           </a:p>
@@ -3237,7 +3237,7 @@
           <a:p>
             <a:fld id="{78CED280-D596-4318-BD9D-334C5D42CEEE}" type="datetimeFigureOut">
               <a:rPr lang="fi-FI" smtClean="0"/>
-              <a:t>23.4.2015</a:t>
+              <a:t>25.4.2015</a:t>
             </a:fld>
             <a:endParaRPr lang="fi-FI"/>
           </a:p>
@@ -3476,7 +3476,7 @@
           <a:p>
             <a:fld id="{78CED280-D596-4318-BD9D-334C5D42CEEE}" type="datetimeFigureOut">
               <a:rPr lang="fi-FI" smtClean="0"/>
-              <a:t>23.4.2015</a:t>
+              <a:t>25.4.2015</a:t>
             </a:fld>
             <a:endParaRPr lang="fi-FI"/>
           </a:p>
@@ -3850,7 +3850,7 @@
           <a:p>
             <a:fld id="{78CED280-D596-4318-BD9D-334C5D42CEEE}" type="datetimeFigureOut">
               <a:rPr lang="fi-FI" smtClean="0"/>
-              <a:t>23.4.2015</a:t>
+              <a:t>25.4.2015</a:t>
             </a:fld>
             <a:endParaRPr lang="fi-FI"/>
           </a:p>
@@ -3973,7 +3973,7 @@
           <a:p>
             <a:fld id="{78CED280-D596-4318-BD9D-334C5D42CEEE}" type="datetimeFigureOut">
               <a:rPr lang="fi-FI" smtClean="0"/>
-              <a:t>23.4.2015</a:t>
+              <a:t>25.4.2015</a:t>
             </a:fld>
             <a:endParaRPr lang="fi-FI"/>
           </a:p>
@@ -4075,7 +4075,7 @@
           <a:p>
             <a:fld id="{78CED280-D596-4318-BD9D-334C5D42CEEE}" type="datetimeFigureOut">
               <a:rPr lang="fi-FI" smtClean="0"/>
-              <a:t>23.4.2015</a:t>
+              <a:t>25.4.2015</a:t>
             </a:fld>
             <a:endParaRPr lang="fi-FI"/>
           </a:p>
@@ -4330,7 +4330,7 @@
           <a:p>
             <a:fld id="{78CED280-D596-4318-BD9D-334C5D42CEEE}" type="datetimeFigureOut">
               <a:rPr lang="fi-FI" smtClean="0"/>
-              <a:t>23.4.2015</a:t>
+              <a:t>25.4.2015</a:t>
             </a:fld>
             <a:endParaRPr lang="fi-FI"/>
           </a:p>
@@ -4593,7 +4593,7 @@
           <a:p>
             <a:fld id="{78CED280-D596-4318-BD9D-334C5D42CEEE}" type="datetimeFigureOut">
               <a:rPr lang="fi-FI" smtClean="0"/>
-              <a:t>23.4.2015</a:t>
+              <a:t>25.4.2015</a:t>
             </a:fld>
             <a:endParaRPr lang="fi-FI"/>
           </a:p>
@@ -5338,7 +5338,7 @@
           <a:p>
             <a:fld id="{78CED280-D596-4318-BD9D-334C5D42CEEE}" type="datetimeFigureOut">
               <a:rPr lang="fi-FI" smtClean="0"/>
-              <a:t>23.4.2015</a:t>
+              <a:t>25.4.2015</a:t>
             </a:fld>
             <a:endParaRPr lang="fi-FI"/>
           </a:p>
@@ -7789,12 +7789,14 @@
         </p:nvSpPr>
         <p:spPr>
           <a:xfrm>
-            <a:off x="677334" y="1602223"/>
-            <a:ext cx="8596668" cy="4919958"/>
+            <a:off x="677333" y="1423993"/>
+            <a:ext cx="8596668" cy="5255776"/>
           </a:xfrm>
         </p:spPr>
         <p:txBody>
-          <a:bodyPr/>
+          <a:bodyPr>
+            <a:normAutofit lnSpcReduction="10000"/>
+          </a:bodyPr>
           <a:lstStyle/>
           <a:p>
             <a:r>
@@ -7871,20 +7873,14 @@
           <a:p>
             <a:r>
               <a:rPr lang="fi-FI" dirty="0" smtClean="0"/>
-              <a:t>Three </a:t>
-            </a:r>
-            <a:r>
-              <a:rPr lang="fi-FI" dirty="0" err="1" smtClean="0"/>
-              <a:t>awesome</a:t>
-            </a:r>
-            <a:r>
-              <a:rPr lang="fi-FI" dirty="0" smtClean="0"/>
-              <a:t> </a:t>
-            </a:r>
-            <a:r>
-              <a:rPr lang="fi-FI" dirty="0" err="1" smtClean="0"/>
+              <a:t>Three awesome </a:t>
+            </a:r>
+            <a:r>
+              <a:rPr lang="fi-FI" dirty="0" smtClean="0"/>
               <a:t>maps</a:t>
             </a:r>
+          </a:p>
+          <a:p>
             <a:endParaRPr lang="fi-FI" dirty="0" smtClean="0"/>
           </a:p>
           <a:p>
@@ -7910,8 +7906,14 @@
               <a:rPr lang="fi-FI" dirty="0" smtClean="0"/>
               <a:t>		</a:t>
             </a:r>
-            <a:r>
-              <a:rPr lang="fi-FI" dirty="0" err="1" smtClean="0"/>
+            <a:endParaRPr lang="fi-FI" dirty="0" smtClean="0"/>
+          </a:p>
+          <a:p>
+            <a:pPr marL="0" indent="0">
+              <a:buNone/>
+            </a:pPr>
+            <a:r>
+              <a:rPr lang="fi-FI" dirty="0" smtClean="0"/>
               <a:t>Jungle</a:t>
             </a:r>
             <a:r>
@@ -7924,19 +7926,7 @@
             </a:r>
             <a:r>
               <a:rPr lang="fi-FI" dirty="0" smtClean="0"/>
-              <a:t>     </a:t>
-            </a:r>
-            <a:r>
-              <a:rPr lang="fi-FI" dirty="0" err="1" smtClean="0"/>
-              <a:t>Cave</a:t>
-            </a:r>
-            <a:r>
-              <a:rPr lang="fi-FI" dirty="0" smtClean="0"/>
-              <a:t>						   </a:t>
-            </a:r>
-            <a:r>
-              <a:rPr lang="fi-FI" dirty="0" err="1" smtClean="0"/>
-              <a:t>Boss</a:t>
+              <a:t>     Cave						   Boss</a:t>
             </a:r>
             <a:endParaRPr lang="fi-FI" dirty="0"/>
           </a:p>
@@ -7950,7 +7940,7 @@
         </p:nvSpPr>
         <p:spPr>
           <a:xfrm>
-            <a:off x="677334" y="2120112"/>
+            <a:off x="677334" y="1903136"/>
             <a:ext cx="1936393" cy="1375647"/>
           </a:xfrm>
           <a:prstGeom prst="rect">
@@ -8010,7 +8000,7 @@
         </p:nvSpPr>
         <p:spPr>
           <a:xfrm>
-            <a:off x="2925571" y="2120111"/>
+            <a:off x="2925571" y="1903135"/>
             <a:ext cx="1936393" cy="1375647"/>
           </a:xfrm>
           <a:prstGeom prst="rect">
@@ -8070,7 +8060,7 @@
         </p:nvSpPr>
         <p:spPr>
           <a:xfrm>
-            <a:off x="5173808" y="2120111"/>
+            <a:off x="5173808" y="1903135"/>
             <a:ext cx="1936393" cy="1375647"/>
           </a:xfrm>
           <a:prstGeom prst="rect">
@@ -8130,7 +8120,7 @@
         </p:nvSpPr>
         <p:spPr>
           <a:xfrm>
-            <a:off x="7422045" y="2128201"/>
+            <a:off x="7422045" y="1911225"/>
             <a:ext cx="1936393" cy="1375647"/>
           </a:xfrm>
           <a:prstGeom prst="rect">
@@ -8362,6 +8352,358 @@
           </a:p>
         </p:txBody>
       </p:sp>
+      <p:pic>
+        <p:nvPicPr>
+          <p:cNvPr id="1026" name="Picture 2"/>
+          <p:cNvPicPr>
+            <a:picLocks noChangeAspect="1" noChangeArrowheads="1"/>
+          </p:cNvPicPr>
+          <p:nvPr/>
+        </p:nvPicPr>
+        <p:blipFill>
+          <a:blip r:embed="rId2">
+            <a:extLst>
+              <a:ext uri="{28A0092B-C50C-407E-A947-70E740481C1C}">
+                <a14:useLocalDpi xmlns:a14="http://schemas.microsoft.com/office/drawing/2010/main" val="0"/>
+              </a:ext>
+            </a:extLst>
+          </a:blip>
+          <a:srcRect/>
+          <a:stretch>
+            <a:fillRect/>
+          </a:stretch>
+        </p:blipFill>
+        <p:spPr bwMode="auto">
+          <a:xfrm>
+            <a:off x="5173808" y="2030625"/>
+            <a:ext cx="1936393" cy="1104900"/>
+          </a:xfrm>
+          <a:prstGeom prst="rect">
+            <a:avLst/>
+          </a:prstGeom>
+          <a:noFill/>
+          <a:ln>
+            <a:noFill/>
+          </a:ln>
+          <a:extLst>
+            <a:ext uri="{909E8E84-426E-40DD-AFC4-6F175D3DCCD1}">
+              <a14:hiddenFill xmlns:a14="http://schemas.microsoft.com/office/drawing/2010/main">
+                <a:solidFill>
+                  <a:schemeClr val="accent1"/>
+                </a:solidFill>
+              </a14:hiddenFill>
+            </a:ext>
+            <a:ext uri="{91240B29-F687-4F45-9708-019B960494DF}">
+              <a14:hiddenLine xmlns:a14="http://schemas.microsoft.com/office/drawing/2010/main" w="9525">
+                <a:solidFill>
+                  <a:schemeClr val="tx1"/>
+                </a:solidFill>
+                <a:miter lim="800000"/>
+                <a:headEnd/>
+                <a:tailEnd/>
+              </a14:hiddenLine>
+            </a:ext>
+          </a:extLst>
+        </p:spPr>
+      </p:pic>
+      <p:pic>
+        <p:nvPicPr>
+          <p:cNvPr id="1028" name="Picture 4"/>
+          <p:cNvPicPr>
+            <a:picLocks noChangeAspect="1" noChangeArrowheads="1"/>
+          </p:cNvPicPr>
+          <p:nvPr/>
+        </p:nvPicPr>
+        <p:blipFill>
+          <a:blip r:embed="rId3">
+            <a:extLst>
+              <a:ext uri="{28A0092B-C50C-407E-A947-70E740481C1C}">
+                <a14:useLocalDpi xmlns:a14="http://schemas.microsoft.com/office/drawing/2010/main" val="0"/>
+              </a:ext>
+            </a:extLst>
+          </a:blip>
+          <a:srcRect/>
+          <a:stretch>
+            <a:fillRect/>
+          </a:stretch>
+        </p:blipFill>
+        <p:spPr bwMode="auto">
+          <a:xfrm>
+            <a:off x="677333" y="2038508"/>
+            <a:ext cx="1936394" cy="1104900"/>
+          </a:xfrm>
+          <a:prstGeom prst="rect">
+            <a:avLst/>
+          </a:prstGeom>
+          <a:noFill/>
+          <a:ln>
+            <a:noFill/>
+          </a:ln>
+          <a:extLst>
+            <a:ext uri="{909E8E84-426E-40DD-AFC4-6F175D3DCCD1}">
+              <a14:hiddenFill xmlns:a14="http://schemas.microsoft.com/office/drawing/2010/main">
+                <a:solidFill>
+                  <a:schemeClr val="accent1"/>
+                </a:solidFill>
+              </a14:hiddenFill>
+            </a:ext>
+            <a:ext uri="{91240B29-F687-4F45-9708-019B960494DF}">
+              <a14:hiddenLine xmlns:a14="http://schemas.microsoft.com/office/drawing/2010/main" w="9525">
+                <a:solidFill>
+                  <a:schemeClr val="tx1"/>
+                </a:solidFill>
+                <a:miter lim="800000"/>
+                <a:headEnd/>
+                <a:tailEnd/>
+              </a14:hiddenLine>
+            </a:ext>
+          </a:extLst>
+        </p:spPr>
+      </p:pic>
+      <p:pic>
+        <p:nvPicPr>
+          <p:cNvPr id="1029" name="Picture 5"/>
+          <p:cNvPicPr>
+            <a:picLocks noChangeAspect="1" noChangeArrowheads="1"/>
+          </p:cNvPicPr>
+          <p:nvPr/>
+        </p:nvPicPr>
+        <p:blipFill>
+          <a:blip r:embed="rId4">
+            <a:extLst>
+              <a:ext uri="{28A0092B-C50C-407E-A947-70E740481C1C}">
+                <a14:useLocalDpi xmlns:a14="http://schemas.microsoft.com/office/drawing/2010/main" val="0"/>
+              </a:ext>
+            </a:extLst>
+          </a:blip>
+          <a:srcRect/>
+          <a:stretch>
+            <a:fillRect/>
+          </a:stretch>
+        </p:blipFill>
+        <p:spPr bwMode="auto">
+          <a:xfrm>
+            <a:off x="2925571" y="2046598"/>
+            <a:ext cx="1936393" cy="1104900"/>
+          </a:xfrm>
+          <a:prstGeom prst="rect">
+            <a:avLst/>
+          </a:prstGeom>
+          <a:noFill/>
+          <a:ln>
+            <a:noFill/>
+          </a:ln>
+          <a:extLst>
+            <a:ext uri="{909E8E84-426E-40DD-AFC4-6F175D3DCCD1}">
+              <a14:hiddenFill xmlns:a14="http://schemas.microsoft.com/office/drawing/2010/main">
+                <a:solidFill>
+                  <a:schemeClr val="accent1"/>
+                </a:solidFill>
+              </a14:hiddenFill>
+            </a:ext>
+            <a:ext uri="{91240B29-F687-4F45-9708-019B960494DF}">
+              <a14:hiddenLine xmlns:a14="http://schemas.microsoft.com/office/drawing/2010/main" w="9525">
+                <a:solidFill>
+                  <a:schemeClr val="tx1"/>
+                </a:solidFill>
+                <a:miter lim="800000"/>
+                <a:headEnd/>
+                <a:tailEnd/>
+              </a14:hiddenLine>
+            </a:ext>
+          </a:extLst>
+        </p:spPr>
+      </p:pic>
+      <p:pic>
+        <p:nvPicPr>
+          <p:cNvPr id="1030" name="Picture 6"/>
+          <p:cNvPicPr>
+            <a:picLocks noChangeAspect="1" noChangeArrowheads="1"/>
+          </p:cNvPicPr>
+          <p:nvPr/>
+        </p:nvPicPr>
+        <p:blipFill>
+          <a:blip r:embed="rId5">
+            <a:extLst>
+              <a:ext uri="{28A0092B-C50C-407E-A947-70E740481C1C}">
+                <a14:useLocalDpi xmlns:a14="http://schemas.microsoft.com/office/drawing/2010/main" val="0"/>
+              </a:ext>
+            </a:extLst>
+          </a:blip>
+          <a:srcRect/>
+          <a:stretch>
+            <a:fillRect/>
+          </a:stretch>
+        </p:blipFill>
+        <p:spPr bwMode="auto">
+          <a:xfrm>
+            <a:off x="7422045" y="2071187"/>
+            <a:ext cx="1941528" cy="1104900"/>
+          </a:xfrm>
+          <a:prstGeom prst="rect">
+            <a:avLst/>
+          </a:prstGeom>
+          <a:noFill/>
+          <a:ln>
+            <a:noFill/>
+          </a:ln>
+          <a:extLst>
+            <a:ext uri="{909E8E84-426E-40DD-AFC4-6F175D3DCCD1}">
+              <a14:hiddenFill xmlns:a14="http://schemas.microsoft.com/office/drawing/2010/main">
+                <a:solidFill>
+                  <a:schemeClr val="accent1"/>
+                </a:solidFill>
+              </a14:hiddenFill>
+            </a:ext>
+            <a:ext uri="{91240B29-F687-4F45-9708-019B960494DF}">
+              <a14:hiddenLine xmlns:a14="http://schemas.microsoft.com/office/drawing/2010/main" w="9525">
+                <a:solidFill>
+                  <a:schemeClr val="tx1"/>
+                </a:solidFill>
+                <a:miter lim="800000"/>
+                <a:headEnd/>
+                <a:tailEnd/>
+              </a14:hiddenLine>
+            </a:ext>
+          </a:extLst>
+        </p:spPr>
+      </p:pic>
+      <p:pic>
+        <p:nvPicPr>
+          <p:cNvPr id="1031" name="Picture 7" descr="C:\Users\Matti\Documents\game-programming-project\Saved\Screenshots\Windows\HighresScreenshot00002.png"/>
+          <p:cNvPicPr>
+            <a:picLocks noChangeAspect="1" noChangeArrowheads="1"/>
+          </p:cNvPicPr>
+          <p:nvPr/>
+        </p:nvPicPr>
+        <p:blipFill>
+          <a:blip r:embed="rId6" cstate="print">
+            <a:extLst>
+              <a:ext uri="{28A0092B-C50C-407E-A947-70E740481C1C}">
+                <a14:useLocalDpi xmlns:a14="http://schemas.microsoft.com/office/drawing/2010/main" val="0"/>
+              </a:ext>
+            </a:extLst>
+          </a:blip>
+          <a:srcRect/>
+          <a:stretch>
+            <a:fillRect/>
+          </a:stretch>
+        </p:blipFill>
+        <p:spPr bwMode="auto">
+          <a:xfrm>
+            <a:off x="524444" y="4103185"/>
+            <a:ext cx="3109425" cy="2179964"/>
+          </a:xfrm>
+          <a:prstGeom prst="rect">
+            <a:avLst/>
+          </a:prstGeom>
+          <a:noFill/>
+          <a:extLst>
+            <a:ext uri="{909E8E84-426E-40DD-AFC4-6F175D3DCCD1}">
+              <a14:hiddenFill xmlns:a14="http://schemas.microsoft.com/office/drawing/2010/main">
+                <a:solidFill>
+                  <a:srgbClr val="FFFFFF"/>
+                </a:solidFill>
+              </a14:hiddenFill>
+            </a:ext>
+          </a:extLst>
+        </p:spPr>
+      </p:pic>
+      <p:pic>
+        <p:nvPicPr>
+          <p:cNvPr id="1032" name="Picture 8"/>
+          <p:cNvPicPr>
+            <a:picLocks noChangeAspect="1" noChangeArrowheads="1"/>
+          </p:cNvPicPr>
+          <p:nvPr/>
+        </p:nvPicPr>
+        <p:blipFill>
+          <a:blip r:embed="rId7" cstate="print">
+            <a:extLst>
+              <a:ext uri="{28A0092B-C50C-407E-A947-70E740481C1C}">
+                <a14:useLocalDpi xmlns:a14="http://schemas.microsoft.com/office/drawing/2010/main" val="0"/>
+              </a:ext>
+            </a:extLst>
+          </a:blip>
+          <a:srcRect/>
+          <a:stretch>
+            <a:fillRect/>
+          </a:stretch>
+        </p:blipFill>
+        <p:spPr bwMode="auto">
+          <a:xfrm>
+            <a:off x="3633869" y="4089452"/>
+            <a:ext cx="2982458" cy="2178653"/>
+          </a:xfrm>
+          <a:prstGeom prst="rect">
+            <a:avLst/>
+          </a:prstGeom>
+          <a:noFill/>
+          <a:ln>
+            <a:noFill/>
+          </a:ln>
+          <a:extLst>
+            <a:ext uri="{909E8E84-426E-40DD-AFC4-6F175D3DCCD1}">
+              <a14:hiddenFill xmlns:a14="http://schemas.microsoft.com/office/drawing/2010/main">
+                <a:solidFill>
+                  <a:schemeClr val="accent1"/>
+                </a:solidFill>
+              </a14:hiddenFill>
+            </a:ext>
+            <a:ext uri="{91240B29-F687-4F45-9708-019B960494DF}">
+              <a14:hiddenLine xmlns:a14="http://schemas.microsoft.com/office/drawing/2010/main" w="9525">
+                <a:solidFill>
+                  <a:schemeClr val="tx1"/>
+                </a:solidFill>
+                <a:miter lim="800000"/>
+                <a:headEnd/>
+                <a:tailEnd/>
+              </a14:hiddenLine>
+            </a:ext>
+          </a:extLst>
+        </p:spPr>
+      </p:pic>
+      <p:pic>
+        <p:nvPicPr>
+          <p:cNvPr id="1033" name="Picture 9" descr="C:\Users\Matti\Documents\game-programming-project\Saved\Screenshots\Windows\HighresScreenshot00003.png"/>
+          <p:cNvPicPr>
+            <a:picLocks noChangeAspect="1" noChangeArrowheads="1"/>
+          </p:cNvPicPr>
+          <p:nvPr/>
+        </p:nvPicPr>
+        <p:blipFill>
+          <a:blip r:embed="rId8" cstate="print">
+            <a:extLst>
+              <a:ext uri="{28A0092B-C50C-407E-A947-70E740481C1C}">
+                <a14:useLocalDpi xmlns:a14="http://schemas.microsoft.com/office/drawing/2010/main" val="0"/>
+              </a:ext>
+            </a:extLst>
+          </a:blip>
+          <a:srcRect/>
+          <a:stretch>
+            <a:fillRect/>
+          </a:stretch>
+        </p:blipFill>
+        <p:spPr bwMode="auto">
+          <a:xfrm>
+            <a:off x="6616327" y="4103185"/>
+            <a:ext cx="3038634" cy="2164920"/>
+          </a:xfrm>
+          <a:prstGeom prst="rect">
+            <a:avLst/>
+          </a:prstGeom>
+          <a:noFill/>
+          <a:extLst>
+            <a:ext uri="{909E8E84-426E-40DD-AFC4-6F175D3DCCD1}">
+              <a14:hiddenFill xmlns:a14="http://schemas.microsoft.com/office/drawing/2010/main">
+                <a:solidFill>
+                  <a:srgbClr val="FFFFFF"/>
+                </a:solidFill>
+              </a14:hiddenFill>
+            </a:ext>
+          </a:extLst>
+        </p:spPr>
+      </p:pic>
     </p:spTree>
     <p:extLst>
       <p:ext uri="{BB962C8B-B14F-4D97-AF65-F5344CB8AC3E}">
@@ -9844,7 +10186,7 @@
   <a:extraClrSchemeLst/>
   <a:extLst>
     <a:ext uri="{05A4C25C-085E-4340-85A3-A5531E510DB2}">
-      <thm15:themeFamily xmlns:thm15="http://schemas.microsoft.com/office/thememl/2012/main" name="Facet" id="{C0C680CD-088A-49FC-A102-D699147F32B2}" vid="{8C59B386-999D-4CB6-B907-9F3997C027CC}"/>
+      <thm15:themeFamily xmlns:thm15="http://schemas.microsoft.com/office/thememl/2012/main" xmlns="" name="Facet" id="{C0C680CD-088A-49FC-A102-D699147F32B2}" vid="{8C59B386-999D-4CB6-B907-9F3997C027CC}"/>
     </a:ext>
   </a:extLst>
 </a:theme>

</xml_diff>

<commit_message>
more work on powerpoint
</commit_message>
<xml_diff>
--- a/TopdownGame.pptx
+++ b/TopdownGame.pptx
@@ -7,16 +7,19 @@
   <p:sldIdLst>
     <p:sldId id="256" r:id="rId2"/>
     <p:sldId id="257" r:id="rId3"/>
-    <p:sldId id="258" r:id="rId4"/>
-    <p:sldId id="259" r:id="rId5"/>
-    <p:sldId id="260" r:id="rId6"/>
-    <p:sldId id="266" r:id="rId7"/>
-    <p:sldId id="261" r:id="rId8"/>
-    <p:sldId id="262" r:id="rId9"/>
-    <p:sldId id="265" r:id="rId10"/>
-    <p:sldId id="263" r:id="rId11"/>
-    <p:sldId id="267" r:id="rId12"/>
-    <p:sldId id="264" r:id="rId13"/>
+    <p:sldId id="270" r:id="rId4"/>
+    <p:sldId id="258" r:id="rId5"/>
+    <p:sldId id="259" r:id="rId6"/>
+    <p:sldId id="260" r:id="rId7"/>
+    <p:sldId id="266" r:id="rId8"/>
+    <p:sldId id="268" r:id="rId9"/>
+    <p:sldId id="269" r:id="rId10"/>
+    <p:sldId id="261" r:id="rId11"/>
+    <p:sldId id="262" r:id="rId12"/>
+    <p:sldId id="265" r:id="rId13"/>
+    <p:sldId id="263" r:id="rId14"/>
+    <p:sldId id="267" r:id="rId15"/>
+    <p:sldId id="264" r:id="rId16"/>
   </p:sldIdLst>
   <p:sldSz cx="12192000" cy="6858000"/>
   <p:notesSz cx="6858000" cy="9144000"/>
@@ -117,7 +120,7 @@
   </p:defaultTextStyle>
   <p:extLst>
     <p:ext uri="{EFAFB233-063F-42B5-8137-9DF3F51BA10A}">
-      <p15:sldGuideLst xmlns:p15="http://schemas.microsoft.com/office/powerpoint/2012/main" xmlns=""/>
+      <p15:sldGuideLst xmlns="" xmlns:p15="http://schemas.microsoft.com/office/powerpoint/2012/main"/>
     </p:ext>
   </p:extLst>
 </p:presentation>
@@ -5988,10 +5991,10 @@
           <a:lstStyle/>
           <a:p>
             <a:r>
-              <a:rPr lang="fi-FI" dirty="0" err="1" smtClean="0"/>
-              <a:t>Problems</a:t>
-            </a:r>
-            <a:endParaRPr lang="en-US" dirty="0"/>
+              <a:rPr lang="fi-FI" dirty="0" smtClean="0"/>
+              <a:t>Project premise</a:t>
+            </a:r>
+            <a:endParaRPr lang="fi-FI" dirty="0"/>
           </a:p>
         </p:txBody>
       </p:sp>
@@ -6007,8 +6010,8 @@
         </p:nvSpPr>
         <p:spPr>
           <a:xfrm>
-            <a:off x="677334" y="1602223"/>
-            <a:ext cx="8596668" cy="4919958"/>
+            <a:off x="677333" y="1602223"/>
+            <a:ext cx="8677059" cy="4439139"/>
           </a:xfrm>
         </p:spPr>
         <p:txBody>
@@ -6016,8 +6019,35 @@
           <a:lstStyle/>
           <a:p>
             <a:r>
-              <a:rPr lang="fi-FI" dirty="0" err="1" smtClean="0"/>
-              <a:t>Tried</a:t>
+              <a:rPr lang="fi-FI" dirty="0" smtClean="0"/>
+              <a:t>Little </a:t>
+            </a:r>
+            <a:r>
+              <a:rPr lang="fi-FI" dirty="0" err="1" smtClean="0"/>
+              <a:t>previous</a:t>
+            </a:r>
+            <a:r>
+              <a:rPr lang="fi-FI" dirty="0" smtClean="0"/>
+              <a:t> </a:t>
+            </a:r>
+            <a:r>
+              <a:rPr lang="fi-FI" dirty="0" err="1" smtClean="0"/>
+              <a:t>Unreal</a:t>
+            </a:r>
+            <a:r>
+              <a:rPr lang="fi-FI" dirty="0" smtClean="0"/>
+              <a:t> Engine 4 </a:t>
+            </a:r>
+            <a:r>
+              <a:rPr lang="fi-FI" dirty="0" err="1" smtClean="0"/>
+              <a:t>experience</a:t>
+            </a:r>
+            <a:endParaRPr lang="fi-FI" dirty="0" smtClean="0"/>
+          </a:p>
+          <a:p>
+            <a:r>
+              <a:rPr lang="fi-FI" dirty="0" err="1" smtClean="0"/>
+              <a:t>Wanted</a:t>
             </a:r>
             <a:r>
               <a:rPr lang="fi-FI" dirty="0" smtClean="0"/>
@@ -6029,7 +6059,86 @@
             </a:r>
             <a:r>
               <a:rPr lang="fi-FI" dirty="0" smtClean="0"/>
-              <a:t> C++ </a:t>
+              <a:t> </a:t>
+            </a:r>
+            <a:r>
+              <a:rPr lang="fi-FI" dirty="0" err="1" smtClean="0"/>
+              <a:t>Unreal</a:t>
+            </a:r>
+            <a:r>
+              <a:rPr lang="fi-FI" dirty="0" smtClean="0"/>
+              <a:t> Engine 4 </a:t>
+            </a:r>
+            <a:r>
+              <a:rPr lang="en-US" dirty="0" smtClean="0"/>
+              <a:t>because</a:t>
+            </a:r>
+            <a:r>
+              <a:rPr lang="fi-FI" dirty="0" smtClean="0"/>
+              <a:t> it </a:t>
+            </a:r>
+            <a:r>
+              <a:rPr lang="fi-FI" dirty="0" err="1" smtClean="0"/>
+              <a:t>seemed</a:t>
+            </a:r>
+            <a:r>
+              <a:rPr lang="fi-FI" dirty="0" smtClean="0"/>
+              <a:t> </a:t>
+            </a:r>
+            <a:r>
+              <a:rPr lang="fi-FI" dirty="0" err="1" smtClean="0"/>
+              <a:t>better</a:t>
+            </a:r>
+            <a:r>
+              <a:rPr lang="fi-FI" dirty="0" smtClean="0"/>
+              <a:t> </a:t>
+            </a:r>
+            <a:r>
+              <a:rPr lang="fi-FI" dirty="0" err="1" smtClean="0"/>
+              <a:t>than</a:t>
+            </a:r>
+            <a:r>
+              <a:rPr lang="fi-FI" dirty="0" smtClean="0"/>
+              <a:t> </a:t>
+            </a:r>
+            <a:r>
+              <a:rPr lang="fi-FI" dirty="0" err="1" smtClean="0"/>
+              <a:t>Unity</a:t>
+            </a:r>
+            <a:endParaRPr lang="fi-FI" dirty="0" smtClean="0"/>
+          </a:p>
+          <a:p>
+            <a:r>
+              <a:rPr lang="fi-FI" dirty="0" err="1"/>
+              <a:t>Had</a:t>
+            </a:r>
+            <a:r>
+              <a:rPr lang="fi-FI" dirty="0"/>
+              <a:t> </a:t>
+            </a:r>
+            <a:r>
+              <a:rPr lang="fi-FI" dirty="0" err="1"/>
+              <a:t>few</a:t>
+            </a:r>
+            <a:r>
+              <a:rPr lang="fi-FI" dirty="0"/>
+              <a:t> </a:t>
+            </a:r>
+            <a:r>
+              <a:rPr lang="fi-FI" dirty="0" err="1"/>
+              <a:t>game</a:t>
+            </a:r>
+            <a:r>
+              <a:rPr lang="fi-FI" dirty="0"/>
+              <a:t> </a:t>
+            </a:r>
+            <a:r>
+              <a:rPr lang="fi-FI" dirty="0" err="1" smtClean="0"/>
+              <a:t>ideas</a:t>
+            </a:r>
+            <a:r>
+              <a:rPr lang="fi-FI" dirty="0" smtClean="0"/>
+              <a:t> </a:t>
             </a:r>
             <a:r>
               <a:rPr lang="fi-FI" dirty="0" err="1" smtClean="0"/>
@@ -6041,277 +6150,15 @@
             </a:r>
             <a:r>
               <a:rPr lang="fi-FI" dirty="0" err="1" smtClean="0"/>
-              <a:t>ran</a:t>
-            </a:r>
-            <a:r>
-              <a:rPr lang="fi-FI" dirty="0" smtClean="0"/>
-              <a:t> into </a:t>
-            </a:r>
-            <a:r>
-              <a:rPr lang="fi-FI" dirty="0" err="1" smtClean="0"/>
-              <a:t>problems</a:t>
-            </a:r>
-            <a:r>
-              <a:rPr lang="fi-FI" dirty="0" smtClean="0"/>
-              <a:t> </a:t>
-            </a:r>
-            <a:r>
-              <a:rPr lang="fi-FI" dirty="0" err="1" smtClean="0"/>
-              <a:t>with</a:t>
-            </a:r>
-            <a:r>
-              <a:rPr lang="fi-FI" dirty="0" smtClean="0"/>
-              <a:t> </a:t>
-            </a:r>
-            <a:r>
-              <a:rPr lang="fi-FI" dirty="0" err="1" smtClean="0"/>
-              <a:t>Blueprint</a:t>
-            </a:r>
-            <a:r>
-              <a:rPr lang="fi-FI" dirty="0" smtClean="0"/>
-              <a:t> </a:t>
-            </a:r>
-            <a:r>
-              <a:rPr lang="fi-FI" dirty="0" err="1" smtClean="0"/>
-              <a:t>integration</a:t>
-            </a:r>
-            <a:r>
-              <a:rPr lang="fi-FI" dirty="0" smtClean="0"/>
-              <a:t> and </a:t>
-            </a:r>
-            <a:r>
-              <a:rPr lang="fi-FI" dirty="0" err="1" smtClean="0"/>
-              <a:t>hot-reloading</a:t>
-            </a:r>
-            <a:endParaRPr lang="fi-FI" dirty="0" smtClean="0"/>
-          </a:p>
-          <a:p>
-            <a:r>
-              <a:rPr lang="fi-FI" dirty="0" err="1" smtClean="0"/>
-              <a:t>Unreal</a:t>
-            </a:r>
-            <a:r>
-              <a:rPr lang="fi-FI" dirty="0" smtClean="0"/>
-              <a:t> Engine 4</a:t>
-            </a:r>
-          </a:p>
-          <a:p>
-            <a:pPr lvl="1"/>
-            <a:r>
-              <a:rPr lang="fi-FI" dirty="0" err="1" smtClean="0"/>
-              <a:t>Many</a:t>
-            </a:r>
-            <a:r>
-              <a:rPr lang="fi-FI" dirty="0" smtClean="0"/>
-              <a:t> </a:t>
-            </a:r>
-            <a:r>
-              <a:rPr lang="fi-FI" dirty="0" err="1"/>
-              <a:t>c</a:t>
-            </a:r>
-            <a:r>
-              <a:rPr lang="fi-FI" dirty="0" err="1" smtClean="0"/>
-              <a:t>rashes</a:t>
-            </a:r>
-            <a:r>
-              <a:rPr lang="fi-FI" dirty="0" smtClean="0"/>
-              <a:t> and </a:t>
-            </a:r>
-            <a:r>
-              <a:rPr lang="fi-FI" dirty="0" err="1" smtClean="0"/>
-              <a:t>memory</a:t>
-            </a:r>
-            <a:r>
-              <a:rPr lang="fi-FI" dirty="0" smtClean="0"/>
-              <a:t> </a:t>
-            </a:r>
-            <a:r>
-              <a:rPr lang="fi-FI" dirty="0" err="1" smtClean="0"/>
-              <a:t>leaks</a:t>
-            </a:r>
-            <a:endParaRPr lang="fi-FI" dirty="0" smtClean="0"/>
-          </a:p>
-          <a:p>
-            <a:pPr lvl="1"/>
-            <a:r>
-              <a:rPr lang="fi-FI" dirty="0" err="1" smtClean="0"/>
-              <a:t>Likes</a:t>
-            </a:r>
-            <a:r>
-              <a:rPr lang="fi-FI" dirty="0" smtClean="0"/>
-              <a:t> to </a:t>
-            </a:r>
-            <a:r>
-              <a:rPr lang="fi-FI" dirty="0" err="1" smtClean="0"/>
-              <a:t>modify</a:t>
-            </a:r>
-            <a:r>
-              <a:rPr lang="fi-FI" dirty="0" smtClean="0"/>
-              <a:t> </a:t>
-            </a:r>
-            <a:r>
-              <a:rPr lang="fi-FI" dirty="0" err="1" smtClean="0"/>
-              <a:t>files</a:t>
-            </a:r>
-            <a:r>
-              <a:rPr lang="fi-FI" dirty="0" smtClean="0"/>
-              <a:t> </a:t>
-            </a:r>
-            <a:r>
-              <a:rPr lang="fi-FI" dirty="0" err="1" smtClean="0"/>
-              <a:t>randomly</a:t>
-            </a:r>
-            <a:r>
-              <a:rPr lang="fi-FI" dirty="0" smtClean="0"/>
-              <a:t> =&gt; version </a:t>
-            </a:r>
-            <a:r>
-              <a:rPr lang="fi-FI" dirty="0" err="1" smtClean="0"/>
-              <a:t>control</a:t>
-            </a:r>
-            <a:r>
-              <a:rPr lang="fi-FI" dirty="0" smtClean="0"/>
-              <a:t> </a:t>
-            </a:r>
-            <a:r>
-              <a:rPr lang="fi-FI" dirty="0" err="1" smtClean="0"/>
-              <a:t>usage</a:t>
-            </a:r>
-            <a:r>
-              <a:rPr lang="fi-FI" dirty="0" smtClean="0"/>
-              <a:t> </a:t>
-            </a:r>
-            <a:r>
-              <a:rPr lang="fi-FI" dirty="0" err="1" smtClean="0"/>
-              <a:t>harder</a:t>
-            </a:r>
-            <a:endParaRPr lang="fi-FI" dirty="0" smtClean="0"/>
-          </a:p>
-          <a:p>
-            <a:pPr lvl="1"/>
-            <a:r>
-              <a:rPr lang="fi-FI" dirty="0" err="1" smtClean="0"/>
-              <a:t>Blueprints</a:t>
-            </a:r>
-            <a:r>
-              <a:rPr lang="fi-FI" dirty="0" smtClean="0"/>
-              <a:t> </a:t>
-            </a:r>
-            <a:r>
-              <a:rPr lang="fi-FI" dirty="0" err="1" smtClean="0"/>
-              <a:t>are</a:t>
-            </a:r>
-            <a:r>
-              <a:rPr lang="fi-FI" dirty="0" smtClean="0"/>
-              <a:t> </a:t>
-            </a:r>
-            <a:r>
-              <a:rPr lang="fi-FI" dirty="0" err="1" smtClean="0"/>
-              <a:t>binary</a:t>
-            </a:r>
-            <a:r>
-              <a:rPr lang="fi-FI" dirty="0" smtClean="0"/>
-              <a:t> </a:t>
-            </a:r>
-            <a:r>
-              <a:rPr lang="fi-FI" dirty="0" err="1" smtClean="0"/>
-              <a:t>files</a:t>
-            </a:r>
-            <a:r>
-              <a:rPr lang="fi-FI" dirty="0" smtClean="0"/>
-              <a:t> =&gt; </a:t>
-            </a:r>
-            <a:r>
-              <a:rPr lang="fi-FI" dirty="0" err="1" smtClean="0"/>
-              <a:t>developers</a:t>
-            </a:r>
-            <a:r>
-              <a:rPr lang="fi-FI" dirty="0" smtClean="0"/>
-              <a:t> </a:t>
-            </a:r>
-            <a:r>
-              <a:rPr lang="fi-FI" dirty="0" err="1" smtClean="0"/>
-              <a:t>can’t</a:t>
-            </a:r>
-            <a:r>
-              <a:rPr lang="fi-FI" dirty="0" smtClean="0"/>
-              <a:t> </a:t>
-            </a:r>
-            <a:r>
-              <a:rPr lang="fi-FI" dirty="0" err="1" smtClean="0"/>
-              <a:t>modify</a:t>
-            </a:r>
-            <a:r>
-              <a:rPr lang="fi-FI" dirty="0" smtClean="0"/>
-              <a:t> </a:t>
-            </a:r>
-            <a:r>
-              <a:rPr lang="fi-FI" dirty="0" err="1" smtClean="0"/>
-              <a:t>them</a:t>
-            </a:r>
-            <a:r>
-              <a:rPr lang="fi-FI" dirty="0" smtClean="0"/>
-              <a:t> </a:t>
-            </a:r>
-            <a:r>
-              <a:rPr lang="fi-FI" dirty="0" err="1" smtClean="0"/>
-              <a:t>simultaneosly</a:t>
-            </a:r>
-            <a:endParaRPr lang="fi-FI" dirty="0" smtClean="0"/>
-          </a:p>
-          <a:p>
-            <a:pPr lvl="2"/>
-            <a:r>
-              <a:rPr lang="fi-FI" dirty="0" err="1" smtClean="0"/>
-              <a:t>Merge</a:t>
-            </a:r>
-            <a:r>
-              <a:rPr lang="fi-FI" dirty="0" smtClean="0"/>
-              <a:t> </a:t>
-            </a:r>
-            <a:r>
-              <a:rPr lang="fi-FI" dirty="0" err="1" smtClean="0"/>
-              <a:t>tool</a:t>
-            </a:r>
-            <a:r>
-              <a:rPr lang="fi-FI" dirty="0" smtClean="0"/>
-              <a:t> </a:t>
-            </a:r>
-            <a:r>
-              <a:rPr lang="fi-FI" dirty="0" err="1" smtClean="0"/>
-              <a:t>added</a:t>
-            </a:r>
-            <a:r>
-              <a:rPr lang="fi-FI" dirty="0" smtClean="0"/>
-              <a:t> in 4.7 </a:t>
-            </a:r>
-            <a:r>
-              <a:rPr lang="fi-FI" dirty="0" err="1" smtClean="0"/>
-              <a:t>but</a:t>
-            </a:r>
-            <a:r>
-              <a:rPr lang="fi-FI" dirty="0" smtClean="0"/>
-              <a:t> </a:t>
-            </a:r>
-            <a:r>
-              <a:rPr lang="fi-FI" dirty="0" err="1" smtClean="0"/>
-              <a:t>doesn’t</a:t>
-            </a:r>
-            <a:r>
-              <a:rPr lang="fi-FI" dirty="0" smtClean="0"/>
-              <a:t> </a:t>
-            </a:r>
-            <a:r>
-              <a:rPr lang="fi-FI" dirty="0" err="1" smtClean="0"/>
-              <a:t>work</a:t>
-            </a:r>
-            <a:r>
-              <a:rPr lang="fi-FI" dirty="0" smtClean="0"/>
-              <a:t> </a:t>
-            </a:r>
-            <a:r>
-              <a:rPr lang="fi-FI" dirty="0" err="1" smtClean="0"/>
-              <a:t>all</a:t>
+              <a:t>this</a:t>
+            </a:r>
+            <a:r>
+              <a:rPr lang="fi-FI" dirty="0" smtClean="0"/>
+              <a:t> </a:t>
+            </a:r>
+            <a:r>
+              <a:rPr lang="fi-FI" dirty="0" err="1" smtClean="0"/>
+              <a:t>seemed</a:t>
             </a:r>
             <a:r>
               <a:rPr lang="fi-FI" dirty="0" smtClean="0"/>
@@ -6327,204 +6174,58 @@
             </a:r>
             <a:r>
               <a:rPr lang="fi-FI" dirty="0" err="1" smtClean="0"/>
+              <a:t>most</a:t>
+            </a:r>
+            <a:r>
+              <a:rPr lang="fi-FI" dirty="0" smtClean="0"/>
+              <a:t> </a:t>
+            </a:r>
+            <a:r>
+              <a:rPr lang="fi-FI" dirty="0" err="1" smtClean="0"/>
+              <a:t>doable</a:t>
+            </a:r>
+            <a:r>
+              <a:rPr lang="fi-FI" dirty="0"/>
+              <a:t> </a:t>
+            </a:r>
+            <a:r>
+              <a:rPr lang="fi-FI" dirty="0" smtClean="0"/>
+              <a:t>in </a:t>
+            </a:r>
+            <a:r>
+              <a:rPr lang="fi-FI" dirty="0" err="1" smtClean="0"/>
+              <a:t>the</a:t>
+            </a:r>
+            <a:r>
+              <a:rPr lang="fi-FI" dirty="0" smtClean="0"/>
+              <a:t> </a:t>
+            </a:r>
+            <a:r>
+              <a:rPr lang="fi-FI" dirty="0" err="1" smtClean="0"/>
+              <a:t>course</a:t>
+            </a:r>
+            <a:r>
+              <a:rPr lang="fi-FI" dirty="0" smtClean="0"/>
+              <a:t> </a:t>
+            </a:r>
+            <a:r>
+              <a:rPr lang="fi-FI" dirty="0" err="1" smtClean="0"/>
               <a:t>time</a:t>
             </a:r>
-            <a:endParaRPr lang="fi-FI" dirty="0" smtClean="0"/>
-          </a:p>
-          <a:p>
-            <a:pPr lvl="1"/>
-            <a:r>
-              <a:rPr lang="fi-FI" dirty="0" err="1" smtClean="0"/>
-              <a:t>Blueprint</a:t>
-            </a:r>
-            <a:r>
-              <a:rPr lang="fi-FI" dirty="0" smtClean="0"/>
-              <a:t> </a:t>
-            </a:r>
-            <a:r>
-              <a:rPr lang="fi-FI" dirty="0" err="1" smtClean="0"/>
-              <a:t>debugging</a:t>
-            </a:r>
-            <a:endParaRPr lang="fi-FI" dirty="0" smtClean="0"/>
-          </a:p>
-          <a:p>
-            <a:pPr lvl="2"/>
-            <a:r>
-              <a:rPr lang="fi-FI" dirty="0" smtClean="0"/>
-              <a:t>No </a:t>
-            </a:r>
-            <a:r>
-              <a:rPr lang="fi-FI" dirty="0" err="1" smtClean="0"/>
-              <a:t>step</a:t>
-            </a:r>
-            <a:r>
-              <a:rPr lang="fi-FI" dirty="0" smtClean="0"/>
-              <a:t> </a:t>
-            </a:r>
-            <a:r>
-              <a:rPr lang="fi-FI" dirty="0" err="1" smtClean="0"/>
-              <a:t>over</a:t>
+            <a:r>
+              <a:rPr lang="fi-FI" dirty="0" smtClean="0"/>
+              <a:t> </a:t>
+            </a:r>
+            <a:r>
+              <a:rPr lang="fi-FI" dirty="0" err="1" smtClean="0"/>
+              <a:t>frame</a:t>
             </a:r>
             <a:endParaRPr lang="fi-FI" dirty="0"/>
           </a:p>
           <a:p>
-            <a:pPr lvl="2"/>
-            <a:r>
-              <a:rPr lang="fi-FI" dirty="0" err="1" smtClean="0"/>
-              <a:t>Watching</a:t>
-            </a:r>
-            <a:r>
-              <a:rPr lang="fi-FI" dirty="0" smtClean="0"/>
-              <a:t> </a:t>
-            </a:r>
-            <a:r>
-              <a:rPr lang="fi-FI" dirty="0" err="1" smtClean="0"/>
-              <a:t>values</a:t>
-            </a:r>
-            <a:r>
-              <a:rPr lang="fi-FI" dirty="0" smtClean="0"/>
-              <a:t> </a:t>
-            </a:r>
-            <a:r>
-              <a:rPr lang="fi-FI" dirty="0" err="1" smtClean="0"/>
-              <a:t>doesn’t</a:t>
-            </a:r>
-            <a:r>
-              <a:rPr lang="fi-FI" dirty="0" smtClean="0"/>
-              <a:t> </a:t>
-            </a:r>
-            <a:r>
-              <a:rPr lang="fi-FI" dirty="0" err="1" smtClean="0"/>
-              <a:t>work</a:t>
-            </a:r>
-            <a:r>
-              <a:rPr lang="fi-FI" dirty="0" smtClean="0"/>
-              <a:t> </a:t>
-            </a:r>
-            <a:r>
-              <a:rPr lang="fi-FI" dirty="0" err="1" smtClean="0"/>
-              <a:t>half</a:t>
-            </a:r>
-            <a:r>
-              <a:rPr lang="fi-FI" dirty="0" smtClean="0"/>
-              <a:t> </a:t>
-            </a:r>
-            <a:r>
-              <a:rPr lang="fi-FI" dirty="0" err="1" smtClean="0"/>
-              <a:t>the</a:t>
-            </a:r>
-            <a:r>
-              <a:rPr lang="fi-FI" dirty="0" smtClean="0"/>
-              <a:t> </a:t>
-            </a:r>
-            <a:r>
-              <a:rPr lang="fi-FI" dirty="0" err="1" smtClean="0"/>
-              <a:t>time</a:t>
-            </a:r>
-            <a:endParaRPr lang="fi-FI" dirty="0" smtClean="0"/>
-          </a:p>
-          <a:p>
-            <a:pPr lvl="1"/>
-            <a:r>
-              <a:rPr lang="fi-FI" dirty="0" err="1" smtClean="0"/>
-              <a:t>Blueprints</a:t>
-            </a:r>
-            <a:r>
-              <a:rPr lang="fi-FI" dirty="0" smtClean="0"/>
-              <a:t> </a:t>
-            </a:r>
-            <a:r>
-              <a:rPr lang="fi-FI" dirty="0" err="1" smtClean="0"/>
-              <a:t>start</a:t>
-            </a:r>
-            <a:r>
-              <a:rPr lang="fi-FI" dirty="0" smtClean="0"/>
-              <a:t> to </a:t>
-            </a:r>
-            <a:r>
-              <a:rPr lang="fi-FI" dirty="0" err="1" smtClean="0"/>
-              <a:t>fail</a:t>
-            </a:r>
-            <a:r>
-              <a:rPr lang="fi-FI" dirty="0" smtClean="0"/>
-              <a:t> </a:t>
-            </a:r>
-            <a:r>
-              <a:rPr lang="fi-FI" dirty="0" err="1" smtClean="0"/>
-              <a:t>compiling</a:t>
-            </a:r>
-            <a:r>
-              <a:rPr lang="fi-FI" dirty="0" smtClean="0"/>
-              <a:t> and </a:t>
-            </a:r>
-            <a:r>
-              <a:rPr lang="fi-FI" dirty="0" err="1" smtClean="0"/>
-              <a:t>saving</a:t>
-            </a:r>
-            <a:r>
-              <a:rPr lang="fi-FI" dirty="0" smtClean="0"/>
-              <a:t> </a:t>
-            </a:r>
-            <a:r>
-              <a:rPr lang="fi-FI" dirty="0" err="1" smtClean="0"/>
-              <a:t>randomly</a:t>
-            </a:r>
-            <a:endParaRPr lang="fi-FI" dirty="0" smtClean="0"/>
-          </a:p>
-          <a:p>
-            <a:pPr lvl="1"/>
-            <a:r>
-              <a:rPr lang="fi-FI" dirty="0" err="1" smtClean="0"/>
-              <a:t>Bad</a:t>
-            </a:r>
-            <a:r>
-              <a:rPr lang="fi-FI" dirty="0" smtClean="0"/>
-              <a:t> </a:t>
-            </a:r>
-            <a:r>
-              <a:rPr lang="fi-FI" dirty="0" err="1" smtClean="0"/>
-              <a:t>error</a:t>
-            </a:r>
-            <a:r>
-              <a:rPr lang="fi-FI" dirty="0" smtClean="0"/>
-              <a:t> </a:t>
-            </a:r>
-            <a:r>
-              <a:rPr lang="fi-FI" dirty="0" err="1" smtClean="0"/>
-              <a:t>messages</a:t>
-            </a:r>
-            <a:r>
-              <a:rPr lang="fi-FI" dirty="0" smtClean="0"/>
-              <a:t> and </a:t>
-            </a:r>
-            <a:r>
-              <a:rPr lang="fi-FI" dirty="0" err="1" smtClean="0"/>
-              <a:t>stuff</a:t>
-            </a:r>
-            <a:r>
-              <a:rPr lang="fi-FI" dirty="0" smtClean="0"/>
-              <a:t> </a:t>
-            </a:r>
-            <a:r>
-              <a:rPr lang="fi-FI" dirty="0" err="1" smtClean="0"/>
-              <a:t>likes</a:t>
-            </a:r>
-            <a:r>
-              <a:rPr lang="fi-FI" dirty="0" smtClean="0"/>
-              <a:t> to </a:t>
-            </a:r>
-            <a:r>
-              <a:rPr lang="fi-FI" dirty="0" err="1" smtClean="0"/>
-              <a:t>fail</a:t>
-            </a:r>
-            <a:r>
-              <a:rPr lang="fi-FI" dirty="0" smtClean="0"/>
-              <a:t> </a:t>
-            </a:r>
-            <a:r>
-              <a:rPr lang="fi-FI" dirty="0" err="1" smtClean="0"/>
-              <a:t>silently</a:t>
-            </a:r>
+            <a:endParaRPr lang="fi-FI" dirty="0"/>
+          </a:p>
+          <a:p>
             <a:endParaRPr lang="fi-FI" dirty="0" smtClean="0"/>
           </a:p>
         </p:txBody>
@@ -6532,7 +6233,7 @@
     </p:spTree>
     <p:extLst>
       <p:ext uri="{BB962C8B-B14F-4D97-AF65-F5344CB8AC3E}">
-        <p14:creationId xmlns:p14="http://schemas.microsoft.com/office/powerpoint/2010/main" val="2574674859"/>
+        <p14:creationId xmlns:p14="http://schemas.microsoft.com/office/powerpoint/2010/main" val="2970324139"/>
       </p:ext>
     </p:extLst>
   </p:cSld>
@@ -6583,23 +6284,15 @@
           <a:p>
             <a:r>
               <a:rPr lang="fi-FI" dirty="0" err="1" smtClean="0"/>
-              <a:t>What</a:t>
-            </a:r>
-            <a:r>
-              <a:rPr lang="fi-FI" dirty="0" smtClean="0"/>
-              <a:t> </a:t>
-            </a:r>
-            <a:r>
-              <a:rPr lang="fi-FI" dirty="0" err="1" smtClean="0"/>
-              <a:t>we</a:t>
-            </a:r>
-            <a:r>
-              <a:rPr lang="fi-FI" dirty="0" smtClean="0"/>
-              <a:t> </a:t>
-            </a:r>
-            <a:r>
-              <a:rPr lang="fi-FI" dirty="0" err="1" smtClean="0"/>
-              <a:t>learned</a:t>
+              <a:t>Development</a:t>
+            </a:r>
+            <a:r>
+              <a:rPr lang="fi-FI" dirty="0" smtClean="0"/>
+              <a:t> </a:t>
+            </a:r>
+            <a:r>
+              <a:rPr lang="fi-FI" dirty="0" err="1" smtClean="0"/>
+              <a:t>process</a:t>
             </a:r>
             <a:endParaRPr lang="en-US" dirty="0"/>
           </a:p>
@@ -6622,54 +6315,1148 @@
           <a:p>
             <a:r>
               <a:rPr lang="fi-FI" dirty="0" err="1" smtClean="0"/>
+              <a:t>Developed</a:t>
+            </a:r>
+            <a:r>
+              <a:rPr lang="fi-FI" dirty="0" smtClean="0"/>
+              <a:t> </a:t>
+            </a:r>
+            <a:r>
+              <a:rPr lang="fi-FI" dirty="0" err="1" smtClean="0"/>
+              <a:t>some</a:t>
+            </a:r>
+            <a:r>
+              <a:rPr lang="fi-FI" dirty="0" smtClean="0"/>
+              <a:t> </a:t>
+            </a:r>
+            <a:r>
+              <a:rPr lang="fi-FI" dirty="0" err="1" smtClean="0"/>
+              <a:t>amount</a:t>
+            </a:r>
+            <a:r>
+              <a:rPr lang="fi-FI" dirty="0" smtClean="0"/>
+              <a:t> at </a:t>
+            </a:r>
+            <a:r>
+              <a:rPr lang="fi-FI" dirty="0" err="1" smtClean="0"/>
+              <a:t>school</a:t>
+            </a:r>
+            <a:r>
+              <a:rPr lang="fi-FI" dirty="0" smtClean="0"/>
+              <a:t> </a:t>
+            </a:r>
+            <a:r>
+              <a:rPr lang="fi-FI" dirty="0" err="1" smtClean="0"/>
+              <a:t>but</a:t>
+            </a:r>
+            <a:r>
+              <a:rPr lang="fi-FI" dirty="0" smtClean="0"/>
+              <a:t> </a:t>
+            </a:r>
+            <a:r>
+              <a:rPr lang="fi-FI" dirty="0" err="1" smtClean="0"/>
+              <a:t>mostly</a:t>
+            </a:r>
+            <a:r>
+              <a:rPr lang="fi-FI" dirty="0" smtClean="0"/>
+              <a:t> home</a:t>
+            </a:r>
+            <a:endParaRPr lang="en-US" dirty="0" smtClean="0"/>
+          </a:p>
+          <a:p>
+            <a:pPr lvl="1"/>
+            <a:r>
+              <a:rPr lang="fi-FI" dirty="0" smtClean="0"/>
+              <a:t>School computers inadequate for Unreal Engine 4 </a:t>
+            </a:r>
+            <a:r>
+              <a:rPr lang="fi-FI" dirty="0" smtClean="0"/>
+              <a:t>editor </a:t>
+            </a:r>
+          </a:p>
+          <a:p>
+            <a:pPr lvl="2"/>
+            <a:r>
+              <a:rPr lang="fi-FI" dirty="0" smtClean="0"/>
+              <a:t>Bad hardware</a:t>
+            </a:r>
+          </a:p>
+          <a:p>
+            <a:pPr lvl="2"/>
+            <a:r>
+              <a:rPr lang="fi-FI" dirty="0" smtClean="0"/>
+              <a:t>Old versions</a:t>
+            </a:r>
+            <a:endParaRPr lang="fi-FI" dirty="0" smtClean="0"/>
+          </a:p>
+          <a:p>
+            <a:r>
+              <a:rPr lang="fi-FI" dirty="0" err="1" smtClean="0"/>
+              <a:t>GitHub</a:t>
+            </a:r>
+            <a:r>
+              <a:rPr lang="fi-FI" dirty="0" smtClean="0"/>
+              <a:t> for version </a:t>
+            </a:r>
+            <a:r>
+              <a:rPr lang="fi-FI" dirty="0" err="1" smtClean="0"/>
+              <a:t>control</a:t>
+            </a:r>
+            <a:endParaRPr lang="fi-FI" dirty="0" smtClean="0"/>
+          </a:p>
+          <a:p>
+            <a:pPr lvl="1"/>
+            <a:r>
+              <a:rPr lang="fi-FI" dirty="0" err="1" smtClean="0"/>
+              <a:t>Issues</a:t>
+            </a:r>
+            <a:r>
+              <a:rPr lang="fi-FI" dirty="0" smtClean="0"/>
+              <a:t> for feature </a:t>
+            </a:r>
+            <a:r>
+              <a:rPr lang="fi-FI" dirty="0" err="1" smtClean="0"/>
+              <a:t>completion</a:t>
+            </a:r>
+            <a:r>
+              <a:rPr lang="fi-FI" dirty="0" smtClean="0"/>
+              <a:t> and </a:t>
+            </a:r>
+            <a:r>
+              <a:rPr lang="fi-FI" dirty="0" err="1" smtClean="0"/>
+              <a:t>time</a:t>
+            </a:r>
+            <a:r>
+              <a:rPr lang="fi-FI" dirty="0" smtClean="0"/>
+              <a:t> </a:t>
+            </a:r>
+            <a:r>
+              <a:rPr lang="fi-FI" dirty="0" err="1" smtClean="0"/>
+              <a:t>tracking</a:t>
+            </a:r>
+            <a:endParaRPr lang="fi-FI" dirty="0" smtClean="0"/>
+          </a:p>
+          <a:p>
+            <a:pPr lvl="1"/>
+            <a:r>
+              <a:rPr lang="fi-FI" dirty="0" smtClean="0"/>
+              <a:t>Wiki for </a:t>
+            </a:r>
+            <a:r>
+              <a:rPr lang="fi-FI" dirty="0" err="1" smtClean="0"/>
+              <a:t>documentation</a:t>
+            </a:r>
+            <a:endParaRPr lang="fi-FI" dirty="0" smtClean="0"/>
+          </a:p>
+          <a:p>
+            <a:r>
+              <a:rPr lang="fi-FI" dirty="0" smtClean="0"/>
+              <a:t>Skype and </a:t>
+            </a:r>
+            <a:r>
+              <a:rPr lang="fi-FI" dirty="0" err="1" smtClean="0"/>
+              <a:t>meeting</a:t>
+            </a:r>
+            <a:r>
+              <a:rPr lang="fi-FI" dirty="0" smtClean="0"/>
+              <a:t> in </a:t>
+            </a:r>
+            <a:r>
+              <a:rPr lang="fi-FI" dirty="0" err="1" smtClean="0"/>
+              <a:t>school</a:t>
+            </a:r>
+            <a:r>
+              <a:rPr lang="fi-FI" dirty="0" smtClean="0"/>
+              <a:t> for </a:t>
+            </a:r>
+            <a:r>
+              <a:rPr lang="fi-FI" dirty="0" err="1" smtClean="0"/>
+              <a:t>communication</a:t>
+            </a:r>
+            <a:endParaRPr lang="fi-FI" dirty="0"/>
+          </a:p>
+        </p:txBody>
+      </p:sp>
+    </p:spTree>
+    <p:extLst>
+      <p:ext uri="{BB962C8B-B14F-4D97-AF65-F5344CB8AC3E}">
+        <p14:creationId xmlns:p14="http://schemas.microsoft.com/office/powerpoint/2010/main" val="3901222233"/>
+      </p:ext>
+    </p:extLst>
+  </p:cSld>
+  <p:clrMapOvr>
+    <a:masterClrMapping/>
+  </p:clrMapOvr>
+  <p:timing>
+    <p:tnLst>
+      <p:par>
+        <p:cTn id="1" dur="indefinite" restart="never" nodeType="tmRoot"/>
+      </p:par>
+    </p:tnLst>
+  </p:timing>
+</p:sld>
+</file>
+
+<file path=ppt/slides/slide12.xml><?xml version="1.0" encoding="utf-8"?>
+<p:sld xmlns:a="http://schemas.openxmlformats.org/drawingml/2006/main" xmlns:r="http://schemas.openxmlformats.org/officeDocument/2006/relationships" xmlns:p="http://schemas.openxmlformats.org/presentationml/2006/main">
+  <p:cSld>
+    <p:spTree>
+      <p:nvGrpSpPr>
+        <p:cNvPr id="1" name=""/>
+        <p:cNvGrpSpPr/>
+        <p:nvPr/>
+      </p:nvGrpSpPr>
+      <p:grpSpPr>
+        <a:xfrm>
+          <a:off x="0" y="0"/>
+          <a:ext cx="0" cy="0"/>
+          <a:chOff x="0" y="0"/>
+          <a:chExt cx="0" cy="0"/>
+        </a:xfrm>
+      </p:grpSpPr>
+      <p:sp>
+        <p:nvSpPr>
+          <p:cNvPr id="2" name="Title 1"/>
+          <p:cNvSpPr>
+            <a:spLocks noGrp="1"/>
+          </p:cNvSpPr>
+          <p:nvPr>
+            <p:ph type="title"/>
+          </p:nvPr>
+        </p:nvSpPr>
+        <p:spPr/>
+        <p:txBody>
+          <a:bodyPr/>
+          <a:lstStyle/>
+          <a:p>
+            <a:r>
+              <a:rPr lang="fi-FI" dirty="0" err="1" smtClean="0"/>
+              <a:t>Cut</a:t>
+            </a:r>
+            <a:r>
+              <a:rPr lang="fi-FI" dirty="0" smtClean="0"/>
+              <a:t> </a:t>
+            </a:r>
+            <a:r>
+              <a:rPr lang="fi-FI" dirty="0" err="1" smtClean="0"/>
+              <a:t>features</a:t>
+            </a:r>
+            <a:endParaRPr lang="en-US" dirty="0"/>
+          </a:p>
+        </p:txBody>
+      </p:sp>
+      <p:sp>
+        <p:nvSpPr>
+          <p:cNvPr id="3" name="Content Placeholder 2"/>
+          <p:cNvSpPr>
+            <a:spLocks noGrp="1"/>
+          </p:cNvSpPr>
+          <p:nvPr>
+            <p:ph idx="1"/>
+          </p:nvPr>
+        </p:nvSpPr>
+        <p:spPr/>
+        <p:txBody>
+          <a:bodyPr/>
+          <a:lstStyle/>
+          <a:p>
+            <a:pPr marL="342900" lvl="1" indent="-342900"/>
+            <a:r>
+              <a:rPr lang="fi-FI" dirty="0" err="1"/>
+              <a:t>Local</a:t>
+            </a:r>
+            <a:r>
+              <a:rPr lang="fi-FI" dirty="0"/>
+              <a:t> </a:t>
+            </a:r>
+            <a:r>
+              <a:rPr lang="fi-FI" dirty="0" err="1"/>
+              <a:t>co</a:t>
+            </a:r>
+            <a:r>
+              <a:rPr lang="fi-FI" dirty="0"/>
+              <a:t>-op </a:t>
+            </a:r>
+            <a:r>
+              <a:rPr lang="fi-FI" dirty="0" err="1"/>
+              <a:t>instead</a:t>
+            </a:r>
+            <a:r>
+              <a:rPr lang="fi-FI" dirty="0"/>
+              <a:t> of </a:t>
+            </a:r>
+            <a:r>
+              <a:rPr lang="fi-FI" dirty="0" smtClean="0"/>
+              <a:t>online</a:t>
+            </a:r>
+          </a:p>
+          <a:p>
+            <a:pPr marL="342900" lvl="1" indent="-342900"/>
+            <a:r>
+              <a:rPr lang="fi-FI" dirty="0" err="1" smtClean="0"/>
+              <a:t>Models</a:t>
+            </a:r>
+            <a:endParaRPr lang="fi-FI" dirty="0" smtClean="0"/>
+          </a:p>
+          <a:p>
+            <a:pPr marL="742950" lvl="2" indent="-342900"/>
+            <a:r>
+              <a:rPr lang="fi-FI" dirty="0" err="1" smtClean="0"/>
+              <a:t>Many</a:t>
+            </a:r>
+            <a:r>
+              <a:rPr lang="fi-FI" dirty="0" smtClean="0"/>
+              <a:t> </a:t>
+            </a:r>
+            <a:r>
+              <a:rPr lang="fi-FI" dirty="0" err="1" smtClean="0"/>
+              <a:t>weapons</a:t>
+            </a:r>
+            <a:endParaRPr lang="fi-FI" dirty="0" smtClean="0"/>
+          </a:p>
+          <a:p>
+            <a:pPr marL="742950" lvl="2" indent="-342900"/>
+            <a:r>
+              <a:rPr lang="fi-FI" dirty="0" err="1" smtClean="0"/>
+              <a:t>Ammo</a:t>
+            </a:r>
+            <a:endParaRPr lang="fi-FI" dirty="0" smtClean="0"/>
+          </a:p>
+          <a:p>
+            <a:pPr marL="742950" lvl="2" indent="-342900"/>
+            <a:r>
+              <a:rPr lang="fi-FI" dirty="0" err="1" smtClean="0"/>
+              <a:t>Better</a:t>
+            </a:r>
+            <a:r>
+              <a:rPr lang="fi-FI" dirty="0" smtClean="0"/>
+              <a:t> </a:t>
+            </a:r>
+            <a:r>
+              <a:rPr lang="fi-FI" dirty="0" err="1" smtClean="0"/>
+              <a:t>player</a:t>
+            </a:r>
+            <a:r>
+              <a:rPr lang="fi-FI" dirty="0" smtClean="0"/>
+              <a:t> </a:t>
+            </a:r>
+            <a:r>
+              <a:rPr lang="fi-FI" dirty="0" err="1" smtClean="0"/>
+              <a:t>animations</a:t>
+            </a:r>
+            <a:endParaRPr lang="fi-FI" dirty="0"/>
+          </a:p>
+          <a:p>
+            <a:r>
+              <a:rPr lang="fi-FI" dirty="0" err="1" smtClean="0"/>
+              <a:t>Originally</a:t>
+            </a:r>
+            <a:r>
+              <a:rPr lang="fi-FI" dirty="0" smtClean="0"/>
+              <a:t> </a:t>
+            </a:r>
+            <a:r>
+              <a:rPr lang="fi-FI" dirty="0" err="1" smtClean="0"/>
+              <a:t>planned</a:t>
+            </a:r>
+            <a:r>
+              <a:rPr lang="fi-FI" dirty="0" smtClean="0"/>
+              <a:t> </a:t>
+            </a:r>
+            <a:r>
+              <a:rPr lang="fi-FI" dirty="0" err="1" smtClean="0"/>
+              <a:t>enemies</a:t>
+            </a:r>
+            <a:endParaRPr lang="fi-FI" dirty="0" smtClean="0"/>
+          </a:p>
+          <a:p>
+            <a:pPr lvl="1"/>
+            <a:r>
+              <a:rPr lang="fi-FI" dirty="0" smtClean="0"/>
+              <a:t>Made </a:t>
+            </a:r>
+            <a:r>
+              <a:rPr lang="fi-FI" dirty="0" err="1" smtClean="0"/>
+              <a:t>different</a:t>
+            </a:r>
+            <a:r>
+              <a:rPr lang="fi-FI" dirty="0" smtClean="0"/>
+              <a:t> </a:t>
+            </a:r>
+            <a:r>
+              <a:rPr lang="fi-FI" dirty="0" err="1" smtClean="0"/>
+              <a:t>kind</a:t>
+            </a:r>
+            <a:r>
+              <a:rPr lang="fi-FI" dirty="0" smtClean="0"/>
+              <a:t> of </a:t>
+            </a:r>
+            <a:r>
+              <a:rPr lang="fi-FI" dirty="0" err="1" smtClean="0"/>
+              <a:t>enemies</a:t>
+            </a:r>
+            <a:r>
+              <a:rPr lang="fi-FI" dirty="0" smtClean="0"/>
+              <a:t> </a:t>
+            </a:r>
+            <a:r>
+              <a:rPr lang="fi-FI" dirty="0" err="1" smtClean="0"/>
+              <a:t>instead</a:t>
+            </a:r>
+            <a:endParaRPr lang="fi-FI" dirty="0" smtClean="0"/>
+          </a:p>
+          <a:p>
+            <a:r>
+              <a:rPr lang="fi-FI" dirty="0" err="1" smtClean="0"/>
+              <a:t>Tileset</a:t>
+            </a:r>
+            <a:r>
+              <a:rPr lang="fi-FI" dirty="0" smtClean="0"/>
+              <a:t> for </a:t>
+            </a:r>
+            <a:r>
+              <a:rPr lang="fi-FI" dirty="0" err="1" smtClean="0"/>
+              <a:t>cave</a:t>
+            </a:r>
+            <a:r>
+              <a:rPr lang="fi-FI" dirty="0" smtClean="0"/>
+              <a:t> </a:t>
+            </a:r>
+            <a:r>
+              <a:rPr lang="fi-FI" dirty="0" err="1" smtClean="0"/>
+              <a:t>map</a:t>
+            </a:r>
+            <a:endParaRPr lang="fi-FI" dirty="0" smtClean="0"/>
+          </a:p>
+        </p:txBody>
+      </p:sp>
+    </p:spTree>
+    <p:extLst>
+      <p:ext uri="{BB962C8B-B14F-4D97-AF65-F5344CB8AC3E}">
+        <p14:creationId xmlns:p14="http://schemas.microsoft.com/office/powerpoint/2010/main" val="1146457019"/>
+      </p:ext>
+    </p:extLst>
+  </p:cSld>
+  <p:clrMapOvr>
+    <a:masterClrMapping/>
+  </p:clrMapOvr>
+  <p:timing>
+    <p:tnLst>
+      <p:par>
+        <p:cTn id="1" dur="indefinite" restart="never" nodeType="tmRoot"/>
+      </p:par>
+    </p:tnLst>
+  </p:timing>
+</p:sld>
+</file>
+
+<file path=ppt/slides/slide13.xml><?xml version="1.0" encoding="utf-8"?>
+<p:sld xmlns:a="http://schemas.openxmlformats.org/drawingml/2006/main" xmlns:r="http://schemas.openxmlformats.org/officeDocument/2006/relationships" xmlns:p="http://schemas.openxmlformats.org/presentationml/2006/main">
+  <p:cSld>
+    <p:spTree>
+      <p:nvGrpSpPr>
+        <p:cNvPr id="1" name=""/>
+        <p:cNvGrpSpPr/>
+        <p:nvPr/>
+      </p:nvGrpSpPr>
+      <p:grpSpPr>
+        <a:xfrm>
+          <a:off x="0" y="0"/>
+          <a:ext cx="0" cy="0"/>
+          <a:chOff x="0" y="0"/>
+          <a:chExt cx="0" cy="0"/>
+        </a:xfrm>
+      </p:grpSpPr>
+      <p:sp>
+        <p:nvSpPr>
+          <p:cNvPr id="2" name="Title 1"/>
+          <p:cNvSpPr>
+            <a:spLocks noGrp="1"/>
+          </p:cNvSpPr>
+          <p:nvPr>
+            <p:ph type="title"/>
+          </p:nvPr>
+        </p:nvSpPr>
+        <p:spPr/>
+        <p:txBody>
+          <a:bodyPr/>
+          <a:lstStyle/>
+          <a:p>
+            <a:r>
+              <a:rPr lang="fi-FI" dirty="0" err="1" smtClean="0"/>
+              <a:t>Problems</a:t>
+            </a:r>
+            <a:endParaRPr lang="en-US" dirty="0"/>
+          </a:p>
+        </p:txBody>
+      </p:sp>
+      <p:sp>
+        <p:nvSpPr>
+          <p:cNvPr id="3" name="Content Placeholder 2"/>
+          <p:cNvSpPr>
+            <a:spLocks noGrp="1"/>
+          </p:cNvSpPr>
+          <p:nvPr>
+            <p:ph idx="1"/>
+          </p:nvPr>
+        </p:nvSpPr>
+        <p:spPr>
+          <a:xfrm>
+            <a:off x="677334" y="1602223"/>
+            <a:ext cx="8596668" cy="4919958"/>
+          </a:xfrm>
+        </p:spPr>
+        <p:txBody>
+          <a:bodyPr/>
+          <a:lstStyle/>
+          <a:p>
+            <a:r>
+              <a:rPr lang="fi-FI" dirty="0" err="1" smtClean="0"/>
+              <a:t>Tried</a:t>
+            </a:r>
+            <a:r>
+              <a:rPr lang="fi-FI" dirty="0" smtClean="0"/>
+              <a:t> to </a:t>
+            </a:r>
+            <a:r>
+              <a:rPr lang="fi-FI" dirty="0" err="1" smtClean="0"/>
+              <a:t>use</a:t>
+            </a:r>
+            <a:r>
+              <a:rPr lang="fi-FI" dirty="0" smtClean="0"/>
+              <a:t> C++ </a:t>
+            </a:r>
+            <a:r>
+              <a:rPr lang="fi-FI" dirty="0" err="1" smtClean="0"/>
+              <a:t>but</a:t>
+            </a:r>
+            <a:r>
+              <a:rPr lang="fi-FI" dirty="0" smtClean="0"/>
+              <a:t> </a:t>
+            </a:r>
+            <a:r>
+              <a:rPr lang="fi-FI" dirty="0" err="1" smtClean="0"/>
+              <a:t>ran</a:t>
+            </a:r>
+            <a:r>
+              <a:rPr lang="fi-FI" dirty="0" smtClean="0"/>
+              <a:t> into </a:t>
+            </a:r>
+            <a:r>
+              <a:rPr lang="fi-FI" dirty="0" err="1" smtClean="0"/>
+              <a:t>problems</a:t>
+            </a:r>
+            <a:r>
+              <a:rPr lang="fi-FI" dirty="0" smtClean="0"/>
+              <a:t> </a:t>
+            </a:r>
+            <a:r>
+              <a:rPr lang="fi-FI" dirty="0" err="1" smtClean="0"/>
+              <a:t>with</a:t>
+            </a:r>
+            <a:r>
+              <a:rPr lang="fi-FI" dirty="0" smtClean="0"/>
+              <a:t> </a:t>
+            </a:r>
+            <a:r>
+              <a:rPr lang="fi-FI" dirty="0" err="1" smtClean="0"/>
+              <a:t>Blueprint</a:t>
+            </a:r>
+            <a:r>
+              <a:rPr lang="fi-FI" dirty="0" smtClean="0"/>
+              <a:t> </a:t>
+            </a:r>
+            <a:r>
+              <a:rPr lang="fi-FI" dirty="0" err="1" smtClean="0"/>
+              <a:t>integration</a:t>
+            </a:r>
+            <a:r>
+              <a:rPr lang="fi-FI" dirty="0" smtClean="0"/>
+              <a:t> and </a:t>
+            </a:r>
+            <a:r>
+              <a:rPr lang="fi-FI" dirty="0" err="1" smtClean="0"/>
+              <a:t>hot-reloading</a:t>
+            </a:r>
+            <a:endParaRPr lang="fi-FI" dirty="0" smtClean="0"/>
+          </a:p>
+          <a:p>
+            <a:r>
+              <a:rPr lang="fi-FI" dirty="0" err="1" smtClean="0"/>
               <a:t>Unreal</a:t>
             </a:r>
             <a:r>
               <a:rPr lang="fi-FI" dirty="0" smtClean="0"/>
-              <a:t> Engine 4 </a:t>
-            </a:r>
-            <a:r>
-              <a:rPr lang="fi-FI" dirty="0" err="1" smtClean="0"/>
-              <a:t>isn’t</a:t>
-            </a:r>
-            <a:r>
-              <a:rPr lang="fi-FI" dirty="0" smtClean="0"/>
-              <a:t> </a:t>
-            </a:r>
-            <a:r>
-              <a:rPr lang="fi-FI" dirty="0" err="1" smtClean="0"/>
-              <a:t>good</a:t>
-            </a:r>
-            <a:r>
-              <a:rPr lang="fi-FI" dirty="0" smtClean="0"/>
-              <a:t> as it </a:t>
-            </a:r>
-            <a:r>
-              <a:rPr lang="fi-FI" dirty="0" err="1" smtClean="0"/>
-              <a:t>first</a:t>
-            </a:r>
-            <a:r>
-              <a:rPr lang="fi-FI" dirty="0" smtClean="0"/>
-              <a:t> </a:t>
-            </a:r>
-            <a:r>
-              <a:rPr lang="fi-FI" dirty="0" err="1" smtClean="0"/>
+              <a:t> Engine 4</a:t>
+            </a:r>
+          </a:p>
+          <a:p>
+            <a:pPr lvl="1"/>
+            <a:r>
+              <a:rPr lang="fi-FI" dirty="0" err="1" smtClean="0"/>
+              <a:t>Many</a:t>
+            </a:r>
+            <a:r>
+              <a:rPr lang="fi-FI" dirty="0" smtClean="0"/>
+              <a:t> </a:t>
+            </a:r>
+            <a:r>
+              <a:rPr lang="fi-FI" dirty="0" err="1"/>
+              <a:t>c</a:t>
+            </a:r>
+            <a:r>
+              <a:rPr lang="fi-FI" dirty="0" err="1" smtClean="0"/>
+              <a:t>rashes</a:t>
+            </a:r>
+            <a:r>
+              <a:rPr lang="fi-FI" dirty="0" smtClean="0"/>
+              <a:t> and </a:t>
+            </a:r>
+            <a:r>
+              <a:rPr lang="fi-FI" dirty="0" err="1" smtClean="0"/>
+              <a:t>memory</a:t>
+            </a:r>
+            <a:r>
+              <a:rPr lang="fi-FI" dirty="0" smtClean="0"/>
+              <a:t> </a:t>
+            </a:r>
+            <a:r>
+              <a:rPr lang="fi-FI" dirty="0" err="1" smtClean="0"/>
+              <a:t>leaks</a:t>
+            </a:r>
+            <a:endParaRPr lang="fi-FI" dirty="0" smtClean="0"/>
+          </a:p>
+          <a:p>
+            <a:pPr lvl="1"/>
+            <a:r>
+              <a:rPr lang="fi-FI" dirty="0" err="1" smtClean="0"/>
+              <a:t>Likes</a:t>
+            </a:r>
+            <a:r>
+              <a:rPr lang="fi-FI" dirty="0" smtClean="0"/>
+              <a:t> to </a:t>
+            </a:r>
+            <a:r>
+              <a:rPr lang="fi-FI" dirty="0" err="1" smtClean="0"/>
+              <a:t>modify</a:t>
+            </a:r>
+            <a:r>
+              <a:rPr lang="fi-FI" dirty="0" smtClean="0"/>
+              <a:t> </a:t>
+            </a:r>
+            <a:r>
+              <a:rPr lang="fi-FI" dirty="0" err="1" smtClean="0"/>
+              <a:t>files</a:t>
+            </a:r>
+            <a:r>
+              <a:rPr lang="fi-FI" dirty="0" smtClean="0"/>
+              <a:t> </a:t>
+            </a:r>
+            <a:r>
+              <a:rPr lang="fi-FI" dirty="0" err="1" smtClean="0"/>
+              <a:t>randomly</a:t>
+            </a:r>
+            <a:r>
+              <a:rPr lang="fi-FI" dirty="0" smtClean="0"/>
+              <a:t> =&gt; version </a:t>
+            </a:r>
+            <a:r>
+              <a:rPr lang="fi-FI" dirty="0" err="1" smtClean="0"/>
+              <a:t>control</a:t>
+            </a:r>
+            <a:r>
+              <a:rPr lang="fi-FI" dirty="0" smtClean="0"/>
+              <a:t> </a:t>
+            </a:r>
+            <a:r>
+              <a:rPr lang="fi-FI" dirty="0" err="1" smtClean="0"/>
+              <a:t>usage</a:t>
+            </a:r>
+            <a:r>
+              <a:rPr lang="fi-FI" dirty="0" smtClean="0"/>
+              <a:t> </a:t>
+            </a:r>
+            <a:r>
+              <a:rPr lang="fi-FI" dirty="0" err="1" smtClean="0"/>
+              <a:t>harder</a:t>
+            </a:r>
+            <a:endParaRPr lang="fi-FI" dirty="0" smtClean="0"/>
+          </a:p>
+          <a:p>
+            <a:pPr lvl="1"/>
+            <a:r>
+              <a:rPr lang="fi-FI" dirty="0" err="1" smtClean="0"/>
+              <a:t>Blueprints</a:t>
+            </a:r>
+            <a:r>
+              <a:rPr lang="fi-FI" dirty="0" smtClean="0"/>
+              <a:t> </a:t>
+            </a:r>
+            <a:r>
+              <a:rPr lang="fi-FI" dirty="0" err="1" smtClean="0"/>
+              <a:t>are</a:t>
+            </a:r>
+            <a:r>
+              <a:rPr lang="fi-FI" dirty="0" smtClean="0"/>
+              <a:t> </a:t>
+            </a:r>
+            <a:r>
+              <a:rPr lang="fi-FI" dirty="0" err="1" smtClean="0"/>
+              <a:t>binary</a:t>
+            </a:r>
+            <a:r>
+              <a:rPr lang="fi-FI" dirty="0" smtClean="0"/>
+              <a:t> </a:t>
+            </a:r>
+            <a:r>
+              <a:rPr lang="fi-FI" dirty="0" err="1" smtClean="0"/>
+              <a:t>files</a:t>
+            </a:r>
+            <a:r>
+              <a:rPr lang="fi-FI" dirty="0" smtClean="0"/>
+              <a:t> =&gt; </a:t>
+            </a:r>
+            <a:r>
+              <a:rPr lang="fi-FI" dirty="0" err="1" smtClean="0"/>
+              <a:t>developers</a:t>
+            </a:r>
+            <a:r>
+              <a:rPr lang="fi-FI" dirty="0" smtClean="0"/>
+              <a:t> </a:t>
+            </a:r>
+            <a:r>
+              <a:rPr lang="fi-FI" dirty="0" err="1" smtClean="0"/>
+              <a:t>can’t</a:t>
+            </a:r>
+            <a:r>
+              <a:rPr lang="fi-FI" dirty="0" smtClean="0"/>
+              <a:t> </a:t>
+            </a:r>
+            <a:r>
+              <a:rPr lang="fi-FI" dirty="0" err="1" smtClean="0"/>
+              <a:t>modify</a:t>
+            </a:r>
+            <a:r>
+              <a:rPr lang="fi-FI" dirty="0" smtClean="0"/>
+              <a:t> </a:t>
+            </a:r>
+            <a:r>
+              <a:rPr lang="fi-FI" dirty="0" err="1" smtClean="0"/>
+              <a:t>them</a:t>
+            </a:r>
+            <a:r>
+              <a:rPr lang="fi-FI" dirty="0" smtClean="0"/>
+              <a:t> </a:t>
+            </a:r>
+            <a:r>
+              <a:rPr lang="fi-FI" dirty="0" err="1" smtClean="0"/>
+              <a:t>simultaneosly</a:t>
+            </a:r>
+            <a:endParaRPr lang="fi-FI" dirty="0" smtClean="0"/>
+          </a:p>
+          <a:p>
+            <a:pPr lvl="2"/>
+            <a:r>
+              <a:rPr lang="fi-FI" dirty="0" err="1" smtClean="0"/>
+              <a:t>Merge</a:t>
+            </a:r>
+            <a:r>
+              <a:rPr lang="fi-FI" dirty="0" smtClean="0"/>
+              <a:t> </a:t>
+            </a:r>
+            <a:r>
+              <a:rPr lang="fi-FI" dirty="0" err="1" smtClean="0"/>
+              <a:t>tool</a:t>
+            </a:r>
+            <a:r>
+              <a:rPr lang="fi-FI" dirty="0" smtClean="0"/>
+              <a:t> </a:t>
+            </a:r>
+            <a:r>
+              <a:rPr lang="fi-FI" dirty="0" err="1" smtClean="0"/>
+              <a:t>added</a:t>
+            </a:r>
+            <a:r>
+              <a:rPr lang="fi-FI" dirty="0" smtClean="0"/>
+              <a:t> in 4.7 </a:t>
+            </a:r>
+            <a:r>
+              <a:rPr lang="fi-FI" dirty="0" err="1" smtClean="0"/>
+              <a:t>but</a:t>
+            </a:r>
+            <a:r>
+              <a:rPr lang="fi-FI" dirty="0" smtClean="0"/>
+              <a:t> </a:t>
+            </a:r>
+            <a:r>
+              <a:rPr lang="fi-FI" dirty="0" err="1" smtClean="0"/>
+              <a:t>doesn’t</a:t>
+            </a:r>
+            <a:r>
+              <a:rPr lang="fi-FI" dirty="0" smtClean="0"/>
+              <a:t> </a:t>
+            </a:r>
+            <a:r>
+              <a:rPr lang="fi-FI" dirty="0" err="1" smtClean="0"/>
+              <a:t>work</a:t>
+            </a:r>
+            <a:r>
+              <a:rPr lang="fi-FI" dirty="0" smtClean="0"/>
+              <a:t> </a:t>
+            </a:r>
+            <a:r>
+              <a:rPr lang="fi-FI" dirty="0" err="1" smtClean="0"/>
+              <a:t>all</a:t>
+            </a:r>
+            <a:r>
+              <a:rPr lang="fi-FI" dirty="0" smtClean="0"/>
+              <a:t> </a:t>
+            </a:r>
+            <a:r>
+              <a:rPr lang="fi-FI" dirty="0" err="1" smtClean="0"/>
+              <a:t>the</a:t>
+            </a:r>
+            <a:r>
+              <a:rPr lang="fi-FI" dirty="0" smtClean="0"/>
+              <a:t> </a:t>
+            </a:r>
+            <a:r>
+              <a:rPr lang="fi-FI" dirty="0" err="1" smtClean="0"/>
+              <a:t>time</a:t>
+            </a:r>
+            <a:endParaRPr lang="fi-FI" dirty="0" smtClean="0"/>
+          </a:p>
+          <a:p>
+            <a:pPr lvl="1"/>
+            <a:r>
+              <a:rPr lang="fi-FI" dirty="0" err="1" smtClean="0"/>
+              <a:t>Blueprint</a:t>
+            </a:r>
+            <a:r>
+              <a:rPr lang="fi-FI" dirty="0" smtClean="0"/>
+              <a:t> </a:t>
+            </a:r>
+            <a:r>
+              <a:rPr lang="fi-FI" dirty="0" err="1" smtClean="0"/>
+              <a:t>debugging</a:t>
+            </a:r>
+            <a:endParaRPr lang="fi-FI" dirty="0" smtClean="0"/>
+          </a:p>
+          <a:p>
+            <a:pPr lvl="2"/>
+            <a:r>
+              <a:rPr lang="fi-FI" dirty="0" smtClean="0"/>
+              <a:t>No </a:t>
+            </a:r>
+            <a:r>
+              <a:rPr lang="fi-FI" dirty="0" err="1" smtClean="0"/>
+              <a:t>step</a:t>
+            </a:r>
+            <a:r>
+              <a:rPr lang="fi-FI" dirty="0" smtClean="0"/>
+              <a:t> </a:t>
+            </a:r>
+            <a:r>
+              <a:rPr lang="fi-FI" dirty="0" err="1" smtClean="0"/>
+              <a:t>over</a:t>
+            </a:r>
+            <a:endParaRPr lang="fi-FI" dirty="0"/>
+          </a:p>
+          <a:p>
+            <a:pPr lvl="2"/>
+            <a:r>
+              <a:rPr lang="fi-FI" dirty="0" err="1" smtClean="0"/>
+              <a:t>Watching</a:t>
+            </a:r>
+            <a:r>
+              <a:rPr lang="fi-FI" dirty="0" smtClean="0"/>
+              <a:t> </a:t>
+            </a:r>
+            <a:r>
+              <a:rPr lang="fi-FI" dirty="0" err="1" smtClean="0"/>
+              <a:t>values</a:t>
+            </a:r>
+            <a:r>
+              <a:rPr lang="fi-FI" dirty="0" smtClean="0"/>
+              <a:t> </a:t>
+            </a:r>
+            <a:r>
+              <a:rPr lang="fi-FI" dirty="0" err="1" smtClean="0"/>
+              <a:t>doesn’t</a:t>
+            </a:r>
+            <a:r>
+              <a:rPr lang="fi-FI" dirty="0" smtClean="0"/>
+              <a:t> </a:t>
+            </a:r>
+            <a:r>
+              <a:rPr lang="fi-FI" dirty="0" err="1" smtClean="0"/>
+              <a:t>work</a:t>
+            </a:r>
+            <a:r>
+              <a:rPr lang="fi-FI" dirty="0" smtClean="0"/>
+              <a:t> </a:t>
+            </a:r>
+            <a:r>
+              <a:rPr lang="fi-FI" dirty="0" err="1" smtClean="0"/>
+              <a:t>half</a:t>
+            </a:r>
+            <a:r>
+              <a:rPr lang="fi-FI" dirty="0" smtClean="0"/>
+              <a:t> </a:t>
+            </a:r>
+            <a:r>
+              <a:rPr lang="fi-FI" dirty="0" err="1" smtClean="0"/>
+              <a:t>the</a:t>
+            </a:r>
+            <a:r>
+              <a:rPr lang="fi-FI" dirty="0" smtClean="0"/>
+              <a:t> </a:t>
+            </a:r>
+            <a:r>
+              <a:rPr lang="fi-FI" dirty="0" err="1" smtClean="0"/>
+              <a:t>time</a:t>
+            </a:r>
+            <a:endParaRPr lang="fi-FI" dirty="0" smtClean="0"/>
+          </a:p>
+          <a:p>
+            <a:pPr lvl="1"/>
+            <a:r>
+              <a:rPr lang="fi-FI" dirty="0" err="1" smtClean="0"/>
+              <a:t>Blueprints</a:t>
+            </a:r>
+            <a:r>
+              <a:rPr lang="fi-FI" dirty="0" smtClean="0"/>
+              <a:t> </a:t>
+            </a:r>
+            <a:r>
+              <a:rPr lang="fi-FI" dirty="0" err="1" smtClean="0"/>
+              <a:t>start</a:t>
+            </a:r>
+            <a:r>
+              <a:rPr lang="fi-FI" dirty="0" smtClean="0"/>
+              <a:t> to </a:t>
+            </a:r>
+            <a:r>
+              <a:rPr lang="fi-FI" dirty="0" err="1" smtClean="0"/>
+              <a:t>fail</a:t>
+            </a:r>
+            <a:r>
+              <a:rPr lang="fi-FI" dirty="0" smtClean="0"/>
+              <a:t> </a:t>
+            </a:r>
+            <a:r>
+              <a:rPr lang="fi-FI" dirty="0" err="1" smtClean="0"/>
+              <a:t>compiling</a:t>
+            </a:r>
+            <a:r>
+              <a:rPr lang="fi-FI" dirty="0" smtClean="0"/>
+              <a:t> and </a:t>
+            </a:r>
+            <a:r>
+              <a:rPr lang="fi-FI" dirty="0" err="1" smtClean="0"/>
+              <a:t>saving</a:t>
+            </a:r>
+            <a:r>
+              <a:rPr lang="fi-FI" dirty="0" smtClean="0"/>
+              <a:t> </a:t>
+            </a:r>
+            <a:r>
+              <a:rPr lang="fi-FI" dirty="0" err="1" smtClean="0"/>
+              <a:t>randomly</a:t>
+            </a:r>
+            <a:endParaRPr lang="fi-FI" dirty="0" smtClean="0"/>
+          </a:p>
+          <a:p>
+            <a:pPr lvl="1"/>
+            <a:r>
+              <a:rPr lang="fi-FI" dirty="0" err="1" smtClean="0"/>
+              <a:t>Bad</a:t>
+            </a:r>
+            <a:r>
+              <a:rPr lang="fi-FI" dirty="0" smtClean="0"/>
+              <a:t> </a:t>
+            </a:r>
+            <a:r>
+              <a:rPr lang="fi-FI" dirty="0" err="1" smtClean="0"/>
+              <a:t>error</a:t>
+            </a:r>
+            <a:r>
+              <a:rPr lang="fi-FI" dirty="0" smtClean="0"/>
+              <a:t> </a:t>
+            </a:r>
+            <a:r>
+              <a:rPr lang="fi-FI" dirty="0" err="1" smtClean="0"/>
+              <a:t>messages</a:t>
+            </a:r>
+            <a:r>
+              <a:rPr lang="fi-FI" dirty="0" smtClean="0"/>
+              <a:t> and </a:t>
+            </a:r>
+            <a:r>
+              <a:rPr lang="fi-FI" dirty="0" err="1" smtClean="0"/>
+              <a:t>stuff</a:t>
+            </a:r>
+            <a:r>
+              <a:rPr lang="fi-FI" dirty="0" smtClean="0"/>
+              <a:t> </a:t>
+            </a:r>
+            <a:r>
+              <a:rPr lang="fi-FI" dirty="0" err="1" smtClean="0"/>
+              <a:t>likes</a:t>
+            </a:r>
+            <a:r>
+              <a:rPr lang="fi-FI" dirty="0" smtClean="0"/>
+              <a:t> to </a:t>
+            </a:r>
+            <a:r>
+              <a:rPr lang="fi-FI" dirty="0" err="1" smtClean="0"/>
+              <a:t>fail</a:t>
+            </a:r>
+            <a:r>
+              <a:rPr lang="fi-FI" dirty="0" smtClean="0"/>
+              <a:t> </a:t>
+            </a:r>
+            <a:r>
+              <a:rPr lang="fi-FI" dirty="0" err="1" smtClean="0"/>
+              <a:t>silently</a:t>
+            </a:r>
+            <a:endParaRPr lang="fi-FI" dirty="0" smtClean="0"/>
+          </a:p>
+        </p:txBody>
+      </p:sp>
+    </p:spTree>
+    <p:extLst>
+      <p:ext uri="{BB962C8B-B14F-4D97-AF65-F5344CB8AC3E}">
+        <p14:creationId xmlns:p14="http://schemas.microsoft.com/office/powerpoint/2010/main" val="2574674859"/>
+      </p:ext>
+    </p:extLst>
+  </p:cSld>
+  <p:clrMapOvr>
+    <a:masterClrMapping/>
+  </p:clrMapOvr>
+  <p:timing>
+    <p:tnLst>
+      <p:par>
+        <p:cTn id="1" dur="indefinite" restart="never" nodeType="tmRoot"/>
+      </p:par>
+    </p:tnLst>
+  </p:timing>
+</p:sld>
+</file>
+
+<file path=ppt/slides/slide14.xml><?xml version="1.0" encoding="utf-8"?>
+<p:sld xmlns:a="http://schemas.openxmlformats.org/drawingml/2006/main" xmlns:r="http://schemas.openxmlformats.org/officeDocument/2006/relationships" xmlns:p="http://schemas.openxmlformats.org/presentationml/2006/main">
+  <p:cSld>
+    <p:spTree>
+      <p:nvGrpSpPr>
+        <p:cNvPr id="1" name=""/>
+        <p:cNvGrpSpPr/>
+        <p:nvPr/>
+      </p:nvGrpSpPr>
+      <p:grpSpPr>
+        <a:xfrm>
+          <a:off x="0" y="0"/>
+          <a:ext cx="0" cy="0"/>
+          <a:chOff x="0" y="0"/>
+          <a:chExt cx="0" cy="0"/>
+        </a:xfrm>
+      </p:grpSpPr>
+      <p:sp>
+        <p:nvSpPr>
+          <p:cNvPr id="2" name="Title 1"/>
+          <p:cNvSpPr>
+            <a:spLocks noGrp="1"/>
+          </p:cNvSpPr>
+          <p:nvPr>
+            <p:ph type="title"/>
+          </p:nvPr>
+        </p:nvSpPr>
+        <p:spPr/>
+        <p:txBody>
+          <a:bodyPr/>
+          <a:lstStyle/>
+          <a:p>
+            <a:r>
+              <a:rPr lang="fi-FI" dirty="0" smtClean="0"/>
+              <a:t>Lessons learned</a:t>
+            </a:r>
+            <a:endParaRPr lang="en-US" dirty="0"/>
+          </a:p>
+        </p:txBody>
+      </p:sp>
+      <p:sp>
+        <p:nvSpPr>
+          <p:cNvPr id="3" name="Content Placeholder 2"/>
+          <p:cNvSpPr>
+            <a:spLocks noGrp="1"/>
+          </p:cNvSpPr>
+          <p:nvPr>
+            <p:ph idx="1"/>
+          </p:nvPr>
+        </p:nvSpPr>
+        <p:spPr/>
+        <p:txBody>
+          <a:bodyPr/>
+          <a:lstStyle/>
+          <a:p>
+            <a:r>
+              <a:rPr lang="fi-FI" dirty="0" smtClean="0"/>
+              <a:t>Game development with UE4</a:t>
+            </a:r>
+            <a:endParaRPr lang="fi-FI" dirty="0" smtClean="0"/>
+          </a:p>
+          <a:p>
+            <a:r>
+              <a:rPr lang="fi-FI" dirty="0" smtClean="0"/>
+              <a:t>Unreal </a:t>
+            </a:r>
+            <a:r>
+              <a:rPr lang="fi-FI" dirty="0" smtClean="0"/>
+              <a:t>Engine 4 isn’t </a:t>
+            </a:r>
+            <a:r>
+              <a:rPr lang="fi-FI" dirty="0" smtClean="0"/>
+              <a:t> as good </a:t>
+            </a:r>
+            <a:r>
+              <a:rPr lang="fi-FI" dirty="0" smtClean="0"/>
+              <a:t>as it first </a:t>
+            </a:r>
+            <a:r>
+              <a:rPr lang="fi-FI" dirty="0" smtClean="0"/>
               <a:t>seemed</a:t>
             </a:r>
+          </a:p>
+          <a:p>
+            <a:pPr lvl="1"/>
+            <a:r>
+              <a:rPr lang="fi-FI" dirty="0" smtClean="0"/>
+              <a:t>However, lot of progress has been made reg. engine</a:t>
+            </a:r>
+          </a:p>
+          <a:p>
+            <a:pPr lvl="1"/>
             <a:endParaRPr lang="fi-FI" dirty="0" smtClean="0"/>
           </a:p>
           <a:p>
             <a:r>
-              <a:rPr lang="fi-FI" dirty="0" err="1" smtClean="0"/>
-              <a:t>Modeling</a:t>
-            </a:r>
-            <a:r>
-              <a:rPr lang="fi-FI" dirty="0" smtClean="0"/>
-              <a:t> and </a:t>
-            </a:r>
-            <a:r>
-              <a:rPr lang="fi-FI" dirty="0" err="1" smtClean="0"/>
+              <a:rPr lang="fi-FI" dirty="0" smtClean="0"/>
+              <a:t>Modeling </a:t>
+            </a:r>
+            <a:r>
+              <a:rPr lang="fi-FI" dirty="0" smtClean="0"/>
+              <a:t>and </a:t>
+            </a:r>
+            <a:r>
+              <a:rPr lang="fi-FI" dirty="0" smtClean="0"/>
               <a:t>animating</a:t>
+            </a:r>
+          </a:p>
+          <a:p>
+            <a:pPr lvl="1"/>
+            <a:r>
+              <a:rPr lang="fi-FI" dirty="0" smtClean="0"/>
+              <a:t>It’s hard!</a:t>
             </a:r>
             <a:endParaRPr lang="en-US" dirty="0"/>
           </a:p>
@@ -6695,7 +7482,7 @@
 </p:sld>
 </file>
 
-<file path=ppt/slides/slide12.xml><?xml version="1.0" encoding="utf-8"?>
+<file path=ppt/slides/slide15.xml><?xml version="1.0" encoding="utf-8"?>
 <p:sld xmlns:a="http://schemas.openxmlformats.org/drawingml/2006/main" xmlns:r="http://schemas.openxmlformats.org/officeDocument/2006/relationships" xmlns:p="http://schemas.openxmlformats.org/presentationml/2006/main">
   <p:cSld>
     <p:spTree>
@@ -6796,8 +7583,8 @@
           <a:lstStyle/>
           <a:p>
             <a:r>
-              <a:rPr lang="fi-FI" dirty="0" err="1" smtClean="0"/>
-              <a:t>Game</a:t>
+              <a:rPr lang="fi-FI" dirty="0" smtClean="0"/>
+              <a:t>Game overview</a:t>
             </a:r>
             <a:endParaRPr lang="fi-FI" dirty="0"/>
           </a:p>
@@ -7116,6 +7903,161 @@
           <a:lstStyle/>
           <a:p>
             <a:r>
+              <a:rPr lang="fi-FI" dirty="0" smtClean="0"/>
+              <a:t>Universe</a:t>
+            </a:r>
+            <a:endParaRPr lang="fi-FI" dirty="0"/>
+          </a:p>
+        </p:txBody>
+      </p:sp>
+      <p:sp>
+        <p:nvSpPr>
+          <p:cNvPr id="3" name="Content Placeholder 2"/>
+          <p:cNvSpPr>
+            <a:spLocks noGrp="1"/>
+          </p:cNvSpPr>
+          <p:nvPr>
+            <p:ph idx="1"/>
+          </p:nvPr>
+        </p:nvSpPr>
+        <p:spPr/>
+        <p:txBody>
+          <a:bodyPr/>
+          <a:lstStyle/>
+          <a:p>
+            <a:r>
+              <a:rPr lang="fi-FI" dirty="0" smtClean="0"/>
+              <a:t>Plot: You’re a guy with a gun and you shoot stuff til the next level</a:t>
+            </a:r>
+          </a:p>
+          <a:p>
+            <a:r>
+              <a:rPr lang="fi-FI" dirty="0" smtClean="0"/>
+              <a:t>Low-poly art style</a:t>
+            </a:r>
+          </a:p>
+          <a:p>
+            <a:pPr lvl="1"/>
+            <a:r>
+              <a:rPr lang="fi-FI" dirty="0" smtClean="0"/>
+              <a:t>Fast to model meshes</a:t>
+            </a:r>
+          </a:p>
+          <a:p>
+            <a:pPr lvl="1"/>
+            <a:r>
+              <a:rPr lang="fi-FI" dirty="0" smtClean="0"/>
+              <a:t>Stylized with particle effects, physics, materials and post-processing</a:t>
+            </a:r>
+          </a:p>
+          <a:p>
+            <a:pPr marL="0" indent="0">
+              <a:buNone/>
+            </a:pPr>
+            <a:endParaRPr lang="fi-FI" dirty="0" smtClean="0"/>
+          </a:p>
+        </p:txBody>
+      </p:sp>
+      <p:pic>
+        <p:nvPicPr>
+          <p:cNvPr id="2050" name="Picture 2"/>
+          <p:cNvPicPr>
+            <a:picLocks noChangeAspect="1" noChangeArrowheads="1"/>
+          </p:cNvPicPr>
+          <p:nvPr/>
+        </p:nvPicPr>
+        <p:blipFill>
+          <a:blip r:embed="rId2" cstate="print">
+            <a:extLst>
+              <a:ext uri="{28A0092B-C50C-407E-A947-70E740481C1C}">
+                <a14:useLocalDpi xmlns:a14="http://schemas.microsoft.com/office/drawing/2010/main" val="0"/>
+              </a:ext>
+            </a:extLst>
+          </a:blip>
+          <a:srcRect/>
+          <a:stretch>
+            <a:fillRect/>
+          </a:stretch>
+        </p:blipFill>
+        <p:spPr bwMode="auto">
+          <a:xfrm>
+            <a:off x="6756400" y="3340098"/>
+            <a:ext cx="4964217" cy="3328733"/>
+          </a:xfrm>
+          <a:prstGeom prst="rect">
+            <a:avLst/>
+          </a:prstGeom>
+          <a:noFill/>
+          <a:ln>
+            <a:noFill/>
+          </a:ln>
+          <a:extLst>
+            <a:ext uri="{909E8E84-426E-40DD-AFC4-6F175D3DCCD1}">
+              <a14:hiddenFill xmlns:a14="http://schemas.microsoft.com/office/drawing/2010/main">
+                <a:solidFill>
+                  <a:schemeClr val="accent1"/>
+                </a:solidFill>
+              </a14:hiddenFill>
+            </a:ext>
+            <a:ext uri="{91240B29-F687-4F45-9708-019B960494DF}">
+              <a14:hiddenLine xmlns:a14="http://schemas.microsoft.com/office/drawing/2010/main" w="9525">
+                <a:solidFill>
+                  <a:schemeClr val="tx1"/>
+                </a:solidFill>
+                <a:miter lim="800000"/>
+                <a:headEnd/>
+                <a:tailEnd/>
+              </a14:hiddenLine>
+            </a:ext>
+          </a:extLst>
+        </p:spPr>
+      </p:pic>
+    </p:spTree>
+    <p:extLst>
+      <p:ext uri="{BB962C8B-B14F-4D97-AF65-F5344CB8AC3E}">
+        <p14:creationId xmlns:p14="http://schemas.microsoft.com/office/powerpoint/2010/main" val="1286284554"/>
+      </p:ext>
+    </p:extLst>
+  </p:cSld>
+  <p:clrMapOvr>
+    <a:masterClrMapping/>
+  </p:clrMapOvr>
+</p:sld>
+</file>
+
+<file path=ppt/slides/slide4.xml><?xml version="1.0" encoding="utf-8"?>
+<p:sld xmlns:a="http://schemas.openxmlformats.org/drawingml/2006/main" xmlns:r="http://schemas.openxmlformats.org/officeDocument/2006/relationships" xmlns:p="http://schemas.openxmlformats.org/presentationml/2006/main">
+  <p:cSld>
+    <p:spTree>
+      <p:nvGrpSpPr>
+        <p:cNvPr id="1" name=""/>
+        <p:cNvGrpSpPr/>
+        <p:nvPr/>
+      </p:nvGrpSpPr>
+      <p:grpSpPr>
+        <a:xfrm>
+          <a:off x="0" y="0"/>
+          <a:ext cx="0" cy="0"/>
+          <a:chOff x="0" y="0"/>
+          <a:chExt cx="0" cy="0"/>
+        </a:xfrm>
+      </p:grpSpPr>
+      <p:sp>
+        <p:nvSpPr>
+          <p:cNvPr id="2" name="Title 1"/>
+          <p:cNvSpPr>
+            <a:spLocks noGrp="1"/>
+          </p:cNvSpPr>
+          <p:nvPr>
+            <p:ph type="title"/>
+          </p:nvPr>
+        </p:nvSpPr>
+        <p:spPr/>
+        <p:txBody>
+          <a:bodyPr/>
+          <a:lstStyle/>
+          <a:p>
+            <a:r>
               <a:rPr lang="fi-FI" dirty="0" err="1" smtClean="0"/>
               <a:t>Color</a:t>
             </a:r>
@@ -7396,331 +8338,6 @@
     <p:extLst>
       <p:ext uri="{BB962C8B-B14F-4D97-AF65-F5344CB8AC3E}">
         <p14:creationId xmlns:p14="http://schemas.microsoft.com/office/powerpoint/2010/main" val="2257292541"/>
-      </p:ext>
-    </p:extLst>
-  </p:cSld>
-  <p:clrMapOvr>
-    <a:masterClrMapping/>
-  </p:clrMapOvr>
-  <p:timing>
-    <p:tnLst>
-      <p:par>
-        <p:cTn id="1" dur="indefinite" restart="never" nodeType="tmRoot"/>
-      </p:par>
-    </p:tnLst>
-  </p:timing>
-</p:sld>
-</file>
-
-<file path=ppt/slides/slide4.xml><?xml version="1.0" encoding="utf-8"?>
-<p:sld xmlns:a="http://schemas.openxmlformats.org/drawingml/2006/main" xmlns:r="http://schemas.openxmlformats.org/officeDocument/2006/relationships" xmlns:p="http://schemas.openxmlformats.org/presentationml/2006/main">
-  <p:cSld>
-    <p:spTree>
-      <p:nvGrpSpPr>
-        <p:cNvPr id="1" name=""/>
-        <p:cNvGrpSpPr/>
-        <p:nvPr/>
-      </p:nvGrpSpPr>
-      <p:grpSpPr>
-        <a:xfrm>
-          <a:off x="0" y="0"/>
-          <a:ext cx="0" cy="0"/>
-          <a:chOff x="0" y="0"/>
-          <a:chExt cx="0" cy="0"/>
-        </a:xfrm>
-      </p:grpSpPr>
-      <p:sp>
-        <p:nvSpPr>
-          <p:cNvPr id="2" name="Title 1"/>
-          <p:cNvSpPr>
-            <a:spLocks noGrp="1"/>
-          </p:cNvSpPr>
-          <p:nvPr>
-            <p:ph type="title"/>
-          </p:nvPr>
-        </p:nvSpPr>
-        <p:spPr/>
-        <p:txBody>
-          <a:bodyPr/>
-          <a:lstStyle/>
-          <a:p>
-            <a:r>
-              <a:rPr lang="fi-FI" dirty="0" err="1" smtClean="0"/>
-              <a:t>Slow</a:t>
-            </a:r>
-            <a:r>
-              <a:rPr lang="fi-FI" dirty="0" smtClean="0"/>
-              <a:t> </a:t>
-            </a:r>
-            <a:r>
-              <a:rPr lang="fi-FI" dirty="0" err="1" smtClean="0"/>
-              <a:t>down</a:t>
-            </a:r>
-            <a:r>
-              <a:rPr lang="fi-FI" dirty="0" smtClean="0"/>
-              <a:t> </a:t>
-            </a:r>
-            <a:r>
-              <a:rPr lang="fi-FI" dirty="0" err="1" smtClean="0"/>
-              <a:t>mechanic</a:t>
-            </a:r>
-            <a:endParaRPr lang="fi-FI" dirty="0"/>
-          </a:p>
-        </p:txBody>
-      </p:sp>
-      <p:sp>
-        <p:nvSpPr>
-          <p:cNvPr id="3" name="Content Placeholder 2"/>
-          <p:cNvSpPr>
-            <a:spLocks noGrp="1"/>
-          </p:cNvSpPr>
-          <p:nvPr>
-            <p:ph idx="1"/>
-          </p:nvPr>
-        </p:nvSpPr>
-        <p:spPr/>
-        <p:txBody>
-          <a:bodyPr/>
-          <a:lstStyle/>
-          <a:p>
-            <a:r>
-              <a:rPr lang="fi-FI" dirty="0" err="1" smtClean="0"/>
-              <a:t>Players</a:t>
-            </a:r>
-            <a:r>
-              <a:rPr lang="fi-FI" dirty="0" smtClean="0"/>
-              <a:t> </a:t>
-            </a:r>
-            <a:r>
-              <a:rPr lang="fi-FI" dirty="0" err="1" smtClean="0"/>
-              <a:t>can</a:t>
-            </a:r>
-            <a:r>
-              <a:rPr lang="fi-FI" dirty="0" smtClean="0"/>
-              <a:t> </a:t>
-            </a:r>
-            <a:r>
-              <a:rPr lang="fi-FI" dirty="0" err="1" smtClean="0"/>
-              <a:t>charge</a:t>
-            </a:r>
-            <a:r>
-              <a:rPr lang="fi-FI" dirty="0" smtClean="0"/>
-              <a:t> </a:t>
-            </a:r>
-            <a:r>
-              <a:rPr lang="fi-FI" dirty="0" err="1" smtClean="0"/>
-              <a:t>their</a:t>
-            </a:r>
-            <a:r>
-              <a:rPr lang="fi-FI" dirty="0" smtClean="0"/>
-              <a:t> </a:t>
-            </a:r>
-            <a:r>
-              <a:rPr lang="fi-FI" dirty="0" err="1" smtClean="0"/>
-              <a:t>slow</a:t>
-            </a:r>
-            <a:r>
-              <a:rPr lang="fi-FI" dirty="0" smtClean="0"/>
-              <a:t> </a:t>
-            </a:r>
-            <a:r>
-              <a:rPr lang="fi-FI" dirty="0" err="1" smtClean="0"/>
-              <a:t>down</a:t>
-            </a:r>
-            <a:r>
-              <a:rPr lang="fi-FI" dirty="0" smtClean="0"/>
-              <a:t> </a:t>
-            </a:r>
-            <a:r>
-              <a:rPr lang="fi-FI" dirty="0" err="1" smtClean="0"/>
-              <a:t>bar</a:t>
-            </a:r>
-            <a:endParaRPr lang="fi-FI" dirty="0" smtClean="0"/>
-          </a:p>
-          <a:p>
-            <a:r>
-              <a:rPr lang="fi-FI" dirty="0" err="1" smtClean="0"/>
-              <a:t>They</a:t>
-            </a:r>
-            <a:r>
-              <a:rPr lang="fi-FI" dirty="0" smtClean="0"/>
-              <a:t> </a:t>
-            </a:r>
-            <a:r>
-              <a:rPr lang="fi-FI" dirty="0" err="1" smtClean="0"/>
-              <a:t>can</a:t>
-            </a:r>
-            <a:r>
-              <a:rPr lang="fi-FI" dirty="0" smtClean="0"/>
-              <a:t> </a:t>
-            </a:r>
-            <a:r>
-              <a:rPr lang="fi-FI" dirty="0" err="1" smtClean="0"/>
-              <a:t>drain</a:t>
-            </a:r>
-            <a:r>
-              <a:rPr lang="fi-FI" dirty="0" smtClean="0"/>
-              <a:t> it </a:t>
-            </a:r>
-            <a:r>
-              <a:rPr lang="fi-FI" dirty="0" err="1" smtClean="0"/>
-              <a:t>by</a:t>
-            </a:r>
-            <a:r>
-              <a:rPr lang="fi-FI" dirty="0" smtClean="0"/>
-              <a:t> </a:t>
-            </a:r>
-            <a:r>
-              <a:rPr lang="fi-FI" dirty="0" err="1" smtClean="0"/>
-              <a:t>slowing</a:t>
-            </a:r>
-            <a:r>
-              <a:rPr lang="fi-FI" dirty="0" smtClean="0"/>
-              <a:t> </a:t>
-            </a:r>
-            <a:r>
-              <a:rPr lang="fi-FI" dirty="0" err="1" smtClean="0"/>
-              <a:t>down</a:t>
-            </a:r>
-            <a:r>
-              <a:rPr lang="fi-FI" dirty="0" smtClean="0"/>
-              <a:t> </a:t>
-            </a:r>
-            <a:r>
-              <a:rPr lang="fi-FI" dirty="0" err="1" smtClean="0"/>
-              <a:t>time</a:t>
-            </a:r>
-            <a:endParaRPr lang="fi-FI" dirty="0" smtClean="0"/>
-          </a:p>
-          <a:p>
-            <a:r>
-              <a:rPr lang="fi-FI" dirty="0" err="1" smtClean="0"/>
-              <a:t>While</a:t>
-            </a:r>
-            <a:r>
-              <a:rPr lang="fi-FI" dirty="0"/>
-              <a:t> </a:t>
-            </a:r>
-            <a:r>
-              <a:rPr lang="fi-FI" dirty="0" err="1" smtClean="0"/>
-              <a:t>time</a:t>
-            </a:r>
-            <a:r>
-              <a:rPr lang="fi-FI" dirty="0" smtClean="0"/>
-              <a:t> is </a:t>
-            </a:r>
-            <a:r>
-              <a:rPr lang="fi-FI" dirty="0" err="1" smtClean="0"/>
-              <a:t>slowed</a:t>
-            </a:r>
-            <a:r>
-              <a:rPr lang="fi-FI" dirty="0" smtClean="0"/>
-              <a:t> </a:t>
-            </a:r>
-            <a:r>
-              <a:rPr lang="fi-FI" dirty="0" err="1" smtClean="0"/>
-              <a:t>you</a:t>
-            </a:r>
-            <a:r>
-              <a:rPr lang="fi-FI" dirty="0" smtClean="0"/>
-              <a:t> </a:t>
-            </a:r>
-            <a:r>
-              <a:rPr lang="fi-FI" dirty="0" err="1" smtClean="0"/>
-              <a:t>shoot</a:t>
-            </a:r>
-            <a:r>
-              <a:rPr lang="fi-FI" dirty="0" smtClean="0"/>
-              <a:t> at </a:t>
-            </a:r>
-            <a:r>
-              <a:rPr lang="fi-FI" dirty="0" err="1" smtClean="0"/>
-              <a:t>normal</a:t>
-            </a:r>
-            <a:r>
-              <a:rPr lang="fi-FI" dirty="0"/>
-              <a:t> </a:t>
-            </a:r>
-            <a:r>
-              <a:rPr lang="fi-FI" dirty="0" err="1" smtClean="0"/>
-              <a:t>rate</a:t>
-            </a:r>
-            <a:endParaRPr lang="fi-FI" dirty="0"/>
-          </a:p>
-        </p:txBody>
-      </p:sp>
-      <p:sp>
-        <p:nvSpPr>
-          <p:cNvPr id="4" name="Rectangle 3"/>
-          <p:cNvSpPr/>
-          <p:nvPr/>
-        </p:nvSpPr>
-        <p:spPr>
-          <a:xfrm>
-            <a:off x="6279419" y="1602223"/>
-            <a:ext cx="4928050" cy="3588368"/>
-          </a:xfrm>
-          <a:prstGeom prst="rect">
-            <a:avLst/>
-          </a:prstGeom>
-        </p:spPr>
-        <p:style>
-          <a:lnRef idx="2">
-            <a:schemeClr val="accent1">
-              <a:shade val="50000"/>
-            </a:schemeClr>
-          </a:lnRef>
-          <a:fillRef idx="1">
-            <a:schemeClr val="accent1"/>
-          </a:fillRef>
-          <a:effectRef idx="0">
-            <a:schemeClr val="accent1"/>
-          </a:effectRef>
-          <a:fontRef idx="minor">
-            <a:schemeClr val="lt1"/>
-          </a:fontRef>
-        </p:style>
-        <p:txBody>
-          <a:bodyPr rtlCol="0" anchor="ctr"/>
-          <a:lstStyle/>
-          <a:p>
-            <a:pPr algn="ctr"/>
-            <a:r>
-              <a:rPr lang="fi-FI" dirty="0" err="1" smtClean="0"/>
-              <a:t>Insert</a:t>
-            </a:r>
-            <a:r>
-              <a:rPr lang="fi-FI" dirty="0" smtClean="0"/>
-              <a:t> </a:t>
-            </a:r>
-            <a:r>
-              <a:rPr lang="fi-FI" dirty="0" err="1" smtClean="0"/>
-              <a:t>slow</a:t>
-            </a:r>
-            <a:r>
-              <a:rPr lang="fi-FI" dirty="0" smtClean="0"/>
-              <a:t> </a:t>
-            </a:r>
-            <a:r>
-              <a:rPr lang="fi-FI" dirty="0" err="1" smtClean="0"/>
-              <a:t>down</a:t>
-            </a:r>
-            <a:r>
-              <a:rPr lang="fi-FI" dirty="0" smtClean="0"/>
-              <a:t> video </a:t>
-            </a:r>
-            <a:r>
-              <a:rPr lang="fi-FI" dirty="0" err="1" smtClean="0"/>
-              <a:t>here</a:t>
-            </a:r>
-            <a:endParaRPr lang="fi-FI" dirty="0" smtClean="0"/>
-          </a:p>
-        </p:txBody>
-      </p:sp>
-    </p:spTree>
-    <p:extLst>
-      <p:ext uri="{BB962C8B-B14F-4D97-AF65-F5344CB8AC3E}">
-        <p14:creationId xmlns:p14="http://schemas.microsoft.com/office/powerpoint/2010/main" val="1007370559"/>
       </p:ext>
     </p:extLst>
   </p:cSld>
@@ -7770,6 +8387,331 @@
           <a:lstStyle/>
           <a:p>
             <a:r>
+              <a:rPr lang="fi-FI" dirty="0" err="1" smtClean="0"/>
+              <a:t>Slow</a:t>
+            </a:r>
+            <a:r>
+              <a:rPr lang="fi-FI" dirty="0" smtClean="0"/>
+              <a:t> </a:t>
+            </a:r>
+            <a:r>
+              <a:rPr lang="fi-FI" dirty="0" err="1" smtClean="0"/>
+              <a:t>down</a:t>
+            </a:r>
+            <a:r>
+              <a:rPr lang="fi-FI" dirty="0" smtClean="0"/>
+              <a:t> </a:t>
+            </a:r>
+            <a:r>
+              <a:rPr lang="fi-FI" dirty="0" err="1" smtClean="0"/>
+              <a:t>mechanic</a:t>
+            </a:r>
+            <a:endParaRPr lang="fi-FI" dirty="0"/>
+          </a:p>
+        </p:txBody>
+      </p:sp>
+      <p:sp>
+        <p:nvSpPr>
+          <p:cNvPr id="3" name="Content Placeholder 2"/>
+          <p:cNvSpPr>
+            <a:spLocks noGrp="1"/>
+          </p:cNvSpPr>
+          <p:nvPr>
+            <p:ph idx="1"/>
+          </p:nvPr>
+        </p:nvSpPr>
+        <p:spPr/>
+        <p:txBody>
+          <a:bodyPr/>
+          <a:lstStyle/>
+          <a:p>
+            <a:r>
+              <a:rPr lang="fi-FI" dirty="0" err="1" smtClean="0"/>
+              <a:t>Players</a:t>
+            </a:r>
+            <a:r>
+              <a:rPr lang="fi-FI" dirty="0" smtClean="0"/>
+              <a:t> </a:t>
+            </a:r>
+            <a:r>
+              <a:rPr lang="fi-FI" dirty="0" err="1" smtClean="0"/>
+              <a:t>can</a:t>
+            </a:r>
+            <a:r>
+              <a:rPr lang="fi-FI" dirty="0" smtClean="0"/>
+              <a:t> </a:t>
+            </a:r>
+            <a:r>
+              <a:rPr lang="fi-FI" dirty="0" err="1" smtClean="0"/>
+              <a:t>charge</a:t>
+            </a:r>
+            <a:r>
+              <a:rPr lang="fi-FI" dirty="0" smtClean="0"/>
+              <a:t> </a:t>
+            </a:r>
+            <a:r>
+              <a:rPr lang="fi-FI" dirty="0" err="1" smtClean="0"/>
+              <a:t>their</a:t>
+            </a:r>
+            <a:r>
+              <a:rPr lang="fi-FI" dirty="0" smtClean="0"/>
+              <a:t> </a:t>
+            </a:r>
+            <a:r>
+              <a:rPr lang="fi-FI" dirty="0" err="1" smtClean="0"/>
+              <a:t>slow</a:t>
+            </a:r>
+            <a:r>
+              <a:rPr lang="fi-FI" dirty="0" smtClean="0"/>
+              <a:t> </a:t>
+            </a:r>
+            <a:r>
+              <a:rPr lang="fi-FI" dirty="0" err="1" smtClean="0"/>
+              <a:t>down</a:t>
+            </a:r>
+            <a:r>
+              <a:rPr lang="fi-FI" dirty="0" smtClean="0"/>
+              <a:t> </a:t>
+            </a:r>
+            <a:r>
+              <a:rPr lang="fi-FI" dirty="0" err="1" smtClean="0"/>
+              <a:t>bar</a:t>
+            </a:r>
+            <a:endParaRPr lang="fi-FI" dirty="0" smtClean="0"/>
+          </a:p>
+          <a:p>
+            <a:r>
+              <a:rPr lang="fi-FI" dirty="0" err="1" smtClean="0"/>
+              <a:t>They</a:t>
+            </a:r>
+            <a:r>
+              <a:rPr lang="fi-FI" dirty="0" smtClean="0"/>
+              <a:t> </a:t>
+            </a:r>
+            <a:r>
+              <a:rPr lang="fi-FI" dirty="0" err="1" smtClean="0"/>
+              <a:t>can</a:t>
+            </a:r>
+            <a:r>
+              <a:rPr lang="fi-FI" dirty="0" smtClean="0"/>
+              <a:t> </a:t>
+            </a:r>
+            <a:r>
+              <a:rPr lang="fi-FI" dirty="0" err="1" smtClean="0"/>
+              <a:t>drain</a:t>
+            </a:r>
+            <a:r>
+              <a:rPr lang="fi-FI" dirty="0" smtClean="0"/>
+              <a:t> it </a:t>
+            </a:r>
+            <a:r>
+              <a:rPr lang="fi-FI" dirty="0" err="1" smtClean="0"/>
+              <a:t>by</a:t>
+            </a:r>
+            <a:r>
+              <a:rPr lang="fi-FI" dirty="0" smtClean="0"/>
+              <a:t> </a:t>
+            </a:r>
+            <a:r>
+              <a:rPr lang="fi-FI" dirty="0" err="1" smtClean="0"/>
+              <a:t>slowing</a:t>
+            </a:r>
+            <a:r>
+              <a:rPr lang="fi-FI" dirty="0" smtClean="0"/>
+              <a:t> </a:t>
+            </a:r>
+            <a:r>
+              <a:rPr lang="fi-FI" dirty="0" err="1" smtClean="0"/>
+              <a:t>down</a:t>
+            </a:r>
+            <a:r>
+              <a:rPr lang="fi-FI" dirty="0" smtClean="0"/>
+              <a:t> </a:t>
+            </a:r>
+            <a:r>
+              <a:rPr lang="fi-FI" dirty="0" err="1" smtClean="0"/>
+              <a:t>time</a:t>
+            </a:r>
+            <a:endParaRPr lang="fi-FI" dirty="0" smtClean="0"/>
+          </a:p>
+          <a:p>
+            <a:r>
+              <a:rPr lang="fi-FI" dirty="0" err="1" smtClean="0"/>
+              <a:t>While</a:t>
+            </a:r>
+            <a:r>
+              <a:rPr lang="fi-FI" dirty="0"/>
+              <a:t> </a:t>
+            </a:r>
+            <a:r>
+              <a:rPr lang="fi-FI" dirty="0" err="1" smtClean="0"/>
+              <a:t>time</a:t>
+            </a:r>
+            <a:r>
+              <a:rPr lang="fi-FI" dirty="0" smtClean="0"/>
+              <a:t> is </a:t>
+            </a:r>
+            <a:r>
+              <a:rPr lang="fi-FI" dirty="0" err="1" smtClean="0"/>
+              <a:t>slowed</a:t>
+            </a:r>
+            <a:r>
+              <a:rPr lang="fi-FI" dirty="0" smtClean="0"/>
+              <a:t> </a:t>
+            </a:r>
+            <a:r>
+              <a:rPr lang="fi-FI" dirty="0" err="1" smtClean="0"/>
+              <a:t>you</a:t>
+            </a:r>
+            <a:r>
+              <a:rPr lang="fi-FI" dirty="0" smtClean="0"/>
+              <a:t> </a:t>
+            </a:r>
+            <a:r>
+              <a:rPr lang="fi-FI" dirty="0" err="1" smtClean="0"/>
+              <a:t>shoot</a:t>
+            </a:r>
+            <a:r>
+              <a:rPr lang="fi-FI" dirty="0" smtClean="0"/>
+              <a:t> at </a:t>
+            </a:r>
+            <a:r>
+              <a:rPr lang="fi-FI" dirty="0" err="1" smtClean="0"/>
+              <a:t>normal</a:t>
+            </a:r>
+            <a:r>
+              <a:rPr lang="fi-FI" dirty="0"/>
+              <a:t> </a:t>
+            </a:r>
+            <a:r>
+              <a:rPr lang="fi-FI" dirty="0" err="1" smtClean="0"/>
+              <a:t>rate</a:t>
+            </a:r>
+            <a:endParaRPr lang="fi-FI" dirty="0"/>
+          </a:p>
+        </p:txBody>
+      </p:sp>
+      <p:sp>
+        <p:nvSpPr>
+          <p:cNvPr id="4" name="Rectangle 3"/>
+          <p:cNvSpPr/>
+          <p:nvPr/>
+        </p:nvSpPr>
+        <p:spPr>
+          <a:xfrm>
+            <a:off x="6279419" y="1602223"/>
+            <a:ext cx="4928050" cy="3588368"/>
+          </a:xfrm>
+          <a:prstGeom prst="rect">
+            <a:avLst/>
+          </a:prstGeom>
+        </p:spPr>
+        <p:style>
+          <a:lnRef idx="2">
+            <a:schemeClr val="accent1">
+              <a:shade val="50000"/>
+            </a:schemeClr>
+          </a:lnRef>
+          <a:fillRef idx="1">
+            <a:schemeClr val="accent1"/>
+          </a:fillRef>
+          <a:effectRef idx="0">
+            <a:schemeClr val="accent1"/>
+          </a:effectRef>
+          <a:fontRef idx="minor">
+            <a:schemeClr val="lt1"/>
+          </a:fontRef>
+        </p:style>
+        <p:txBody>
+          <a:bodyPr rtlCol="0" anchor="ctr"/>
+          <a:lstStyle/>
+          <a:p>
+            <a:pPr algn="ctr"/>
+            <a:r>
+              <a:rPr lang="fi-FI" dirty="0" err="1" smtClean="0"/>
+              <a:t>Insert</a:t>
+            </a:r>
+            <a:r>
+              <a:rPr lang="fi-FI" dirty="0" smtClean="0"/>
+              <a:t> </a:t>
+            </a:r>
+            <a:r>
+              <a:rPr lang="fi-FI" dirty="0" err="1" smtClean="0"/>
+              <a:t>slow</a:t>
+            </a:r>
+            <a:r>
+              <a:rPr lang="fi-FI" dirty="0" smtClean="0"/>
+              <a:t> </a:t>
+            </a:r>
+            <a:r>
+              <a:rPr lang="fi-FI" dirty="0" err="1" smtClean="0"/>
+              <a:t>down</a:t>
+            </a:r>
+            <a:r>
+              <a:rPr lang="fi-FI" dirty="0" smtClean="0"/>
+              <a:t> video </a:t>
+            </a:r>
+            <a:r>
+              <a:rPr lang="fi-FI" dirty="0" err="1" smtClean="0"/>
+              <a:t>here</a:t>
+            </a:r>
+            <a:endParaRPr lang="fi-FI" dirty="0" smtClean="0"/>
+          </a:p>
+        </p:txBody>
+      </p:sp>
+    </p:spTree>
+    <p:extLst>
+      <p:ext uri="{BB962C8B-B14F-4D97-AF65-F5344CB8AC3E}">
+        <p14:creationId xmlns:p14="http://schemas.microsoft.com/office/powerpoint/2010/main" val="1007370559"/>
+      </p:ext>
+    </p:extLst>
+  </p:cSld>
+  <p:clrMapOvr>
+    <a:masterClrMapping/>
+  </p:clrMapOvr>
+  <p:timing>
+    <p:tnLst>
+      <p:par>
+        <p:cTn id="1" dur="indefinite" restart="never" nodeType="tmRoot"/>
+      </p:par>
+    </p:tnLst>
+  </p:timing>
+</p:sld>
+</file>
+
+<file path=ppt/slides/slide6.xml><?xml version="1.0" encoding="utf-8"?>
+<p:sld xmlns:a="http://schemas.openxmlformats.org/drawingml/2006/main" xmlns:r="http://schemas.openxmlformats.org/officeDocument/2006/relationships" xmlns:p="http://schemas.openxmlformats.org/presentationml/2006/main">
+  <p:cSld>
+    <p:spTree>
+      <p:nvGrpSpPr>
+        <p:cNvPr id="1" name=""/>
+        <p:cNvGrpSpPr/>
+        <p:nvPr/>
+      </p:nvGrpSpPr>
+      <p:grpSpPr>
+        <a:xfrm>
+          <a:off x="0" y="0"/>
+          <a:ext cx="0" cy="0"/>
+          <a:chOff x="0" y="0"/>
+          <a:chExt cx="0" cy="0"/>
+        </a:xfrm>
+      </p:grpSpPr>
+      <p:sp>
+        <p:nvSpPr>
+          <p:cNvPr id="2" name="Title 1"/>
+          <p:cNvSpPr>
+            <a:spLocks noGrp="1"/>
+          </p:cNvSpPr>
+          <p:nvPr>
+            <p:ph type="title"/>
+          </p:nvPr>
+        </p:nvSpPr>
+        <p:spPr/>
+        <p:txBody>
+          <a:bodyPr/>
+          <a:lstStyle/>
+          <a:p>
+            <a:r>
               <a:rPr lang="fi-FI" dirty="0" smtClean="0"/>
               <a:t>Content</a:t>
             </a:r>
@@ -7873,11 +8815,7 @@
           <a:p>
             <a:r>
               <a:rPr lang="fi-FI" dirty="0" smtClean="0"/>
-              <a:t>Three awesome </a:t>
-            </a:r>
-            <a:r>
-              <a:rPr lang="fi-FI" dirty="0" smtClean="0"/>
-              <a:t>maps</a:t>
+              <a:t>Three awesome maps</a:t>
             </a:r>
           </a:p>
           <a:p>
@@ -7906,7 +8844,6 @@
               <a:rPr lang="fi-FI" dirty="0" smtClean="0"/>
               <a:t>		</a:t>
             </a:r>
-            <a:endParaRPr lang="fi-FI" dirty="0" smtClean="0"/>
           </a:p>
           <a:p>
             <a:pPr marL="0" indent="0">
@@ -7914,11 +8851,7 @@
             </a:pPr>
             <a:r>
               <a:rPr lang="fi-FI" dirty="0" smtClean="0"/>
-              <a:t>Jungle</a:t>
-            </a:r>
-            <a:r>
-              <a:rPr lang="fi-FI" dirty="0" smtClean="0"/>
-              <a:t>				</a:t>
+              <a:t>Jungle				</a:t>
             </a:r>
             <a:r>
               <a:rPr lang="fi-FI" dirty="0"/>
@@ -8724,415 +9657,6 @@
 </p:sld>
 </file>
 
-<file path=ppt/slides/slide6.xml><?xml version="1.0" encoding="utf-8"?>
-<p:sld xmlns:a="http://schemas.openxmlformats.org/drawingml/2006/main" xmlns:r="http://schemas.openxmlformats.org/officeDocument/2006/relationships" xmlns:p="http://schemas.openxmlformats.org/presentationml/2006/main">
-  <p:cSld>
-    <p:spTree>
-      <p:nvGrpSpPr>
-        <p:cNvPr id="1" name=""/>
-        <p:cNvGrpSpPr/>
-        <p:nvPr/>
-      </p:nvGrpSpPr>
-      <p:grpSpPr>
-        <a:xfrm>
-          <a:off x="0" y="0"/>
-          <a:ext cx="0" cy="0"/>
-          <a:chOff x="0" y="0"/>
-          <a:chExt cx="0" cy="0"/>
-        </a:xfrm>
-      </p:grpSpPr>
-      <p:sp>
-        <p:nvSpPr>
-          <p:cNvPr id="2" name="Title 1"/>
-          <p:cNvSpPr>
-            <a:spLocks noGrp="1"/>
-          </p:cNvSpPr>
-          <p:nvPr>
-            <p:ph type="title"/>
-          </p:nvPr>
-        </p:nvSpPr>
-        <p:spPr/>
-        <p:txBody>
-          <a:bodyPr/>
-          <a:lstStyle/>
-          <a:p>
-            <a:r>
-              <a:rPr lang="fi-FI" dirty="0" smtClean="0"/>
-              <a:t>More </a:t>
-            </a:r>
-            <a:r>
-              <a:rPr lang="fi-FI" dirty="0" err="1" smtClean="0"/>
-              <a:t>content</a:t>
-            </a:r>
-            <a:endParaRPr lang="en-US" dirty="0"/>
-          </a:p>
-        </p:txBody>
-      </p:sp>
-      <p:sp>
-        <p:nvSpPr>
-          <p:cNvPr id="3" name="Content Placeholder 2"/>
-          <p:cNvSpPr>
-            <a:spLocks noGrp="1"/>
-          </p:cNvSpPr>
-          <p:nvPr>
-            <p:ph idx="1"/>
-          </p:nvPr>
-        </p:nvSpPr>
-        <p:spPr>
-          <a:xfrm>
-            <a:off x="677333" y="1602223"/>
-            <a:ext cx="10174085" cy="4439139"/>
-          </a:xfrm>
-        </p:spPr>
-        <p:txBody>
-          <a:bodyPr/>
-          <a:lstStyle/>
-          <a:p>
-            <a:r>
-              <a:rPr lang="fi-FI" dirty="0" err="1" smtClean="0"/>
-              <a:t>Four</a:t>
-            </a:r>
-            <a:r>
-              <a:rPr lang="fi-FI" dirty="0" smtClean="0"/>
-              <a:t> </a:t>
-            </a:r>
-            <a:r>
-              <a:rPr lang="fi-FI" dirty="0" err="1" smtClean="0"/>
-              <a:t>dangerous</a:t>
-            </a:r>
-            <a:r>
-              <a:rPr lang="fi-FI" dirty="0" smtClean="0"/>
-              <a:t> </a:t>
-            </a:r>
-            <a:r>
-              <a:rPr lang="fi-FI" dirty="0" err="1" smtClean="0"/>
-              <a:t>enemies</a:t>
-            </a:r>
-            <a:endParaRPr lang="fi-FI" dirty="0" smtClean="0"/>
-          </a:p>
-          <a:p>
-            <a:endParaRPr lang="fi-FI" dirty="0"/>
-          </a:p>
-          <a:p>
-            <a:endParaRPr lang="fi-FI" dirty="0" smtClean="0"/>
-          </a:p>
-          <a:p>
-            <a:endParaRPr lang="fi-FI" dirty="0"/>
-          </a:p>
-          <a:p>
-            <a:endParaRPr lang="fi-FI" dirty="0" smtClean="0"/>
-          </a:p>
-          <a:p>
-            <a:endParaRPr lang="fi-FI" dirty="0"/>
-          </a:p>
-          <a:p>
-            <a:pPr marL="0" indent="0">
-              <a:buNone/>
-            </a:pPr>
-            <a:r>
-              <a:rPr lang="fi-FI" dirty="0" smtClean="0"/>
-              <a:t>   </a:t>
-            </a:r>
-            <a:r>
-              <a:rPr lang="fi-FI" dirty="0" err="1" smtClean="0"/>
-              <a:t>Swarm</a:t>
-            </a:r>
-            <a:r>
-              <a:rPr lang="fi-FI" dirty="0" smtClean="0"/>
-              <a:t> </a:t>
-            </a:r>
-            <a:r>
-              <a:rPr lang="fi-FI" dirty="0" err="1" smtClean="0"/>
-              <a:t>enemy</a:t>
-            </a:r>
-            <a:r>
-              <a:rPr lang="fi-FI" dirty="0" smtClean="0"/>
-              <a:t>			Crystal </a:t>
-            </a:r>
-            <a:r>
-              <a:rPr lang="fi-FI" dirty="0" err="1" smtClean="0"/>
-              <a:t>enemy</a:t>
-            </a:r>
-            <a:r>
-              <a:rPr lang="fi-FI" dirty="0" smtClean="0"/>
-              <a:t>		  	   </a:t>
-            </a:r>
-            <a:r>
-              <a:rPr lang="fi-FI" dirty="0" err="1" smtClean="0"/>
-              <a:t>Worm</a:t>
-            </a:r>
-            <a:r>
-              <a:rPr lang="fi-FI" dirty="0" smtClean="0"/>
-              <a:t>				    </a:t>
-            </a:r>
-            <a:r>
-              <a:rPr lang="fi-FI" dirty="0" err="1" smtClean="0"/>
-              <a:t>Beholder</a:t>
-            </a:r>
-            <a:endParaRPr lang="en-US" dirty="0"/>
-          </a:p>
-        </p:txBody>
-      </p:sp>
-      <p:sp>
-        <p:nvSpPr>
-          <p:cNvPr id="4" name="Rectangle 3"/>
-          <p:cNvSpPr/>
-          <p:nvPr/>
-        </p:nvSpPr>
-        <p:spPr>
-          <a:xfrm>
-            <a:off x="677334" y="2112020"/>
-            <a:ext cx="2195339" cy="1747881"/>
-          </a:xfrm>
-          <a:prstGeom prst="rect">
-            <a:avLst/>
-          </a:prstGeom>
-        </p:spPr>
-        <p:style>
-          <a:lnRef idx="2">
-            <a:schemeClr val="accent1">
-              <a:shade val="50000"/>
-            </a:schemeClr>
-          </a:lnRef>
-          <a:fillRef idx="1">
-            <a:schemeClr val="accent1"/>
-          </a:fillRef>
-          <a:effectRef idx="0">
-            <a:schemeClr val="accent1"/>
-          </a:effectRef>
-          <a:fontRef idx="minor">
-            <a:schemeClr val="lt1"/>
-          </a:fontRef>
-        </p:style>
-        <p:txBody>
-          <a:bodyPr rtlCol="0" anchor="ctr"/>
-          <a:lstStyle/>
-          <a:p>
-            <a:pPr algn="ctr"/>
-            <a:r>
-              <a:rPr lang="fi-FI" dirty="0" err="1" smtClean="0"/>
-              <a:t>Insert</a:t>
-            </a:r>
-            <a:r>
-              <a:rPr lang="fi-FI" dirty="0" smtClean="0"/>
-              <a:t> </a:t>
-            </a:r>
-            <a:r>
-              <a:rPr lang="fi-FI" dirty="0" err="1" smtClean="0"/>
-              <a:t>enemy</a:t>
-            </a:r>
-            <a:r>
-              <a:rPr lang="fi-FI" dirty="0" smtClean="0"/>
-              <a:t> image </a:t>
-            </a:r>
-            <a:r>
-              <a:rPr lang="fi-FI" dirty="0" err="1" smtClean="0"/>
-              <a:t>here</a:t>
-            </a:r>
-            <a:endParaRPr lang="fi-FI" dirty="0" smtClean="0"/>
-          </a:p>
-        </p:txBody>
-      </p:sp>
-      <p:sp>
-        <p:nvSpPr>
-          <p:cNvPr id="8" name="Rectangle 7"/>
-          <p:cNvSpPr/>
-          <p:nvPr/>
-        </p:nvSpPr>
-        <p:spPr>
-          <a:xfrm>
-            <a:off x="3200701" y="2112019"/>
-            <a:ext cx="2195339" cy="1747881"/>
-          </a:xfrm>
-          <a:prstGeom prst="rect">
-            <a:avLst/>
-          </a:prstGeom>
-        </p:spPr>
-        <p:style>
-          <a:lnRef idx="2">
-            <a:schemeClr val="accent1">
-              <a:shade val="50000"/>
-            </a:schemeClr>
-          </a:lnRef>
-          <a:fillRef idx="1">
-            <a:schemeClr val="accent1"/>
-          </a:fillRef>
-          <a:effectRef idx="0">
-            <a:schemeClr val="accent1"/>
-          </a:effectRef>
-          <a:fontRef idx="minor">
-            <a:schemeClr val="lt1"/>
-          </a:fontRef>
-        </p:style>
-        <p:txBody>
-          <a:bodyPr rtlCol="0" anchor="ctr"/>
-          <a:lstStyle/>
-          <a:p>
-            <a:pPr algn="ctr"/>
-            <a:r>
-              <a:rPr lang="fi-FI" dirty="0" err="1" smtClean="0"/>
-              <a:t>Insert</a:t>
-            </a:r>
-            <a:r>
-              <a:rPr lang="fi-FI" dirty="0" smtClean="0"/>
-              <a:t> </a:t>
-            </a:r>
-            <a:r>
-              <a:rPr lang="fi-FI" dirty="0" err="1" smtClean="0"/>
-              <a:t>enemy</a:t>
-            </a:r>
-            <a:r>
-              <a:rPr lang="fi-FI" dirty="0" smtClean="0"/>
-              <a:t> image </a:t>
-            </a:r>
-            <a:r>
-              <a:rPr lang="fi-FI" dirty="0" err="1" smtClean="0"/>
-              <a:t>here</a:t>
-            </a:r>
-            <a:endParaRPr lang="fi-FI" dirty="0" smtClean="0"/>
-          </a:p>
-        </p:txBody>
-      </p:sp>
-      <p:sp>
-        <p:nvSpPr>
-          <p:cNvPr id="9" name="Rectangle 8"/>
-          <p:cNvSpPr/>
-          <p:nvPr/>
-        </p:nvSpPr>
-        <p:spPr>
-          <a:xfrm>
-            <a:off x="5724068" y="2114370"/>
-            <a:ext cx="2195339" cy="1747881"/>
-          </a:xfrm>
-          <a:prstGeom prst="rect">
-            <a:avLst/>
-          </a:prstGeom>
-        </p:spPr>
-        <p:style>
-          <a:lnRef idx="2">
-            <a:schemeClr val="accent1">
-              <a:shade val="50000"/>
-            </a:schemeClr>
-          </a:lnRef>
-          <a:fillRef idx="1">
-            <a:schemeClr val="accent1"/>
-          </a:fillRef>
-          <a:effectRef idx="0">
-            <a:schemeClr val="accent1"/>
-          </a:effectRef>
-          <a:fontRef idx="minor">
-            <a:schemeClr val="lt1"/>
-          </a:fontRef>
-        </p:style>
-        <p:txBody>
-          <a:bodyPr rtlCol="0" anchor="ctr"/>
-          <a:lstStyle/>
-          <a:p>
-            <a:pPr algn="ctr"/>
-            <a:r>
-              <a:rPr lang="fi-FI" dirty="0" err="1" smtClean="0"/>
-              <a:t>Insert</a:t>
-            </a:r>
-            <a:r>
-              <a:rPr lang="fi-FI" dirty="0" smtClean="0"/>
-              <a:t> </a:t>
-            </a:r>
-            <a:r>
-              <a:rPr lang="fi-FI" dirty="0" err="1" smtClean="0"/>
-              <a:t>enemy</a:t>
-            </a:r>
-            <a:r>
-              <a:rPr lang="fi-FI" dirty="0" smtClean="0"/>
-              <a:t> image </a:t>
-            </a:r>
-            <a:r>
-              <a:rPr lang="fi-FI" dirty="0" err="1" smtClean="0"/>
-              <a:t>here</a:t>
-            </a:r>
-            <a:endParaRPr lang="fi-FI" dirty="0" smtClean="0"/>
-          </a:p>
-        </p:txBody>
-      </p:sp>
-      <p:sp>
-        <p:nvSpPr>
-          <p:cNvPr id="10" name="Rectangle 9"/>
-          <p:cNvSpPr/>
-          <p:nvPr/>
-        </p:nvSpPr>
-        <p:spPr>
-          <a:xfrm>
-            <a:off x="8247435" y="2112018"/>
-            <a:ext cx="2195339" cy="1747881"/>
-          </a:xfrm>
-          <a:prstGeom prst="rect">
-            <a:avLst/>
-          </a:prstGeom>
-        </p:spPr>
-        <p:style>
-          <a:lnRef idx="2">
-            <a:schemeClr val="accent1">
-              <a:shade val="50000"/>
-            </a:schemeClr>
-          </a:lnRef>
-          <a:fillRef idx="1">
-            <a:schemeClr val="accent1"/>
-          </a:fillRef>
-          <a:effectRef idx="0">
-            <a:schemeClr val="accent1"/>
-          </a:effectRef>
-          <a:fontRef idx="minor">
-            <a:schemeClr val="lt1"/>
-          </a:fontRef>
-        </p:style>
-        <p:txBody>
-          <a:bodyPr rtlCol="0" anchor="ctr"/>
-          <a:lstStyle/>
-          <a:p>
-            <a:pPr algn="ctr"/>
-            <a:r>
-              <a:rPr lang="fi-FI" dirty="0" err="1" smtClean="0"/>
-              <a:t>Insert</a:t>
-            </a:r>
-            <a:r>
-              <a:rPr lang="fi-FI" dirty="0" smtClean="0"/>
-              <a:t> </a:t>
-            </a:r>
-            <a:r>
-              <a:rPr lang="fi-FI" dirty="0" err="1" smtClean="0"/>
-              <a:t>enemy</a:t>
-            </a:r>
-            <a:r>
-              <a:rPr lang="fi-FI" dirty="0" smtClean="0"/>
-              <a:t> image </a:t>
-            </a:r>
-            <a:r>
-              <a:rPr lang="fi-FI" dirty="0" err="1" smtClean="0"/>
-              <a:t>here</a:t>
-            </a:r>
-            <a:endParaRPr lang="fi-FI" dirty="0" smtClean="0"/>
-          </a:p>
-        </p:txBody>
-      </p:sp>
-    </p:spTree>
-    <p:extLst>
-      <p:ext uri="{BB962C8B-B14F-4D97-AF65-F5344CB8AC3E}">
-        <p14:creationId xmlns:p14="http://schemas.microsoft.com/office/powerpoint/2010/main" val="73279792"/>
-      </p:ext>
-    </p:extLst>
-  </p:cSld>
-  <p:clrMapOvr>
-    <a:masterClrMapping/>
-  </p:clrMapOvr>
-  <p:timing>
-    <p:tnLst>
-      <p:par>
-        <p:cTn id="1" dur="indefinite" restart="never" nodeType="tmRoot"/>
-      </p:par>
-    </p:tnLst>
-  </p:timing>
-</p:sld>
-</file>
-
 <file path=ppt/slides/slide7.xml><?xml version="1.0" encoding="utf-8"?>
 <p:sld xmlns:a="http://schemas.openxmlformats.org/drawingml/2006/main" xmlns:r="http://schemas.openxmlformats.org/officeDocument/2006/relationships" xmlns:p="http://schemas.openxmlformats.org/presentationml/2006/main">
   <p:cSld>
@@ -9166,10 +9690,14 @@
           <a:lstStyle/>
           <a:p>
             <a:r>
-              <a:rPr lang="fi-FI" dirty="0" err="1" smtClean="0"/>
-              <a:t>Premise</a:t>
-            </a:r>
-            <a:endParaRPr lang="fi-FI" dirty="0"/>
+              <a:rPr lang="fi-FI" dirty="0" smtClean="0"/>
+              <a:t>More </a:t>
+            </a:r>
+            <a:r>
+              <a:rPr lang="fi-FI" dirty="0" err="1" smtClean="0"/>
+              <a:t>content</a:t>
+            </a:r>
+            <a:endParaRPr lang="en-US" dirty="0"/>
           </a:p>
         </p:txBody>
       </p:sp>
@@ -9186,7 +9714,7 @@
         <p:spPr>
           <a:xfrm>
             <a:off x="677333" y="1602223"/>
-            <a:ext cx="8677059" cy="4439139"/>
+            <a:ext cx="10174085" cy="4439139"/>
           </a:xfrm>
         </p:spPr>
         <p:txBody>
@@ -9195,220 +9723,302 @@
           <a:p>
             <a:r>
               <a:rPr lang="fi-FI" dirty="0" smtClean="0"/>
-              <a:t>Little </a:t>
-            </a:r>
-            <a:r>
-              <a:rPr lang="fi-FI" dirty="0" err="1" smtClean="0"/>
-              <a:t>previous</a:t>
-            </a:r>
-            <a:r>
-              <a:rPr lang="fi-FI" dirty="0" smtClean="0"/>
-              <a:t> </a:t>
-            </a:r>
-            <a:r>
-              <a:rPr lang="fi-FI" dirty="0" err="1" smtClean="0"/>
-              <a:t>Unreal</a:t>
-            </a:r>
-            <a:r>
-              <a:rPr lang="fi-FI" dirty="0" smtClean="0"/>
-              <a:t> Engine 4 </a:t>
-            </a:r>
-            <a:r>
-              <a:rPr lang="fi-FI" dirty="0" err="1" smtClean="0"/>
-              <a:t>experience</a:t>
-            </a:r>
+              <a:t>Four dangerous </a:t>
+            </a:r>
+            <a:r>
+              <a:rPr lang="fi-FI" dirty="0" smtClean="0"/>
+              <a:t>enemies</a:t>
+            </a:r>
+          </a:p>
+          <a:p>
+            <a:endParaRPr lang="fi-FI" dirty="0"/>
+          </a:p>
+          <a:p>
             <a:endParaRPr lang="fi-FI" dirty="0" smtClean="0"/>
           </a:p>
           <a:p>
-            <a:r>
-              <a:rPr lang="fi-FI" dirty="0" err="1" smtClean="0"/>
-              <a:t>Wanted</a:t>
-            </a:r>
-            <a:r>
-              <a:rPr lang="fi-FI" dirty="0" smtClean="0"/>
-              <a:t> to </a:t>
-            </a:r>
-            <a:r>
-              <a:rPr lang="fi-FI" dirty="0" err="1" smtClean="0"/>
-              <a:t>use</a:t>
-            </a:r>
-            <a:r>
-              <a:rPr lang="fi-FI" dirty="0" smtClean="0"/>
-              <a:t> </a:t>
-            </a:r>
-            <a:r>
-              <a:rPr lang="fi-FI" dirty="0" err="1" smtClean="0"/>
-              <a:t>Unreal</a:t>
-            </a:r>
-            <a:r>
-              <a:rPr lang="fi-FI" dirty="0" smtClean="0"/>
-              <a:t> Engine 4 </a:t>
-            </a:r>
-            <a:r>
-              <a:rPr lang="en-US" dirty="0" smtClean="0"/>
-              <a:t>because</a:t>
-            </a:r>
-            <a:r>
-              <a:rPr lang="fi-FI" dirty="0" smtClean="0"/>
-              <a:t> it </a:t>
-            </a:r>
-            <a:r>
-              <a:rPr lang="fi-FI" dirty="0" err="1" smtClean="0"/>
-              <a:t>seemed</a:t>
-            </a:r>
-            <a:r>
-              <a:rPr lang="fi-FI" dirty="0" smtClean="0"/>
-              <a:t> </a:t>
-            </a:r>
-            <a:r>
-              <a:rPr lang="fi-FI" dirty="0" err="1" smtClean="0"/>
-              <a:t>better</a:t>
-            </a:r>
-            <a:r>
-              <a:rPr lang="fi-FI" dirty="0" smtClean="0"/>
-              <a:t> </a:t>
-            </a:r>
-            <a:r>
-              <a:rPr lang="fi-FI" dirty="0" err="1" smtClean="0"/>
-              <a:t>than</a:t>
-            </a:r>
-            <a:r>
-              <a:rPr lang="fi-FI" dirty="0" smtClean="0"/>
-              <a:t> </a:t>
-            </a:r>
-            <a:r>
-              <a:rPr lang="fi-FI" dirty="0" err="1" smtClean="0"/>
-              <a:t>Unity</a:t>
-            </a:r>
+            <a:endParaRPr lang="fi-FI" dirty="0"/>
+          </a:p>
+          <a:p>
             <a:endParaRPr lang="fi-FI" dirty="0" smtClean="0"/>
           </a:p>
           <a:p>
-            <a:r>
-              <a:rPr lang="fi-FI" dirty="0" err="1"/>
-              <a:t>Had</a:t>
+            <a:endParaRPr lang="fi-FI" dirty="0"/>
+          </a:p>
+          <a:p>
+            <a:endParaRPr lang="fi-FI" dirty="0" smtClean="0"/>
+          </a:p>
+          <a:p>
+            <a:endParaRPr lang="fi-FI" dirty="0"/>
+          </a:p>
+          <a:p>
+            <a:pPr marL="0" indent="0">
+              <a:buNone/>
+            </a:pPr>
+            <a:r>
+              <a:rPr lang="fi-FI" dirty="0" smtClean="0"/>
+              <a:t>   Swarm enemy		</a:t>
+            </a:r>
+            <a:r>
+              <a:rPr lang="fi-FI" dirty="0" smtClean="0"/>
+              <a:t>Crystal </a:t>
+            </a:r>
+            <a:r>
+              <a:rPr lang="fi-FI" dirty="0" smtClean="0"/>
+              <a:t>enemy		  	  </a:t>
             </a:r>
             <a:r>
               <a:rPr lang="fi-FI" dirty="0"/>
               <a:t> </a:t>
             </a:r>
             <a:r>
-              <a:rPr lang="fi-FI" dirty="0" err="1"/>
-              <a:t>few</a:t>
-            </a:r>
-            <a:r>
-              <a:rPr lang="fi-FI" dirty="0"/>
-              <a:t> </a:t>
-            </a:r>
-            <a:r>
-              <a:rPr lang="fi-FI" dirty="0" err="1"/>
-              <a:t>game</a:t>
-            </a:r>
-            <a:r>
-              <a:rPr lang="fi-FI" dirty="0"/>
-              <a:t> </a:t>
-            </a:r>
-            <a:r>
-              <a:rPr lang="fi-FI" dirty="0" err="1" smtClean="0"/>
-              <a:t>ideas</a:t>
-            </a:r>
-            <a:r>
-              <a:rPr lang="fi-FI" dirty="0" smtClean="0"/>
-              <a:t> </a:t>
-            </a:r>
-            <a:r>
-              <a:rPr lang="fi-FI" dirty="0" err="1" smtClean="0"/>
-              <a:t>but</a:t>
-            </a:r>
-            <a:r>
-              <a:rPr lang="fi-FI" dirty="0" smtClean="0"/>
-              <a:t> </a:t>
-            </a:r>
-            <a:r>
-              <a:rPr lang="fi-FI" dirty="0" err="1" smtClean="0"/>
-              <a:t>this</a:t>
-            </a:r>
-            <a:r>
-              <a:rPr lang="fi-FI" dirty="0" smtClean="0"/>
-              <a:t> </a:t>
-            </a:r>
-            <a:r>
-              <a:rPr lang="fi-FI" dirty="0" err="1" smtClean="0"/>
-              <a:t>seemed</a:t>
-            </a:r>
-            <a:r>
-              <a:rPr lang="fi-FI" dirty="0" smtClean="0"/>
-              <a:t> </a:t>
-            </a:r>
-            <a:r>
-              <a:rPr lang="fi-FI" dirty="0" err="1" smtClean="0"/>
-              <a:t>the</a:t>
-            </a:r>
-            <a:r>
-              <a:rPr lang="fi-FI" dirty="0" smtClean="0"/>
-              <a:t> </a:t>
-            </a:r>
-            <a:r>
-              <a:rPr lang="fi-FI" dirty="0" err="1" smtClean="0"/>
-              <a:t>most</a:t>
-            </a:r>
-            <a:r>
-              <a:rPr lang="fi-FI" dirty="0" smtClean="0"/>
-              <a:t> </a:t>
-            </a:r>
-            <a:r>
-              <a:rPr lang="fi-FI" dirty="0" err="1" smtClean="0"/>
-              <a:t>doable</a:t>
-            </a:r>
-            <a:r>
-              <a:rPr lang="fi-FI" dirty="0"/>
-              <a:t> </a:t>
-            </a:r>
-            <a:r>
-              <a:rPr lang="fi-FI" dirty="0" smtClean="0"/>
-              <a:t>in </a:t>
-            </a:r>
-            <a:r>
-              <a:rPr lang="fi-FI" dirty="0" err="1" smtClean="0"/>
-              <a:t>the</a:t>
-            </a:r>
-            <a:r>
-              <a:rPr lang="fi-FI" dirty="0" smtClean="0"/>
-              <a:t> </a:t>
-            </a:r>
-            <a:r>
-              <a:rPr lang="fi-FI" dirty="0" err="1" smtClean="0"/>
-              <a:t>course</a:t>
-            </a:r>
-            <a:r>
-              <a:rPr lang="fi-FI" dirty="0" smtClean="0"/>
-              <a:t> </a:t>
-            </a:r>
-            <a:r>
-              <a:rPr lang="fi-FI" dirty="0" err="1" smtClean="0"/>
-              <a:t>time</a:t>
-            </a:r>
-            <a:r>
-              <a:rPr lang="fi-FI" dirty="0" smtClean="0"/>
-              <a:t> </a:t>
-            </a:r>
-            <a:r>
-              <a:rPr lang="fi-FI" dirty="0" err="1" smtClean="0"/>
-              <a:t>frame</a:t>
-            </a:r>
-            <a:endParaRPr lang="fi-FI" dirty="0"/>
-          </a:p>
-          <a:p>
-            <a:endParaRPr lang="fi-FI" dirty="0"/>
-          </a:p>
-          <a:p>
-            <a:endParaRPr lang="fi-FI" dirty="0" smtClean="0"/>
-          </a:p>
-        </p:txBody>
-      </p:sp>
+              <a:rPr lang="fi-FI" dirty="0" smtClean="0"/>
+              <a:t> </a:t>
+            </a:r>
+            <a:r>
+              <a:rPr lang="fi-FI" dirty="0" smtClean="0"/>
+              <a:t> </a:t>
+            </a:r>
+            <a:r>
+              <a:rPr lang="fi-FI" dirty="0" smtClean="0"/>
+              <a:t>Worm	</a:t>
+            </a:r>
+            <a:r>
+              <a:rPr lang="fi-FI" dirty="0" smtClean="0"/>
+              <a:t>   		</a:t>
+            </a:r>
+            <a:r>
+              <a:rPr lang="fi-FI" dirty="0" smtClean="0"/>
+              <a:t>		</a:t>
+            </a:r>
+            <a:r>
+              <a:rPr lang="fi-FI" dirty="0" smtClean="0"/>
+              <a:t>	Beholder</a:t>
+            </a:r>
+            <a:endParaRPr lang="en-US" dirty="0"/>
+          </a:p>
+        </p:txBody>
+      </p:sp>
+      <p:pic>
+        <p:nvPicPr>
+          <p:cNvPr id="1026" name="Picture 2"/>
+          <p:cNvPicPr>
+            <a:picLocks noChangeAspect="1" noChangeArrowheads="1"/>
+          </p:cNvPicPr>
+          <p:nvPr/>
+        </p:nvPicPr>
+        <p:blipFill>
+          <a:blip r:embed="rId2">
+            <a:extLst>
+              <a:ext uri="{28A0092B-C50C-407E-A947-70E740481C1C}">
+                <a14:useLocalDpi xmlns:a14="http://schemas.microsoft.com/office/drawing/2010/main" val="0"/>
+              </a:ext>
+            </a:extLst>
+          </a:blip>
+          <a:srcRect/>
+          <a:stretch>
+            <a:fillRect/>
+          </a:stretch>
+        </p:blipFill>
+        <p:spPr bwMode="auto">
+          <a:xfrm>
+            <a:off x="2989489" y="2129638"/>
+            <a:ext cx="2028825" cy="2533650"/>
+          </a:xfrm>
+          <a:prstGeom prst="rect">
+            <a:avLst/>
+          </a:prstGeom>
+          <a:noFill/>
+          <a:ln>
+            <a:noFill/>
+          </a:ln>
+          <a:extLst>
+            <a:ext uri="{909E8E84-426E-40DD-AFC4-6F175D3DCCD1}">
+              <a14:hiddenFill xmlns:a14="http://schemas.microsoft.com/office/drawing/2010/main">
+                <a:solidFill>
+                  <a:schemeClr val="accent1"/>
+                </a:solidFill>
+              </a14:hiddenFill>
+            </a:ext>
+            <a:ext uri="{91240B29-F687-4F45-9708-019B960494DF}">
+              <a14:hiddenLine xmlns:a14="http://schemas.microsoft.com/office/drawing/2010/main" w="9525">
+                <a:solidFill>
+                  <a:schemeClr val="tx1"/>
+                </a:solidFill>
+                <a:miter lim="800000"/>
+                <a:headEnd/>
+                <a:tailEnd/>
+              </a14:hiddenLine>
+            </a:ext>
+          </a:extLst>
+        </p:spPr>
+      </p:pic>
+      <p:pic>
+        <p:nvPicPr>
+          <p:cNvPr id="1027" name="Picture 3"/>
+          <p:cNvPicPr>
+            <a:picLocks noChangeAspect="1" noChangeArrowheads="1"/>
+          </p:cNvPicPr>
+          <p:nvPr/>
+        </p:nvPicPr>
+        <p:blipFill>
+          <a:blip r:embed="rId3">
+            <a:extLst>
+              <a:ext uri="{28A0092B-C50C-407E-A947-70E740481C1C}">
+                <a14:useLocalDpi xmlns:a14="http://schemas.microsoft.com/office/drawing/2010/main" val="0"/>
+              </a:ext>
+            </a:extLst>
+          </a:blip>
+          <a:srcRect/>
+          <a:stretch>
+            <a:fillRect/>
+          </a:stretch>
+        </p:blipFill>
+        <p:spPr bwMode="auto">
+          <a:xfrm>
+            <a:off x="940312" y="2114370"/>
+            <a:ext cx="1306942" cy="2636549"/>
+          </a:xfrm>
+          <a:prstGeom prst="rect">
+            <a:avLst/>
+          </a:prstGeom>
+          <a:noFill/>
+          <a:ln>
+            <a:noFill/>
+          </a:ln>
+          <a:extLst>
+            <a:ext uri="{909E8E84-426E-40DD-AFC4-6F175D3DCCD1}">
+              <a14:hiddenFill xmlns:a14="http://schemas.microsoft.com/office/drawing/2010/main">
+                <a:solidFill>
+                  <a:schemeClr val="accent1"/>
+                </a:solidFill>
+              </a14:hiddenFill>
+            </a:ext>
+            <a:ext uri="{91240B29-F687-4F45-9708-019B960494DF}">
+              <a14:hiddenLine xmlns:a14="http://schemas.microsoft.com/office/drawing/2010/main" w="9525">
+                <a:solidFill>
+                  <a:schemeClr val="tx1"/>
+                </a:solidFill>
+                <a:miter lim="800000"/>
+                <a:headEnd/>
+                <a:tailEnd/>
+              </a14:hiddenLine>
+            </a:ext>
+          </a:extLst>
+        </p:spPr>
+      </p:pic>
+      <p:pic>
+        <p:nvPicPr>
+          <p:cNvPr id="1028" name="Picture 4"/>
+          <p:cNvPicPr>
+            <a:picLocks noChangeAspect="1" noChangeArrowheads="1"/>
+          </p:cNvPicPr>
+          <p:nvPr/>
+        </p:nvPicPr>
+        <p:blipFill>
+          <a:blip r:embed="rId4">
+            <a:extLst>
+              <a:ext uri="{28A0092B-C50C-407E-A947-70E740481C1C}">
+                <a14:useLocalDpi xmlns:a14="http://schemas.microsoft.com/office/drawing/2010/main" val="0"/>
+              </a:ext>
+            </a:extLst>
+          </a:blip>
+          <a:srcRect/>
+          <a:stretch>
+            <a:fillRect/>
+          </a:stretch>
+        </p:blipFill>
+        <p:spPr bwMode="auto">
+          <a:xfrm>
+            <a:off x="5196240" y="2216258"/>
+            <a:ext cx="3159350" cy="2447030"/>
+          </a:xfrm>
+          <a:prstGeom prst="rect">
+            <a:avLst/>
+          </a:prstGeom>
+          <a:noFill/>
+          <a:ln>
+            <a:noFill/>
+          </a:ln>
+          <a:extLst>
+            <a:ext uri="{909E8E84-426E-40DD-AFC4-6F175D3DCCD1}">
+              <a14:hiddenFill xmlns:a14="http://schemas.microsoft.com/office/drawing/2010/main">
+                <a:solidFill>
+                  <a:schemeClr val="accent1"/>
+                </a:solidFill>
+              </a14:hiddenFill>
+            </a:ext>
+            <a:ext uri="{91240B29-F687-4F45-9708-019B960494DF}">
+              <a14:hiddenLine xmlns:a14="http://schemas.microsoft.com/office/drawing/2010/main" w="9525">
+                <a:solidFill>
+                  <a:schemeClr val="tx1"/>
+                </a:solidFill>
+                <a:miter lim="800000"/>
+                <a:headEnd/>
+                <a:tailEnd/>
+              </a14:hiddenLine>
+            </a:ext>
+          </a:extLst>
+        </p:spPr>
+      </p:pic>
+      <p:pic>
+        <p:nvPicPr>
+          <p:cNvPr id="1029" name="Picture 5"/>
+          <p:cNvPicPr>
+            <a:picLocks noChangeAspect="1" noChangeArrowheads="1"/>
+          </p:cNvPicPr>
+          <p:nvPr/>
+        </p:nvPicPr>
+        <p:blipFill>
+          <a:blip r:embed="rId5">
+            <a:extLst>
+              <a:ext uri="{28A0092B-C50C-407E-A947-70E740481C1C}">
+                <a14:useLocalDpi xmlns:a14="http://schemas.microsoft.com/office/drawing/2010/main" val="0"/>
+              </a:ext>
+            </a:extLst>
+          </a:blip>
+          <a:srcRect/>
+          <a:stretch>
+            <a:fillRect/>
+          </a:stretch>
+        </p:blipFill>
+        <p:spPr bwMode="auto">
+          <a:xfrm>
+            <a:off x="8526404" y="1699724"/>
+            <a:ext cx="3105040" cy="3051195"/>
+          </a:xfrm>
+          <a:prstGeom prst="rect">
+            <a:avLst/>
+          </a:prstGeom>
+          <a:noFill/>
+          <a:ln>
+            <a:noFill/>
+          </a:ln>
+          <a:extLst>
+            <a:ext uri="{909E8E84-426E-40DD-AFC4-6F175D3DCCD1}">
+              <a14:hiddenFill xmlns:a14="http://schemas.microsoft.com/office/drawing/2010/main">
+                <a:solidFill>
+                  <a:schemeClr val="accent1"/>
+                </a:solidFill>
+              </a14:hiddenFill>
+            </a:ext>
+            <a:ext uri="{91240B29-F687-4F45-9708-019B960494DF}">
+              <a14:hiddenLine xmlns:a14="http://schemas.microsoft.com/office/drawing/2010/main" w="9525">
+                <a:solidFill>
+                  <a:schemeClr val="tx1"/>
+                </a:solidFill>
+                <a:miter lim="800000"/>
+                <a:headEnd/>
+                <a:tailEnd/>
+              </a14:hiddenLine>
+            </a:ext>
+          </a:extLst>
+        </p:spPr>
+      </p:pic>
     </p:spTree>
     <p:extLst>
       <p:ext uri="{BB962C8B-B14F-4D97-AF65-F5344CB8AC3E}">
-        <p14:creationId xmlns:p14="http://schemas.microsoft.com/office/powerpoint/2010/main" val="2970324139"/>
+        <p14:creationId xmlns:p14="http://schemas.microsoft.com/office/powerpoint/2010/main" val="73279792"/>
       </p:ext>
     </p:extLst>
   </p:cSld>
@@ -9458,18 +10068,10 @@
           <a:lstStyle/>
           <a:p>
             <a:r>
-              <a:rPr lang="fi-FI" dirty="0" err="1" smtClean="0"/>
-              <a:t>Development</a:t>
-            </a:r>
-            <a:r>
-              <a:rPr lang="fi-FI" dirty="0" smtClean="0"/>
-              <a:t> </a:t>
-            </a:r>
-            <a:r>
-              <a:rPr lang="fi-FI" dirty="0" err="1" smtClean="0"/>
-              <a:t>process</a:t>
-            </a:r>
-            <a:endParaRPr lang="en-US" dirty="0"/>
+              <a:rPr lang="fi-FI" dirty="0" smtClean="0"/>
+              <a:t>Game structure</a:t>
+            </a:r>
+            <a:endParaRPr lang="fi-FI" dirty="0"/>
           </a:p>
         </p:txBody>
       </p:sp>
@@ -9489,174 +10091,41 @@
           <a:lstStyle/>
           <a:p>
             <a:r>
-              <a:rPr lang="fi-FI" dirty="0" err="1" smtClean="0"/>
-              <a:t>Developed</a:t>
-            </a:r>
-            <a:r>
-              <a:rPr lang="fi-FI" dirty="0" smtClean="0"/>
-              <a:t> </a:t>
-            </a:r>
-            <a:r>
-              <a:rPr lang="fi-FI" dirty="0" err="1" smtClean="0"/>
-              <a:t>some</a:t>
-            </a:r>
-            <a:r>
-              <a:rPr lang="fi-FI" dirty="0" smtClean="0"/>
-              <a:t> </a:t>
-            </a:r>
-            <a:r>
-              <a:rPr lang="fi-FI" dirty="0" err="1" smtClean="0"/>
-              <a:t>amount</a:t>
-            </a:r>
-            <a:r>
-              <a:rPr lang="fi-FI" dirty="0" smtClean="0"/>
-              <a:t> at </a:t>
-            </a:r>
-            <a:r>
-              <a:rPr lang="fi-FI" dirty="0" err="1" smtClean="0"/>
-              <a:t>school</a:t>
-            </a:r>
-            <a:r>
-              <a:rPr lang="fi-FI" dirty="0" smtClean="0"/>
-              <a:t> </a:t>
-            </a:r>
-            <a:r>
-              <a:rPr lang="fi-FI" dirty="0" err="1" smtClean="0"/>
-              <a:t>but</a:t>
-            </a:r>
-            <a:r>
-              <a:rPr lang="fi-FI" dirty="0" smtClean="0"/>
-              <a:t> </a:t>
-            </a:r>
-            <a:r>
-              <a:rPr lang="fi-FI" dirty="0" err="1" smtClean="0"/>
-              <a:t>mostly</a:t>
-            </a:r>
-            <a:r>
-              <a:rPr lang="fi-FI" dirty="0" smtClean="0"/>
-              <a:t> home</a:t>
-            </a:r>
-            <a:endParaRPr lang="en-US" dirty="0" smtClean="0"/>
+              <a:rPr lang="fi-FI" dirty="0" smtClean="0"/>
+              <a:t>Either single player or local co-op (max 2 players)</a:t>
+            </a:r>
+          </a:p>
+          <a:p>
+            <a:r>
+              <a:rPr lang="fi-FI" dirty="0" smtClean="0"/>
+              <a:t>Three levels (along with menu, credits etc...)</a:t>
+            </a:r>
+          </a:p>
+          <a:p>
+            <a:r>
+              <a:rPr lang="fi-FI" dirty="0" smtClean="0"/>
+              <a:t>Randomly generated</a:t>
+            </a:r>
           </a:p>
           <a:p>
             <a:pPr lvl="1"/>
             <a:r>
               <a:rPr lang="fi-FI" dirty="0" smtClean="0"/>
-              <a:t>School </a:t>
-            </a:r>
-            <a:r>
-              <a:rPr lang="fi-FI" dirty="0" err="1" smtClean="0"/>
-              <a:t>computers</a:t>
-            </a:r>
-            <a:r>
-              <a:rPr lang="fi-FI" dirty="0" smtClean="0"/>
-              <a:t> </a:t>
-            </a:r>
-            <a:r>
-              <a:rPr lang="fi-FI" dirty="0" err="1" smtClean="0"/>
-              <a:t>inadequate</a:t>
-            </a:r>
-            <a:r>
-              <a:rPr lang="fi-FI" dirty="0" smtClean="0"/>
-              <a:t> for </a:t>
-            </a:r>
-            <a:r>
-              <a:rPr lang="fi-FI" dirty="0" err="1" smtClean="0"/>
-              <a:t>Unreal</a:t>
-            </a:r>
-            <a:r>
-              <a:rPr lang="fi-FI" dirty="0" smtClean="0"/>
-              <a:t> Engine 4 </a:t>
-            </a:r>
-            <a:r>
-              <a:rPr lang="fi-FI" dirty="0" err="1" smtClean="0"/>
-              <a:t>editor</a:t>
-            </a:r>
-            <a:endParaRPr lang="fi-FI" dirty="0" smtClean="0"/>
-          </a:p>
-          <a:p>
-            <a:r>
-              <a:rPr lang="fi-FI" dirty="0" err="1" smtClean="0"/>
-              <a:t>GitHub</a:t>
-            </a:r>
-            <a:r>
-              <a:rPr lang="fi-FI" dirty="0" smtClean="0"/>
-              <a:t> for version </a:t>
-            </a:r>
-            <a:r>
-              <a:rPr lang="fi-FI" dirty="0" err="1" smtClean="0"/>
-              <a:t>control</a:t>
-            </a:r>
-            <a:endParaRPr lang="fi-FI" dirty="0" smtClean="0"/>
+              <a:t>Enemy placement</a:t>
+            </a:r>
           </a:p>
           <a:p>
             <a:pPr lvl="1"/>
             <a:r>
-              <a:rPr lang="fi-FI" dirty="0" err="1" smtClean="0"/>
-              <a:t>Issues</a:t>
-            </a:r>
-            <a:r>
-              <a:rPr lang="fi-FI" dirty="0" smtClean="0"/>
-              <a:t> for feature </a:t>
-            </a:r>
-            <a:r>
-              <a:rPr lang="fi-FI" dirty="0" err="1" smtClean="0"/>
-              <a:t>completion</a:t>
-            </a:r>
-            <a:r>
-              <a:rPr lang="fi-FI" dirty="0" smtClean="0"/>
-              <a:t> and </a:t>
-            </a:r>
-            <a:r>
-              <a:rPr lang="fi-FI" dirty="0" err="1" smtClean="0"/>
-              <a:t>time</a:t>
-            </a:r>
-            <a:r>
-              <a:rPr lang="fi-FI" dirty="0" smtClean="0"/>
-              <a:t> </a:t>
-            </a:r>
-            <a:r>
-              <a:rPr lang="fi-FI" dirty="0" err="1" smtClean="0"/>
-              <a:t>tracking</a:t>
-            </a:r>
-            <a:endParaRPr lang="fi-FI" dirty="0" smtClean="0"/>
+              <a:rPr lang="fi-FI" dirty="0" smtClean="0"/>
+              <a:t>Weapons</a:t>
+            </a:r>
           </a:p>
           <a:p>
             <a:pPr lvl="1"/>
             <a:r>
               <a:rPr lang="fi-FI" dirty="0" smtClean="0"/>
-              <a:t>Wiki for </a:t>
-            </a:r>
-            <a:r>
-              <a:rPr lang="fi-FI" dirty="0" err="1" smtClean="0"/>
-              <a:t>documentation</a:t>
-            </a:r>
-            <a:endParaRPr lang="fi-FI" dirty="0" smtClean="0"/>
-          </a:p>
-          <a:p>
-            <a:r>
-              <a:rPr lang="fi-FI" dirty="0" smtClean="0"/>
-              <a:t>Skype and </a:t>
-            </a:r>
-            <a:r>
-              <a:rPr lang="fi-FI" dirty="0" err="1" smtClean="0"/>
-              <a:t>meeting</a:t>
-            </a:r>
-            <a:r>
-              <a:rPr lang="fi-FI" dirty="0" smtClean="0"/>
-              <a:t> in </a:t>
-            </a:r>
-            <a:r>
-              <a:rPr lang="fi-FI" dirty="0" err="1" smtClean="0"/>
-              <a:t>school</a:t>
-            </a:r>
-            <a:r>
-              <a:rPr lang="fi-FI" dirty="0" smtClean="0"/>
-              <a:t> for </a:t>
-            </a:r>
-            <a:r>
-              <a:rPr lang="fi-FI" dirty="0" err="1" smtClean="0"/>
-              <a:t>communication</a:t>
+              <a:t>Entire 2nd cave level</a:t>
             </a:r>
             <a:endParaRPr lang="fi-FI" dirty="0"/>
           </a:p>
@@ -9665,20 +10134,13 @@
     </p:spTree>
     <p:extLst>
       <p:ext uri="{BB962C8B-B14F-4D97-AF65-F5344CB8AC3E}">
-        <p14:creationId xmlns:p14="http://schemas.microsoft.com/office/powerpoint/2010/main" val="3901222233"/>
+        <p14:creationId xmlns:p14="http://schemas.microsoft.com/office/powerpoint/2010/main" val="1871896386"/>
       </p:ext>
     </p:extLst>
   </p:cSld>
   <p:clrMapOvr>
     <a:masterClrMapping/>
   </p:clrMapOvr>
-  <p:timing>
-    <p:tnLst>
-      <p:par>
-        <p:cTn id="1" dur="indefinite" restart="never" nodeType="tmRoot"/>
-      </p:par>
-    </p:tnLst>
-  </p:timing>
 </p:sld>
 </file>
 
@@ -9715,18 +10177,10 @@
           <a:lstStyle/>
           <a:p>
             <a:r>
-              <a:rPr lang="fi-FI" dirty="0" err="1" smtClean="0"/>
-              <a:t>Cut</a:t>
-            </a:r>
-            <a:r>
-              <a:rPr lang="fi-FI" dirty="0" smtClean="0"/>
-              <a:t> </a:t>
-            </a:r>
-            <a:r>
-              <a:rPr lang="fi-FI" dirty="0" err="1" smtClean="0"/>
-              <a:t>features</a:t>
-            </a:r>
-            <a:endParaRPr lang="en-US" dirty="0"/>
+              <a:rPr lang="fi-FI" dirty="0" smtClean="0"/>
+              <a:t>Competitors</a:t>
+            </a:r>
+            <a:endParaRPr lang="fi-FI" dirty="0"/>
           </a:p>
         </p:txBody>
       </p:sp>
@@ -9745,172 +10199,60 @@
           <a:bodyPr/>
           <a:lstStyle/>
           <a:p>
-            <a:pPr marL="342900" lvl="1" indent="-342900"/>
-            <a:r>
-              <a:rPr lang="fi-FI" dirty="0" err="1"/>
-              <a:t>Local</a:t>
-            </a:r>
-            <a:r>
-              <a:rPr lang="fi-FI" dirty="0"/>
-              <a:t> </a:t>
-            </a:r>
-            <a:r>
-              <a:rPr lang="fi-FI" dirty="0" err="1"/>
-              <a:t>co</a:t>
-            </a:r>
-            <a:r>
-              <a:rPr lang="fi-FI" dirty="0"/>
-              <a:t>-op </a:t>
-            </a:r>
-            <a:r>
-              <a:rPr lang="fi-FI" dirty="0" err="1"/>
-              <a:t>instead</a:t>
-            </a:r>
-            <a:r>
-              <a:rPr lang="fi-FI" dirty="0"/>
-              <a:t> of </a:t>
-            </a:r>
-            <a:r>
-              <a:rPr lang="fi-FI" dirty="0" smtClean="0"/>
-              <a:t>online</a:t>
-            </a:r>
-          </a:p>
-          <a:p>
-            <a:pPr marL="342900" lvl="1" indent="-342900"/>
-            <a:r>
-              <a:rPr lang="fi-FI" dirty="0" err="1" smtClean="0"/>
-              <a:t>Models</a:t>
-            </a:r>
-            <a:endParaRPr lang="fi-FI" dirty="0" smtClean="0"/>
-          </a:p>
-          <a:p>
-            <a:pPr marL="742950" lvl="2" indent="-342900"/>
-            <a:r>
-              <a:rPr lang="fi-FI" dirty="0" err="1" smtClean="0"/>
-              <a:t>Many</a:t>
-            </a:r>
-            <a:r>
-              <a:rPr lang="fi-FI" dirty="0" smtClean="0"/>
-              <a:t> </a:t>
-            </a:r>
-            <a:r>
-              <a:rPr lang="fi-FI" dirty="0" err="1" smtClean="0"/>
-              <a:t>weapons</a:t>
-            </a:r>
-            <a:endParaRPr lang="fi-FI" dirty="0" smtClean="0"/>
-          </a:p>
-          <a:p>
-            <a:pPr marL="742950" lvl="2" indent="-342900"/>
-            <a:r>
-              <a:rPr lang="fi-FI" dirty="0" err="1" smtClean="0"/>
-              <a:t>Ammo</a:t>
-            </a:r>
-            <a:endParaRPr lang="fi-FI" dirty="0" smtClean="0"/>
-          </a:p>
-          <a:p>
-            <a:pPr marL="742950" lvl="2" indent="-342900"/>
-            <a:r>
-              <a:rPr lang="fi-FI" dirty="0" err="1" smtClean="0"/>
-              <a:t>Better</a:t>
-            </a:r>
-            <a:r>
-              <a:rPr lang="fi-FI" dirty="0" smtClean="0"/>
-              <a:t> </a:t>
-            </a:r>
-            <a:r>
-              <a:rPr lang="fi-FI" dirty="0" err="1" smtClean="0"/>
-              <a:t>player</a:t>
-            </a:r>
-            <a:r>
-              <a:rPr lang="fi-FI" dirty="0" smtClean="0"/>
-              <a:t> </a:t>
-            </a:r>
-            <a:r>
-              <a:rPr lang="fi-FI" dirty="0" err="1" smtClean="0"/>
-              <a:t>animations</a:t>
-            </a:r>
+            <a:r>
+              <a:rPr lang="fi-FI" dirty="0" smtClean="0"/>
+              <a:t>Not a lot of competing games on the market</a:t>
+            </a:r>
+          </a:p>
+          <a:p>
+            <a:r>
+              <a:rPr lang="fi-FI" dirty="0" smtClean="0"/>
+              <a:t>Ours is a pretty unique mix of different gameplay mechanics</a:t>
+            </a:r>
+          </a:p>
+          <a:p>
+            <a:pPr lvl="1"/>
+            <a:r>
+              <a:rPr lang="fi-FI" dirty="0" smtClean="0"/>
+              <a:t>Similiar games</a:t>
+            </a:r>
+          </a:p>
+          <a:p>
+            <a:pPr lvl="2"/>
+            <a:r>
+              <a:rPr lang="fi-FI" dirty="0" smtClean="0"/>
+              <a:t>Ikaruga</a:t>
+            </a:r>
+          </a:p>
+          <a:p>
+            <a:pPr lvl="2"/>
+            <a:r>
+              <a:rPr lang="fi-FI" dirty="0" smtClean="0"/>
+              <a:t>Cave Story</a:t>
+            </a:r>
+          </a:p>
+          <a:p>
+            <a:pPr lvl="2"/>
+            <a:r>
+              <a:rPr lang="fi-FI" dirty="0" smtClean="0"/>
+              <a:t>Nuclear Throne</a:t>
+            </a:r>
+          </a:p>
+          <a:p>
+            <a:pPr lvl="2"/>
+            <a:r>
+              <a:rPr lang="fi-FI" dirty="0" smtClean="0"/>
+              <a:t>Teleglitch</a:t>
+            </a:r>
+          </a:p>
+          <a:p>
+            <a:pPr lvl="2"/>
             <a:endParaRPr lang="fi-FI" dirty="0"/>
           </a:p>
           <a:p>
-            <a:r>
-              <a:rPr lang="fi-FI" dirty="0" err="1" smtClean="0"/>
-              <a:t>Originally</a:t>
-            </a:r>
-            <a:r>
-              <a:rPr lang="fi-FI" dirty="0" smtClean="0"/>
-              <a:t> </a:t>
-            </a:r>
-            <a:r>
-              <a:rPr lang="fi-FI" dirty="0" err="1" smtClean="0"/>
-              <a:t>planned</a:t>
-            </a:r>
-            <a:r>
-              <a:rPr lang="fi-FI" dirty="0" smtClean="0"/>
-              <a:t> </a:t>
-            </a:r>
-            <a:r>
-              <a:rPr lang="fi-FI" dirty="0" err="1" smtClean="0"/>
-              <a:t>enemies</a:t>
-            </a:r>
-            <a:endParaRPr lang="fi-FI" dirty="0" smtClean="0"/>
-          </a:p>
-          <a:p>
-            <a:pPr lvl="1"/>
-            <a:r>
-              <a:rPr lang="fi-FI" dirty="0" smtClean="0"/>
-              <a:t>Made </a:t>
-            </a:r>
-            <a:r>
-              <a:rPr lang="fi-FI" dirty="0" err="1" smtClean="0"/>
-              <a:t>different</a:t>
-            </a:r>
-            <a:r>
-              <a:rPr lang="fi-FI" dirty="0" smtClean="0"/>
-              <a:t> </a:t>
-            </a:r>
-            <a:r>
-              <a:rPr lang="fi-FI" dirty="0" err="1" smtClean="0"/>
-              <a:t>kind</a:t>
-            </a:r>
-            <a:r>
-              <a:rPr lang="fi-FI" dirty="0" smtClean="0"/>
-              <a:t> of </a:t>
-            </a:r>
-            <a:r>
-              <a:rPr lang="fi-FI" dirty="0" err="1" smtClean="0"/>
-              <a:t>enemies</a:t>
-            </a:r>
-            <a:r>
-              <a:rPr lang="fi-FI" dirty="0" smtClean="0"/>
-              <a:t> </a:t>
-            </a:r>
-            <a:r>
-              <a:rPr lang="fi-FI" dirty="0" err="1" smtClean="0"/>
-              <a:t>instead</a:t>
-            </a:r>
-            <a:endParaRPr lang="fi-FI" dirty="0" smtClean="0"/>
-          </a:p>
-          <a:p>
-            <a:r>
-              <a:rPr lang="fi-FI" dirty="0" err="1" smtClean="0"/>
-              <a:t>Tileset</a:t>
-            </a:r>
-            <a:r>
-              <a:rPr lang="fi-FI" dirty="0" smtClean="0"/>
-              <a:t> for </a:t>
-            </a:r>
-            <a:r>
-              <a:rPr lang="fi-FI" dirty="0" err="1" smtClean="0"/>
-              <a:t>cave</a:t>
-            </a:r>
-            <a:r>
-              <a:rPr lang="fi-FI" dirty="0" smtClean="0"/>
-              <a:t> </a:t>
-            </a:r>
-            <a:r>
-              <a:rPr lang="fi-FI" dirty="0" err="1" smtClean="0"/>
-              <a:t>map</a:t>
-            </a:r>
+            <a:pPr marL="914400" lvl="2" indent="0">
+              <a:buNone/>
+            </a:pPr>
             <a:endParaRPr lang="fi-FI" dirty="0" smtClean="0"/>
           </a:p>
         </p:txBody>
@@ -9918,20 +10260,13 @@
     </p:spTree>
     <p:extLst>
       <p:ext uri="{BB962C8B-B14F-4D97-AF65-F5344CB8AC3E}">
-        <p14:creationId xmlns:p14="http://schemas.microsoft.com/office/powerpoint/2010/main" val="1146457019"/>
+        <p14:creationId xmlns:p14="http://schemas.microsoft.com/office/powerpoint/2010/main" val="3209865458"/>
       </p:ext>
     </p:extLst>
   </p:cSld>
   <p:clrMapOvr>
     <a:masterClrMapping/>
   </p:clrMapOvr>
-  <p:timing>
-    <p:tnLst>
-      <p:par>
-        <p:cTn id="1" dur="indefinite" restart="never" nodeType="tmRoot"/>
-      </p:par>
-    </p:tnLst>
-  </p:timing>
 </p:sld>
 </file>
 
@@ -10186,7 +10521,7 @@
   <a:extraClrSchemeLst/>
   <a:extLst>
     <a:ext uri="{05A4C25C-085E-4340-85A3-A5531E510DB2}">
-      <thm15:themeFamily xmlns:thm15="http://schemas.microsoft.com/office/thememl/2012/main" xmlns="" name="Facet" id="{C0C680CD-088A-49FC-A102-D699147F32B2}" vid="{8C59B386-999D-4CB6-B907-9F3997C027CC}"/>
+      <thm15:themeFamily xmlns="" xmlns:thm15="http://schemas.microsoft.com/office/thememl/2012/main" name="Facet" id="{C0C680CD-088A-49FC-A102-D699147F32B2}" vid="{8C59B386-999D-4CB6-B907-9F3997C027CC}"/>
     </a:ext>
   </a:extLst>
 </a:theme>

</xml_diff>

<commit_message>
some more powerpoint stuff
</commit_message>
<xml_diff>
--- a/TopdownGame.pptx
+++ b/TopdownGame.pptx
@@ -121,7 +121,7 @@
   </p:defaultTextStyle>
   <p:extLst>
     <p:ext uri="{EFAFB233-063F-42B5-8137-9DF3F51BA10A}">
-      <p15:sldGuideLst xmlns:p15="http://schemas.microsoft.com/office/powerpoint/2012/main" xmlns=""/>
+      <p15:sldGuideLst xmlns="" xmlns:p15="http://schemas.microsoft.com/office/powerpoint/2012/main"/>
     </p:ext>
   </p:extLst>
 </p:presentation>
@@ -851,7 +851,7 @@
           <a:p>
             <a:fld id="{78CED280-D596-4318-BD9D-334C5D42CEEE}" type="datetimeFigureOut">
               <a:rPr lang="fi-FI" smtClean="0"/>
-              <a:t>25.4.2015</a:t>
+              <a:t>26.4.2015</a:t>
             </a:fld>
             <a:endParaRPr lang="fi-FI"/>
           </a:p>
@@ -1109,7 +1109,7 @@
           <a:p>
             <a:fld id="{78CED280-D596-4318-BD9D-334C5D42CEEE}" type="datetimeFigureOut">
               <a:rPr lang="fi-FI" smtClean="0"/>
-              <a:t>25.4.2015</a:t>
+              <a:t>26.4.2015</a:t>
             </a:fld>
             <a:endParaRPr lang="fi-FI"/>
           </a:p>
@@ -1423,7 +1423,7 @@
           <a:p>
             <a:fld id="{78CED280-D596-4318-BD9D-334C5D42CEEE}" type="datetimeFigureOut">
               <a:rPr lang="fi-FI" smtClean="0"/>
-              <a:t>25.4.2015</a:t>
+              <a:t>26.4.2015</a:t>
             </a:fld>
             <a:endParaRPr lang="fi-FI"/>
           </a:p>
@@ -1750,7 +1750,7 @@
           <a:p>
             <a:fld id="{78CED280-D596-4318-BD9D-334C5D42CEEE}" type="datetimeFigureOut">
               <a:rPr lang="fi-FI" smtClean="0"/>
-              <a:t>25.4.2015</a:t>
+              <a:t>26.4.2015</a:t>
             </a:fld>
             <a:endParaRPr lang="fi-FI"/>
           </a:p>
@@ -2064,7 +2064,7 @@
           <a:p>
             <a:fld id="{78CED280-D596-4318-BD9D-334C5D42CEEE}" type="datetimeFigureOut">
               <a:rPr lang="fi-FI" smtClean="0"/>
-              <a:t>25.4.2015</a:t>
+              <a:t>26.4.2015</a:t>
             </a:fld>
             <a:endParaRPr lang="fi-FI"/>
           </a:p>
@@ -2451,7 +2451,7 @@
           <a:p>
             <a:fld id="{78CED280-D596-4318-BD9D-334C5D42CEEE}" type="datetimeFigureOut">
               <a:rPr lang="fi-FI" smtClean="0"/>
-              <a:t>25.4.2015</a:t>
+              <a:t>26.4.2015</a:t>
             </a:fld>
             <a:endParaRPr lang="fi-FI"/>
           </a:p>
@@ -2621,7 +2621,7 @@
           <a:p>
             <a:fld id="{78CED280-D596-4318-BD9D-334C5D42CEEE}" type="datetimeFigureOut">
               <a:rPr lang="fi-FI" smtClean="0"/>
-              <a:t>25.4.2015</a:t>
+              <a:t>26.4.2015</a:t>
             </a:fld>
             <a:endParaRPr lang="fi-FI"/>
           </a:p>
@@ -2801,7 +2801,7 @@
           <a:p>
             <a:fld id="{78CED280-D596-4318-BD9D-334C5D42CEEE}" type="datetimeFigureOut">
               <a:rPr lang="fi-FI" smtClean="0"/>
-              <a:t>25.4.2015</a:t>
+              <a:t>26.4.2015</a:t>
             </a:fld>
             <a:endParaRPr lang="fi-FI"/>
           </a:p>
@@ -2987,7 +2987,7 @@
           <a:p>
             <a:fld id="{78CED280-D596-4318-BD9D-334C5D42CEEE}" type="datetimeFigureOut">
               <a:rPr lang="fi-FI" smtClean="0"/>
-              <a:t>25.4.2015</a:t>
+              <a:t>26.4.2015</a:t>
             </a:fld>
             <a:endParaRPr lang="fi-FI"/>
           </a:p>
@@ -3241,7 +3241,7 @@
           <a:p>
             <a:fld id="{78CED280-D596-4318-BD9D-334C5D42CEEE}" type="datetimeFigureOut">
               <a:rPr lang="fi-FI" smtClean="0"/>
-              <a:t>25.4.2015</a:t>
+              <a:t>26.4.2015</a:t>
             </a:fld>
             <a:endParaRPr lang="fi-FI"/>
           </a:p>
@@ -3480,7 +3480,7 @@
           <a:p>
             <a:fld id="{78CED280-D596-4318-BD9D-334C5D42CEEE}" type="datetimeFigureOut">
               <a:rPr lang="fi-FI" smtClean="0"/>
-              <a:t>25.4.2015</a:t>
+              <a:t>26.4.2015</a:t>
             </a:fld>
             <a:endParaRPr lang="fi-FI"/>
           </a:p>
@@ -3854,7 +3854,7 @@
           <a:p>
             <a:fld id="{78CED280-D596-4318-BD9D-334C5D42CEEE}" type="datetimeFigureOut">
               <a:rPr lang="fi-FI" smtClean="0"/>
-              <a:t>25.4.2015</a:t>
+              <a:t>26.4.2015</a:t>
             </a:fld>
             <a:endParaRPr lang="fi-FI"/>
           </a:p>
@@ -3977,7 +3977,7 @@
           <a:p>
             <a:fld id="{78CED280-D596-4318-BD9D-334C5D42CEEE}" type="datetimeFigureOut">
               <a:rPr lang="fi-FI" smtClean="0"/>
-              <a:t>25.4.2015</a:t>
+              <a:t>26.4.2015</a:t>
             </a:fld>
             <a:endParaRPr lang="fi-FI"/>
           </a:p>
@@ -4079,7 +4079,7 @@
           <a:p>
             <a:fld id="{78CED280-D596-4318-BD9D-334C5D42CEEE}" type="datetimeFigureOut">
               <a:rPr lang="fi-FI" smtClean="0"/>
-              <a:t>25.4.2015</a:t>
+              <a:t>26.4.2015</a:t>
             </a:fld>
             <a:endParaRPr lang="fi-FI"/>
           </a:p>
@@ -4334,7 +4334,7 @@
           <a:p>
             <a:fld id="{78CED280-D596-4318-BD9D-334C5D42CEEE}" type="datetimeFigureOut">
               <a:rPr lang="fi-FI" smtClean="0"/>
-              <a:t>25.4.2015</a:t>
+              <a:t>26.4.2015</a:t>
             </a:fld>
             <a:endParaRPr lang="fi-FI"/>
           </a:p>
@@ -4597,7 +4597,7 @@
           <a:p>
             <a:fld id="{78CED280-D596-4318-BD9D-334C5D42CEEE}" type="datetimeFigureOut">
               <a:rPr lang="fi-FI" smtClean="0"/>
-              <a:t>25.4.2015</a:t>
+              <a:t>26.4.2015</a:t>
             </a:fld>
             <a:endParaRPr lang="fi-FI"/>
           </a:p>
@@ -5342,7 +5342,7 @@
           <a:p>
             <a:fld id="{78CED280-D596-4318-BD9D-334C5D42CEEE}" type="datetimeFigureOut">
               <a:rPr lang="fi-FI" smtClean="0"/>
-              <a:t>25.4.2015</a:t>
+              <a:t>26.4.2015</a:t>
             </a:fld>
             <a:endParaRPr lang="fi-FI"/>
           </a:p>
@@ -7826,13 +7826,8 @@
           <a:p>
             <a:r>
               <a:rPr lang="fi-FI" dirty="0" smtClean="0"/>
-              <a:t>Local </a:t>
-            </a:r>
-            <a:r>
-              <a:rPr lang="fi-FI" dirty="0" smtClean="0"/>
-              <a:t>co-op (2 players)</a:t>
-            </a:r>
-            <a:endParaRPr lang="fi-FI" dirty="0" smtClean="0"/>
+              <a:t>Local co-op (2 players)</a:t>
+            </a:r>
           </a:p>
         </p:txBody>
       </p:sp>
@@ -7997,15 +7992,7 @@
           <a:p>
             <a:r>
               <a:rPr lang="fi-FI" dirty="0" smtClean="0"/>
-              <a:t>Plot: You’re a guy with a </a:t>
-            </a:r>
-            <a:r>
-              <a:rPr lang="fi-FI" dirty="0" smtClean="0"/>
-              <a:t>weapon and </a:t>
-            </a:r>
-            <a:r>
-              <a:rPr lang="fi-FI" dirty="0" smtClean="0"/>
-              <a:t>you shoot stuff til the next level</a:t>
+              <a:t>Plot: You’re a guy with a weapon and you shoot stuff til the next level</a:t>
             </a:r>
           </a:p>
           <a:p>
@@ -8018,11 +8005,7 @@
             <a:pPr lvl="1"/>
             <a:r>
               <a:rPr lang="fi-FI" dirty="0" smtClean="0"/>
-              <a:t>Quick to </a:t>
-            </a:r>
-            <a:r>
-              <a:rPr lang="fi-FI" dirty="0" smtClean="0"/>
-              <a:t>model meshes</a:t>
+              <a:t>Quick to model meshes</a:t>
             </a:r>
           </a:p>
           <a:p>
@@ -8944,246 +8927,6 @@
               <a:t>     Cave						   Boss</a:t>
             </a:r>
             <a:endParaRPr lang="fi-FI" dirty="0"/>
-          </a:p>
-        </p:txBody>
-      </p:sp>
-      <p:sp>
-        <p:nvSpPr>
-          <p:cNvPr id="4" name="Rectangle 3"/>
-          <p:cNvSpPr/>
-          <p:nvPr/>
-        </p:nvSpPr>
-        <p:spPr>
-          <a:xfrm>
-            <a:off x="677334" y="1903136"/>
-            <a:ext cx="1936393" cy="1375647"/>
-          </a:xfrm>
-          <a:prstGeom prst="rect">
-            <a:avLst/>
-          </a:prstGeom>
-        </p:spPr>
-        <p:style>
-          <a:lnRef idx="2">
-            <a:schemeClr val="accent1">
-              <a:shade val="50000"/>
-            </a:schemeClr>
-          </a:lnRef>
-          <a:fillRef idx="1">
-            <a:schemeClr val="accent1"/>
-          </a:fillRef>
-          <a:effectRef idx="0">
-            <a:schemeClr val="accent1"/>
-          </a:effectRef>
-          <a:fontRef idx="minor">
-            <a:schemeClr val="lt1"/>
-          </a:fontRef>
-        </p:style>
-        <p:txBody>
-          <a:bodyPr rtlCol="0" anchor="ctr"/>
-          <a:lstStyle/>
-          <a:p>
-            <a:pPr algn="ctr"/>
-            <a:r>
-              <a:rPr lang="fi-FI" dirty="0" err="1" smtClean="0"/>
-              <a:t>Insert</a:t>
-            </a:r>
-            <a:r>
-              <a:rPr lang="fi-FI" dirty="0" smtClean="0"/>
-              <a:t> </a:t>
-            </a:r>
-            <a:r>
-              <a:rPr lang="fi-FI" dirty="0" err="1" smtClean="0"/>
-              <a:t>weapon</a:t>
-            </a:r>
-            <a:r>
-              <a:rPr lang="fi-FI" dirty="0" smtClean="0"/>
-              <a:t> image </a:t>
-            </a:r>
-            <a:r>
-              <a:rPr lang="fi-FI" dirty="0" err="1" smtClean="0"/>
-              <a:t>here</a:t>
-            </a:r>
-            <a:endParaRPr lang="fi-FI" dirty="0" smtClean="0"/>
-          </a:p>
-        </p:txBody>
-      </p:sp>
-      <p:sp>
-        <p:nvSpPr>
-          <p:cNvPr id="5" name="Rectangle 4"/>
-          <p:cNvSpPr/>
-          <p:nvPr/>
-        </p:nvSpPr>
-        <p:spPr>
-          <a:xfrm>
-            <a:off x="2925571" y="1903135"/>
-            <a:ext cx="1936393" cy="1375647"/>
-          </a:xfrm>
-          <a:prstGeom prst="rect">
-            <a:avLst/>
-          </a:prstGeom>
-        </p:spPr>
-        <p:style>
-          <a:lnRef idx="2">
-            <a:schemeClr val="accent1">
-              <a:shade val="50000"/>
-            </a:schemeClr>
-          </a:lnRef>
-          <a:fillRef idx="1">
-            <a:schemeClr val="accent1"/>
-          </a:fillRef>
-          <a:effectRef idx="0">
-            <a:schemeClr val="accent1"/>
-          </a:effectRef>
-          <a:fontRef idx="minor">
-            <a:schemeClr val="lt1"/>
-          </a:fontRef>
-        </p:style>
-        <p:txBody>
-          <a:bodyPr rtlCol="0" anchor="ctr"/>
-          <a:lstStyle/>
-          <a:p>
-            <a:pPr algn="ctr"/>
-            <a:r>
-              <a:rPr lang="fi-FI" dirty="0" err="1" smtClean="0"/>
-              <a:t>Insert</a:t>
-            </a:r>
-            <a:r>
-              <a:rPr lang="fi-FI" dirty="0" smtClean="0"/>
-              <a:t> </a:t>
-            </a:r>
-            <a:r>
-              <a:rPr lang="fi-FI" dirty="0" err="1" smtClean="0"/>
-              <a:t>weapon</a:t>
-            </a:r>
-            <a:r>
-              <a:rPr lang="fi-FI" dirty="0" smtClean="0"/>
-              <a:t> image </a:t>
-            </a:r>
-            <a:r>
-              <a:rPr lang="fi-FI" dirty="0" err="1" smtClean="0"/>
-              <a:t>here</a:t>
-            </a:r>
-            <a:endParaRPr lang="fi-FI" dirty="0" smtClean="0"/>
-          </a:p>
-        </p:txBody>
-      </p:sp>
-      <p:sp>
-        <p:nvSpPr>
-          <p:cNvPr id="6" name="Rectangle 5"/>
-          <p:cNvSpPr/>
-          <p:nvPr/>
-        </p:nvSpPr>
-        <p:spPr>
-          <a:xfrm>
-            <a:off x="5173808" y="1903135"/>
-            <a:ext cx="1936393" cy="1375647"/>
-          </a:xfrm>
-          <a:prstGeom prst="rect">
-            <a:avLst/>
-          </a:prstGeom>
-        </p:spPr>
-        <p:style>
-          <a:lnRef idx="2">
-            <a:schemeClr val="accent1">
-              <a:shade val="50000"/>
-            </a:schemeClr>
-          </a:lnRef>
-          <a:fillRef idx="1">
-            <a:schemeClr val="accent1"/>
-          </a:fillRef>
-          <a:effectRef idx="0">
-            <a:schemeClr val="accent1"/>
-          </a:effectRef>
-          <a:fontRef idx="minor">
-            <a:schemeClr val="lt1"/>
-          </a:fontRef>
-        </p:style>
-        <p:txBody>
-          <a:bodyPr rtlCol="0" anchor="ctr"/>
-          <a:lstStyle/>
-          <a:p>
-            <a:pPr algn="ctr"/>
-            <a:r>
-              <a:rPr lang="fi-FI" dirty="0" err="1" smtClean="0"/>
-              <a:t>Insert</a:t>
-            </a:r>
-            <a:r>
-              <a:rPr lang="fi-FI" dirty="0" smtClean="0"/>
-              <a:t> </a:t>
-            </a:r>
-            <a:r>
-              <a:rPr lang="fi-FI" dirty="0" err="1" smtClean="0"/>
-              <a:t>weapon</a:t>
-            </a:r>
-            <a:r>
-              <a:rPr lang="fi-FI" dirty="0" smtClean="0"/>
-              <a:t> image </a:t>
-            </a:r>
-            <a:r>
-              <a:rPr lang="fi-FI" dirty="0" err="1" smtClean="0"/>
-              <a:t>here</a:t>
-            </a:r>
-            <a:endParaRPr lang="fi-FI" dirty="0" smtClean="0"/>
-          </a:p>
-        </p:txBody>
-      </p:sp>
-      <p:sp>
-        <p:nvSpPr>
-          <p:cNvPr id="7" name="Rectangle 6"/>
-          <p:cNvSpPr/>
-          <p:nvPr/>
-        </p:nvSpPr>
-        <p:spPr>
-          <a:xfrm>
-            <a:off x="7422045" y="1911225"/>
-            <a:ext cx="1936393" cy="1375647"/>
-          </a:xfrm>
-          <a:prstGeom prst="rect">
-            <a:avLst/>
-          </a:prstGeom>
-        </p:spPr>
-        <p:style>
-          <a:lnRef idx="2">
-            <a:schemeClr val="accent1">
-              <a:shade val="50000"/>
-            </a:schemeClr>
-          </a:lnRef>
-          <a:fillRef idx="1">
-            <a:schemeClr val="accent1"/>
-          </a:fillRef>
-          <a:effectRef idx="0">
-            <a:schemeClr val="accent1"/>
-          </a:effectRef>
-          <a:fontRef idx="minor">
-            <a:schemeClr val="lt1"/>
-          </a:fontRef>
-        </p:style>
-        <p:txBody>
-          <a:bodyPr rtlCol="0" anchor="ctr"/>
-          <a:lstStyle/>
-          <a:p>
-            <a:pPr algn="ctr"/>
-            <a:r>
-              <a:rPr lang="fi-FI" dirty="0" err="1" smtClean="0"/>
-              <a:t>Insert</a:t>
-            </a:r>
-            <a:r>
-              <a:rPr lang="fi-FI" dirty="0" smtClean="0"/>
-              <a:t> </a:t>
-            </a:r>
-            <a:r>
-              <a:rPr lang="fi-FI" dirty="0" err="1" smtClean="0"/>
-              <a:t>weapon</a:t>
-            </a:r>
-            <a:r>
-              <a:rPr lang="fi-FI" dirty="0" smtClean="0"/>
-              <a:t> image </a:t>
-            </a:r>
-            <a:r>
-              <a:rPr lang="fi-FI" dirty="0" err="1" smtClean="0"/>
-              <a:t>here</a:t>
-            </a:r>
-            <a:endParaRPr lang="fi-FI" dirty="0" smtClean="0"/>
           </a:p>
         </p:txBody>
       </p:sp>
@@ -10148,30 +9891,31 @@
           <a:p>
             <a:r>
               <a:rPr lang="fi-FI" dirty="0" smtClean="0"/>
-              <a:t>Three levels (along with menu, credits etc</a:t>
-            </a:r>
-            <a:r>
-              <a:rPr lang="fi-FI" dirty="0" smtClean="0"/>
-              <a:t>...)</a:t>
-            </a:r>
-          </a:p>
-          <a:p>
-            <a:r>
-              <a:rPr lang="fi-FI" dirty="0" smtClean="0"/>
-              <a:t>Duration: 15-20 minutes</a:t>
+              <a:t>Three levels (along with menu, credits etc...)</a:t>
+            </a:r>
+          </a:p>
+          <a:p>
+            <a:r>
+              <a:rPr lang="fi-FI" dirty="0" smtClean="0"/>
+              <a:t>Duration: 15-20 </a:t>
+            </a:r>
+            <a:r>
+              <a:rPr lang="fi-FI" dirty="0" smtClean="0"/>
+              <a:t>minutes</a:t>
+            </a:r>
+          </a:p>
+          <a:p>
+            <a:r>
+              <a:rPr lang="fi-FI" smtClean="0"/>
+              <a:t>Progressively harder New Game +</a:t>
             </a:r>
             <a:endParaRPr lang="fi-FI" dirty="0" smtClean="0"/>
           </a:p>
           <a:p>
             <a:r>
               <a:rPr lang="fi-FI" dirty="0" smtClean="0"/>
-              <a:t>Randomly </a:t>
-            </a:r>
-            <a:r>
-              <a:rPr lang="fi-FI" dirty="0" smtClean="0"/>
-              <a:t>generated parts for replay value</a:t>
-            </a:r>
-            <a:endParaRPr lang="fi-FI" dirty="0" smtClean="0"/>
+              <a:t>Randomly generated parts for replay value</a:t>
+            </a:r>
           </a:p>
           <a:p>
             <a:pPr lvl="1"/>
@@ -10186,17 +9930,12 @@
               <a:rPr lang="fi-FI" dirty="0" smtClean="0"/>
               <a:t>Weapons and drops</a:t>
             </a:r>
-            <a:endParaRPr lang="fi-FI" dirty="0" smtClean="0"/>
           </a:p>
           <a:p>
             <a:pPr lvl="1"/>
             <a:r>
               <a:rPr lang="fi-FI" dirty="0" smtClean="0"/>
-              <a:t>Entire 2nd </a:t>
-            </a:r>
-            <a:r>
-              <a:rPr lang="fi-FI" dirty="0" smtClean="0"/>
-              <a:t>level</a:t>
+              <a:t>Entire 2nd level</a:t>
             </a:r>
             <a:endParaRPr lang="fi-FI" dirty="0"/>
           </a:p>
@@ -10592,7 +10331,7 @@
   <a:extraClrSchemeLst/>
   <a:extLst>
     <a:ext uri="{05A4C25C-085E-4340-85A3-A5531E510DB2}">
-      <thm15:themeFamily xmlns:thm15="http://schemas.microsoft.com/office/thememl/2012/main" xmlns="" name="Facet" id="{C0C680CD-088A-49FC-A102-D699147F32B2}" vid="{8C59B386-999D-4CB6-B907-9F3997C027CC}"/>
+      <thm15:themeFamily xmlns="" xmlns:thm15="http://schemas.microsoft.com/office/thememl/2012/main" name="Facet" id="{C0C680CD-088A-49FC-A102-D699147F32B2}" vid="{8C59B386-999D-4CB6-B907-9F3997C027CC}"/>
     </a:ext>
   </a:extLst>
 </a:theme>

</xml_diff>

<commit_message>
add dl link to powepoint
</commit_message>
<xml_diff>
--- a/TopdownGame.pptx
+++ b/TopdownGame.pptx
@@ -21,6 +21,7 @@
     <p:sldId id="263" r:id="rId15"/>
     <p:sldId id="267" r:id="rId16"/>
     <p:sldId id="264" r:id="rId17"/>
+    <p:sldId id="272" r:id="rId18"/>
   </p:sldIdLst>
   <p:sldSz cx="12192000" cy="6858000"/>
   <p:notesSz cx="6858000" cy="9144000"/>
@@ -121,7 +122,7 @@
   </p:defaultTextStyle>
   <p:extLst>
     <p:ext uri="{EFAFB233-063F-42B5-8137-9DF3F51BA10A}">
-      <p15:sldGuideLst xmlns="" xmlns:p15="http://schemas.microsoft.com/office/powerpoint/2012/main"/>
+      <p15:sldGuideLst xmlns:p15="http://schemas.microsoft.com/office/powerpoint/2012/main" xmlns=""/>
     </p:ext>
   </p:extLst>
 </p:presentation>
@@ -7503,8 +7504,19 @@
           <a:p>
             <a:r>
               <a:rPr lang="fi-FI" dirty="0" smtClean="0"/>
-              <a:t>Game development with UE4</a:t>
-            </a:r>
+              <a:t>Game development with </a:t>
+            </a:r>
+            <a:r>
+              <a:rPr lang="fi-FI" dirty="0" smtClean="0"/>
+              <a:t>UE4</a:t>
+            </a:r>
+          </a:p>
+          <a:p>
+            <a:r>
+              <a:rPr lang="fi-FI" dirty="0" smtClean="0"/>
+              <a:t>Issue tracking and management with GitHub</a:t>
+            </a:r>
+            <a:endParaRPr lang="fi-FI" dirty="0" smtClean="0"/>
           </a:p>
           <a:p>
             <a:r>
@@ -7516,11 +7528,12 @@
             <a:pPr lvl="1"/>
             <a:r>
               <a:rPr lang="fi-FI" dirty="0" smtClean="0"/>
-              <a:t>However, lot of progress has been made reg. engine</a:t>
-            </a:r>
-          </a:p>
-          <a:p>
-            <a:pPr lvl="1"/>
+              <a:t>However, lot of progress has been made reg. </a:t>
+            </a:r>
+            <a:r>
+              <a:rPr lang="fi-FI" dirty="0" smtClean="0"/>
+              <a:t>engine</a:t>
+            </a:r>
             <a:endParaRPr lang="fi-FI" dirty="0" smtClean="0"/>
           </a:p>
           <a:p>
@@ -7624,6 +7637,170 @@
       </p:par>
     </p:tnLst>
   </p:timing>
+</p:sld>
+</file>
+
+<file path=ppt/slides/slide17.xml><?xml version="1.0" encoding="utf-8"?>
+<p:sld xmlns:a="http://schemas.openxmlformats.org/drawingml/2006/main" xmlns:r="http://schemas.openxmlformats.org/officeDocument/2006/relationships" xmlns:p="http://schemas.openxmlformats.org/presentationml/2006/main">
+  <p:cSld>
+    <p:spTree>
+      <p:nvGrpSpPr>
+        <p:cNvPr id="1" name=""/>
+        <p:cNvGrpSpPr/>
+        <p:nvPr/>
+      </p:nvGrpSpPr>
+      <p:grpSpPr>
+        <a:xfrm>
+          <a:off x="0" y="0"/>
+          <a:ext cx="0" cy="0"/>
+          <a:chOff x="0" y="0"/>
+          <a:chExt cx="0" cy="0"/>
+        </a:xfrm>
+      </p:grpSpPr>
+      <p:sp>
+        <p:nvSpPr>
+          <p:cNvPr id="2" name="Title 1"/>
+          <p:cNvSpPr>
+            <a:spLocks noGrp="1"/>
+          </p:cNvSpPr>
+          <p:nvPr>
+            <p:ph type="title"/>
+          </p:nvPr>
+        </p:nvSpPr>
+        <p:spPr>
+          <a:xfrm>
+            <a:off x="791634" y="635000"/>
+            <a:ext cx="4809066" cy="1320800"/>
+          </a:xfrm>
+        </p:spPr>
+        <p:txBody>
+          <a:bodyPr>
+            <a:normAutofit/>
+          </a:bodyPr>
+          <a:lstStyle/>
+          <a:p>
+            <a:r>
+              <a:rPr lang="fi-FI" sz="6600" dirty="0" smtClean="0"/>
+              <a:t>Questions</a:t>
+            </a:r>
+            <a:r>
+              <a:rPr lang="fi-FI" sz="6600" dirty="0"/>
+              <a:t>?</a:t>
+            </a:r>
+          </a:p>
+        </p:txBody>
+      </p:sp>
+      <p:sp>
+        <p:nvSpPr>
+          <p:cNvPr id="3" name="Title 1"/>
+          <p:cNvSpPr txBox="1">
+            <a:spLocks/>
+          </p:cNvSpPr>
+          <p:nvPr/>
+        </p:nvSpPr>
+        <p:spPr>
+          <a:xfrm>
+            <a:off x="893234" y="2832100"/>
+            <a:ext cx="10358966" cy="1320800"/>
+          </a:xfrm>
+          <a:prstGeom prst="rect">
+            <a:avLst/>
+          </a:prstGeom>
+        </p:spPr>
+        <p:txBody>
+          <a:bodyPr vert="horz" lIns="91440" tIns="45720" rIns="91440" bIns="45720" rtlCol="0" anchor="t">
+            <a:normAutofit fontScale="92500"/>
+          </a:bodyPr>
+          <a:lstStyle>
+            <a:lvl1pPr algn="l" defTabSz="457200" rtl="0" eaLnBrk="1" latinLnBrk="0" hangingPunct="1">
+              <a:spcBef>
+                <a:spcPct val="0"/>
+              </a:spcBef>
+              <a:buNone/>
+              <a:defRPr sz="3600" kern="1200">
+                <a:solidFill>
+                  <a:schemeClr val="accent1"/>
+                </a:solidFill>
+                <a:latin typeface="+mj-lt"/>
+                <a:ea typeface="+mj-ea"/>
+                <a:cs typeface="+mj-cs"/>
+              </a:defRPr>
+            </a:lvl1pPr>
+            <a:lvl2pPr eaLnBrk="1" hangingPunct="1">
+              <a:defRPr>
+                <a:solidFill>
+                  <a:schemeClr val="tx2"/>
+                </a:solidFill>
+              </a:defRPr>
+            </a:lvl2pPr>
+            <a:lvl3pPr eaLnBrk="1" hangingPunct="1">
+              <a:defRPr>
+                <a:solidFill>
+                  <a:schemeClr val="tx2"/>
+                </a:solidFill>
+              </a:defRPr>
+            </a:lvl3pPr>
+            <a:lvl4pPr eaLnBrk="1" hangingPunct="1">
+              <a:defRPr>
+                <a:solidFill>
+                  <a:schemeClr val="tx2"/>
+                </a:solidFill>
+              </a:defRPr>
+            </a:lvl4pPr>
+            <a:lvl5pPr eaLnBrk="1" hangingPunct="1">
+              <a:defRPr>
+                <a:solidFill>
+                  <a:schemeClr val="tx2"/>
+                </a:solidFill>
+              </a:defRPr>
+            </a:lvl5pPr>
+            <a:lvl6pPr eaLnBrk="1" hangingPunct="1">
+              <a:defRPr>
+                <a:solidFill>
+                  <a:schemeClr val="tx2"/>
+                </a:solidFill>
+              </a:defRPr>
+            </a:lvl6pPr>
+            <a:lvl7pPr eaLnBrk="1" hangingPunct="1">
+              <a:defRPr>
+                <a:solidFill>
+                  <a:schemeClr val="tx2"/>
+                </a:solidFill>
+              </a:defRPr>
+            </a:lvl7pPr>
+            <a:lvl8pPr eaLnBrk="1" hangingPunct="1">
+              <a:defRPr>
+                <a:solidFill>
+                  <a:schemeClr val="tx2"/>
+                </a:solidFill>
+              </a:defRPr>
+            </a:lvl8pPr>
+            <a:lvl9pPr eaLnBrk="1" hangingPunct="1">
+              <a:defRPr>
+                <a:solidFill>
+                  <a:schemeClr val="tx2"/>
+                </a:solidFill>
+              </a:defRPr>
+            </a:lvl9pPr>
+          </a:lstStyle>
+          <a:p>
+            <a:r>
+              <a:rPr lang="fi-FI" sz="6600" dirty="0"/>
+              <a:t>Download: http://yx.fi/7au</a:t>
+            </a:r>
+          </a:p>
+        </p:txBody>
+      </p:sp>
+    </p:spTree>
+    <p:extLst>
+      <p:ext uri="{BB962C8B-B14F-4D97-AF65-F5344CB8AC3E}">
+        <p14:creationId xmlns:p14="http://schemas.microsoft.com/office/powerpoint/2010/main" val="3897702244"/>
+      </p:ext>
+    </p:extLst>
+  </p:cSld>
+  <p:clrMapOvr>
+    <a:masterClrMapping/>
+  </p:clrMapOvr>
 </p:sld>
 </file>
 
@@ -9897,11 +10074,7 @@
           <a:p>
             <a:r>
               <a:rPr lang="fi-FI" dirty="0" smtClean="0"/>
-              <a:t>Duration: 15-20 </a:t>
-            </a:r>
-            <a:r>
-              <a:rPr lang="fi-FI" dirty="0" smtClean="0"/>
-              <a:t>minutes</a:t>
+              <a:t>Duration: 15-20 minutes</a:t>
             </a:r>
           </a:p>
           <a:p>
@@ -10331,7 +10504,7 @@
   <a:extraClrSchemeLst/>
   <a:extLst>
     <a:ext uri="{05A4C25C-085E-4340-85A3-A5531E510DB2}">
-      <thm15:themeFamily xmlns="" xmlns:thm15="http://schemas.microsoft.com/office/thememl/2012/main" name="Facet" id="{C0C680CD-088A-49FC-A102-D699147F32B2}" vid="{8C59B386-999D-4CB6-B907-9F3997C027CC}"/>
+      <thm15:themeFamily xmlns:thm15="http://schemas.microsoft.com/office/thememl/2012/main" xmlns="" name="Facet" id="{C0C680CD-088A-49FC-A102-D699147F32B2}" vid="{8C59B386-999D-4CB6-B907-9F3997C027CC}"/>
     </a:ext>
   </a:extLst>
 </a:theme>

</xml_diff>